<commit_message>
Added electricity generation externality cost estimate
</commit_message>
<xml_diff>
--- a/atlas/co2_ev-vs-diesel/co2_ev-vs-diesel_normal/co2_ev-vs-diesel_normal_normal.pptx
+++ b/atlas/co2_ev-vs-diesel/co2_ev-vs-diesel_normal/co2_ev-vs-diesel_normal_normal.pptx
@@ -788,7 +788,7 @@
             </a:r>
             <a:r>
               <a:rPr/>
-              <a:t>Trucks/Analysis/truck-modelling/R/co2-ev-vs-diesel.R</a:t>
+              <a:t>Trucks/Analysis/truck-modelling/R/charts/15-co2-ev-vs-diesel.R</a:t>
             </a:r>
             <a:r>
               <a:rPr/>
@@ -3911,8 +3911,8 @@
           </p:nvSpPr>
           <p:spPr>
             <a:xfrm>
-              <a:off x="1857546" y="399743"/>
-              <a:ext cx="5580914" cy="616606"/>
+              <a:off x="1857546" y="433998"/>
+              <a:ext cx="4899112" cy="548094"/>
             </a:xfrm>
             <a:prstGeom prst="rect">
               <a:avLst/>
@@ -3922,9 +3922,9 @@
                 <a:alpha val="94901"/>
               </a:srgbClr>
             </a:solidFill>
-            <a:ln w="54202" cap="sq">
+            <a:ln w="7143" cap="sq">
               <a:solidFill>
-                <a:srgbClr val="FFFFFF">
+                <a:srgbClr val="A02226">
                   <a:alpha val="100000"/>
                 </a:srgbClr>
               </a:solidFill>
@@ -3946,20 +3946,20 @@
           </p:nvSpPr>
           <p:spPr>
             <a:xfrm>
-              <a:off x="1857546" y="1016349"/>
-              <a:ext cx="3239760" cy="616606"/>
+              <a:off x="1857546" y="1050605"/>
+              <a:ext cx="2544979" cy="548094"/>
             </a:xfrm>
             <a:prstGeom prst="rect">
               <a:avLst/>
             </a:prstGeom>
             <a:solidFill>
-              <a:srgbClr val="3E81CE">
+              <a:srgbClr val="F68B33">
                 <a:alpha val="94901"/>
               </a:srgbClr>
             </a:solidFill>
-            <a:ln w="54202" cap="sq">
+            <a:ln w="7143" cap="sq">
               <a:solidFill>
-                <a:srgbClr val="FFFFFF">
+                <a:srgbClr val="F68B33">
                   <a:alpha val="100000"/>
                 </a:srgbClr>
               </a:solidFill>
@@ -3981,20 +3981,20 @@
           </p:nvSpPr>
           <p:spPr>
             <a:xfrm>
-              <a:off x="1857546" y="1632955"/>
-              <a:ext cx="589320" cy="616606"/>
+              <a:off x="1857546" y="1667211"/>
+              <a:ext cx="662073" cy="548094"/>
             </a:xfrm>
             <a:prstGeom prst="rect">
               <a:avLst/>
             </a:prstGeom>
             <a:solidFill>
-              <a:srgbClr val="A3C7DF">
+              <a:srgbClr val="FFC35A">
                 <a:alpha val="94901"/>
               </a:srgbClr>
             </a:solidFill>
-            <a:ln w="54202" cap="sq">
+            <a:ln w="7143" cap="sq">
               <a:solidFill>
-                <a:srgbClr val="FFFFFF">
+                <a:srgbClr val="FFC35A">
                   <a:alpha val="100000"/>
                 </a:srgbClr>
               </a:solidFill>
@@ -4016,8 +4016,8 @@
           </p:nvSpPr>
           <p:spPr>
             <a:xfrm>
-              <a:off x="1857546" y="2455096"/>
-              <a:ext cx="1402259" cy="616606"/>
+              <a:off x="1857546" y="2489352"/>
+              <a:ext cx="1283399" cy="548094"/>
             </a:xfrm>
             <a:prstGeom prst="rect">
               <a:avLst/>
@@ -4027,9 +4027,9 @@
                 <a:alpha val="94901"/>
               </a:srgbClr>
             </a:solidFill>
-            <a:ln w="54202" cap="sq">
+            <a:ln w="7143" cap="sq">
               <a:solidFill>
-                <a:srgbClr val="FFFFFF">
+                <a:srgbClr val="A02226">
                   <a:alpha val="100000"/>
                 </a:srgbClr>
               </a:solidFill>
@@ -4051,20 +4051,20 @@
           </p:nvSpPr>
           <p:spPr>
             <a:xfrm>
-              <a:off x="1857546" y="3071703"/>
-              <a:ext cx="941111" cy="616606"/>
+              <a:off x="1857546" y="3105958"/>
+              <a:ext cx="755649" cy="548094"/>
             </a:xfrm>
             <a:prstGeom prst="rect">
               <a:avLst/>
             </a:prstGeom>
             <a:solidFill>
-              <a:srgbClr val="3E81CE">
+              <a:srgbClr val="F68B33">
                 <a:alpha val="94901"/>
               </a:srgbClr>
             </a:solidFill>
-            <a:ln w="54202" cap="sq">
+            <a:ln w="7143" cap="sq">
               <a:solidFill>
-                <a:srgbClr val="FFFFFF">
+                <a:srgbClr val="F68B33">
                   <a:alpha val="100000"/>
                 </a:srgbClr>
               </a:solidFill>
@@ -4086,20 +4086,20 @@
           </p:nvSpPr>
           <p:spPr>
             <a:xfrm>
-              <a:off x="1857546" y="3688309"/>
-              <a:ext cx="140205" cy="616606"/>
+              <a:off x="1857546" y="3722565"/>
+              <a:ext cx="170803" cy="548094"/>
             </a:xfrm>
             <a:prstGeom prst="rect">
               <a:avLst/>
             </a:prstGeom>
             <a:solidFill>
-              <a:srgbClr val="A3C7DF">
+              <a:srgbClr val="FFC35A">
                 <a:alpha val="94901"/>
               </a:srgbClr>
             </a:solidFill>
-            <a:ln w="54202" cap="sq">
+            <a:ln w="7143" cap="sq">
               <a:solidFill>
-                <a:srgbClr val="FFFFFF">
+                <a:srgbClr val="FFC35A">
                   <a:alpha val="100000"/>
                 </a:srgbClr>
               </a:solidFill>
@@ -4121,84 +4121,84 @@
           </p:nvSpPr>
           <p:spPr>
             <a:xfrm>
-              <a:off x="2819460" y="3279453"/>
-              <a:ext cx="1865934" cy="201105"/>
+              <a:off x="3207649" y="2662847"/>
+              <a:ext cx="710097" cy="201105"/>
             </a:xfrm>
             <a:custGeom>
               <a:avLst/>
               <a:pathLst>
-                <a:path w="1865934" h="201105">
+                <a:path w="710097" h="201105">
                   <a:moveTo>
                     <a:pt x="27431" y="201105"/>
                   </a:moveTo>
                   <a:lnTo>
-                    <a:pt x="1838502" y="201105"/>
-                  </a:lnTo>
-                  <a:lnTo>
-                    <a:pt x="1837397" y="201083"/>
-                  </a:lnTo>
-                  <a:lnTo>
-                    <a:pt x="1841808" y="200905"/>
-                  </a:lnTo>
-                  <a:lnTo>
-                    <a:pt x="1846134" y="200022"/>
-                  </a:lnTo>
-                  <a:lnTo>
-                    <a:pt x="1850261" y="198456"/>
-                  </a:lnTo>
-                  <a:lnTo>
-                    <a:pt x="1854085" y="196249"/>
-                  </a:lnTo>
-                  <a:lnTo>
-                    <a:pt x="1857504" y="193457"/>
-                  </a:lnTo>
-                  <a:lnTo>
-                    <a:pt x="1860432" y="190153"/>
-                  </a:lnTo>
-                  <a:lnTo>
-                    <a:pt x="1862791" y="186421"/>
-                  </a:lnTo>
-                  <a:lnTo>
-                    <a:pt x="1864522" y="182360"/>
-                  </a:lnTo>
-                  <a:lnTo>
-                    <a:pt x="1865578" y="178073"/>
-                  </a:lnTo>
-                  <a:lnTo>
-                    <a:pt x="1865934" y="173673"/>
-                  </a:lnTo>
-                  <a:lnTo>
-                    <a:pt x="1865934" y="27431"/>
-                  </a:lnTo>
-                  <a:lnTo>
-                    <a:pt x="1865578" y="23031"/>
-                  </a:lnTo>
-                  <a:lnTo>
-                    <a:pt x="1864522" y="18745"/>
-                  </a:lnTo>
-                  <a:lnTo>
-                    <a:pt x="1862791" y="14683"/>
-                  </a:lnTo>
-                  <a:lnTo>
-                    <a:pt x="1860432" y="10952"/>
-                  </a:lnTo>
-                  <a:lnTo>
-                    <a:pt x="1857504" y="7647"/>
-                  </a:lnTo>
-                  <a:lnTo>
-                    <a:pt x="1854085" y="4855"/>
-                  </a:lnTo>
-                  <a:lnTo>
-                    <a:pt x="1850261" y="2648"/>
-                  </a:lnTo>
-                  <a:lnTo>
-                    <a:pt x="1846134" y="1083"/>
-                  </a:lnTo>
-                  <a:lnTo>
-                    <a:pt x="1841808" y="200"/>
-                  </a:lnTo>
-                  <a:lnTo>
-                    <a:pt x="1838502" y="0"/>
+                    <a:pt x="682665" y="201105"/>
+                  </a:lnTo>
+                  <a:lnTo>
+                    <a:pt x="681561" y="201083"/>
+                  </a:lnTo>
+                  <a:lnTo>
+                    <a:pt x="685972" y="200905"/>
+                  </a:lnTo>
+                  <a:lnTo>
+                    <a:pt x="690297" y="200022"/>
+                  </a:lnTo>
+                  <a:lnTo>
+                    <a:pt x="694425" y="198456"/>
+                  </a:lnTo>
+                  <a:lnTo>
+                    <a:pt x="698248" y="196249"/>
+                  </a:lnTo>
+                  <a:lnTo>
+                    <a:pt x="701668" y="193457"/>
+                  </a:lnTo>
+                  <a:lnTo>
+                    <a:pt x="704595" y="190153"/>
+                  </a:lnTo>
+                  <a:lnTo>
+                    <a:pt x="706955" y="186421"/>
+                  </a:lnTo>
+                  <a:lnTo>
+                    <a:pt x="708685" y="182360"/>
+                  </a:lnTo>
+                  <a:lnTo>
+                    <a:pt x="709742" y="178073"/>
+                  </a:lnTo>
+                  <a:lnTo>
+                    <a:pt x="710097" y="173673"/>
+                  </a:lnTo>
+                  <a:lnTo>
+                    <a:pt x="710097" y="27431"/>
+                  </a:lnTo>
+                  <a:lnTo>
+                    <a:pt x="709742" y="23031"/>
+                  </a:lnTo>
+                  <a:lnTo>
+                    <a:pt x="708685" y="18745"/>
+                  </a:lnTo>
+                  <a:lnTo>
+                    <a:pt x="706955" y="14683"/>
+                  </a:lnTo>
+                  <a:lnTo>
+                    <a:pt x="704595" y="10952"/>
+                  </a:lnTo>
+                  <a:lnTo>
+                    <a:pt x="701668" y="7647"/>
+                  </a:lnTo>
+                  <a:lnTo>
+                    <a:pt x="698248" y="4855"/>
+                  </a:lnTo>
+                  <a:lnTo>
+                    <a:pt x="694425" y="2648"/>
+                  </a:lnTo>
+                  <a:lnTo>
+                    <a:pt x="690297" y="1083"/>
+                  </a:lnTo>
+                  <a:lnTo>
+                    <a:pt x="685972" y="200"/>
+                  </a:lnTo>
+                  <a:lnTo>
+                    <a:pt x="682665" y="0"/>
                   </a:lnTo>
                   <a:lnTo>
                     <a:pt x="27431" y="0"/>
@@ -4216,7 +4216,7 @@
                     <a:pt x="17704" y="1782"/>
                   </a:lnTo>
                   <a:lnTo>
-                    <a:pt x="13716" y="3675"/>
+                    <a:pt x="13715" y="3675"/>
                   </a:lnTo>
                   <a:lnTo>
                     <a:pt x="10082" y="6183"/>
@@ -4264,7 +4264,7 @@
                     <a:pt x="10082" y="194922"/>
                   </a:lnTo>
                   <a:lnTo>
-                    <a:pt x="13716" y="197430"/>
+                    <a:pt x="13715" y="197430"/>
                   </a:lnTo>
                   <a:lnTo>
                     <a:pt x="17704" y="199322"/>
@@ -4299,1351 +4299,7 @@
           </p:nvSpPr>
           <p:spPr>
             <a:xfrm>
-              <a:off x="2837748" y="3248962"/>
-              <a:ext cx="1829358" cy="213307"/>
-            </a:xfrm>
-            <a:prstGeom prst="rect">
-              <a:avLst/>
-            </a:prstGeom>
-            <a:noFill/>
-          </p:spPr>
-          <p:txBody>
-            <a:bodyPr lIns="0" rIns="0" tIns="0" bIns="0" anchorCtr="1" anchor="ctr" wrap="none"/>
-            <a:lstStyle/>
-            <a:p>
-              <a:pPr algn="l" marL="0" marR="0" indent="0">
-                <a:lnSpc>
-                  <a:spcPts val="1800"/>
-                </a:lnSpc>
-                <a:spcBef>
-                  <a:spcPts val="0"/>
-                </a:spcBef>
-                <a:spcAft>
-                  <a:spcPts val="0"/>
-                </a:spcAft>
-              </a:pPr>
-              <a:r>
-                <a:rPr sz="1800" b="1">
-                  <a:solidFill>
-                    <a:srgbClr val="3E81CE">
-                      <a:alpha val="100000"/>
-                    </a:srgbClr>
-                  </a:solidFill>
-                  <a:latin typeface="Helvetica"/>
-                  <a:cs typeface="Helvetica"/>
-                </a:rPr>
-                <a:t>EV (sold in 2022)</a:t>
-              </a:r>
-            </a:p>
-          </p:txBody>
-        </p:sp>
-        <p:sp>
-          <p:nvSpPr>
-            <p:cNvPr id="18" name="pg16"/>
-            <p:cNvSpPr/>
-            <p:nvPr/>
-          </p:nvSpPr>
-          <p:spPr>
-            <a:xfrm>
-              <a:off x="2819460" y="3279453"/>
-              <a:ext cx="1865934" cy="201105"/>
-            </a:xfrm>
-            <a:custGeom>
-              <a:avLst/>
-              <a:pathLst>
-                <a:path w="1865934" h="201105">
-                  <a:moveTo>
-                    <a:pt x="27431" y="201105"/>
-                  </a:moveTo>
-                  <a:lnTo>
-                    <a:pt x="1838502" y="201105"/>
-                  </a:lnTo>
-                  <a:lnTo>
-                    <a:pt x="1837397" y="201083"/>
-                  </a:lnTo>
-                  <a:lnTo>
-                    <a:pt x="1841808" y="200905"/>
-                  </a:lnTo>
-                  <a:lnTo>
-                    <a:pt x="1846134" y="200022"/>
-                  </a:lnTo>
-                  <a:lnTo>
-                    <a:pt x="1850261" y="198456"/>
-                  </a:lnTo>
-                  <a:lnTo>
-                    <a:pt x="1854085" y="196249"/>
-                  </a:lnTo>
-                  <a:lnTo>
-                    <a:pt x="1857504" y="193457"/>
-                  </a:lnTo>
-                  <a:lnTo>
-                    <a:pt x="1860432" y="190153"/>
-                  </a:lnTo>
-                  <a:lnTo>
-                    <a:pt x="1862791" y="186421"/>
-                  </a:lnTo>
-                  <a:lnTo>
-                    <a:pt x="1864522" y="182360"/>
-                  </a:lnTo>
-                  <a:lnTo>
-                    <a:pt x="1865578" y="178073"/>
-                  </a:lnTo>
-                  <a:lnTo>
-                    <a:pt x="1865934" y="173673"/>
-                  </a:lnTo>
-                  <a:lnTo>
-                    <a:pt x="1865934" y="27431"/>
-                  </a:lnTo>
-                  <a:lnTo>
-                    <a:pt x="1865578" y="23031"/>
-                  </a:lnTo>
-                  <a:lnTo>
-                    <a:pt x="1864522" y="18745"/>
-                  </a:lnTo>
-                  <a:lnTo>
-                    <a:pt x="1862791" y="14683"/>
-                  </a:lnTo>
-                  <a:lnTo>
-                    <a:pt x="1860432" y="10952"/>
-                  </a:lnTo>
-                  <a:lnTo>
-                    <a:pt x="1857504" y="7647"/>
-                  </a:lnTo>
-                  <a:lnTo>
-                    <a:pt x="1854085" y="4855"/>
-                  </a:lnTo>
-                  <a:lnTo>
-                    <a:pt x="1850261" y="2648"/>
-                  </a:lnTo>
-                  <a:lnTo>
-                    <a:pt x="1846134" y="1083"/>
-                  </a:lnTo>
-                  <a:lnTo>
-                    <a:pt x="1841808" y="200"/>
-                  </a:lnTo>
-                  <a:lnTo>
-                    <a:pt x="1838502" y="0"/>
-                  </a:lnTo>
-                  <a:lnTo>
-                    <a:pt x="27431" y="0"/>
-                  </a:lnTo>
-                  <a:lnTo>
-                    <a:pt x="30738" y="200"/>
-                  </a:lnTo>
-                  <a:lnTo>
-                    <a:pt x="26327" y="22"/>
-                  </a:lnTo>
-                  <a:lnTo>
-                    <a:pt x="21944" y="554"/>
-                  </a:lnTo>
-                  <a:lnTo>
-                    <a:pt x="17704" y="1782"/>
-                  </a:lnTo>
-                  <a:lnTo>
-                    <a:pt x="13716" y="3675"/>
-                  </a:lnTo>
-                  <a:lnTo>
-                    <a:pt x="10082" y="6183"/>
-                  </a:lnTo>
-                  <a:lnTo>
-                    <a:pt x="6898" y="9241"/>
-                  </a:lnTo>
-                  <a:lnTo>
-                    <a:pt x="4246" y="12770"/>
-                  </a:lnTo>
-                  <a:lnTo>
-                    <a:pt x="2195" y="16679"/>
-                  </a:lnTo>
-                  <a:lnTo>
-                    <a:pt x="797" y="20867"/>
-                  </a:lnTo>
-                  <a:lnTo>
-                    <a:pt x="88" y="25224"/>
-                  </a:lnTo>
-                  <a:lnTo>
-                    <a:pt x="0" y="27431"/>
-                  </a:lnTo>
-                  <a:lnTo>
-                    <a:pt x="0" y="173673"/>
-                  </a:lnTo>
-                  <a:lnTo>
-                    <a:pt x="88" y="171466"/>
-                  </a:lnTo>
-                  <a:lnTo>
-                    <a:pt x="88" y="175880"/>
-                  </a:lnTo>
-                  <a:lnTo>
-                    <a:pt x="797" y="180238"/>
-                  </a:lnTo>
-                  <a:lnTo>
-                    <a:pt x="2195" y="184425"/>
-                  </a:lnTo>
-                  <a:lnTo>
-                    <a:pt x="4246" y="188334"/>
-                  </a:lnTo>
-                  <a:lnTo>
-                    <a:pt x="6898" y="191864"/>
-                  </a:lnTo>
-                  <a:lnTo>
-                    <a:pt x="10082" y="194922"/>
-                  </a:lnTo>
-                  <a:lnTo>
-                    <a:pt x="13716" y="197430"/>
-                  </a:lnTo>
-                  <a:lnTo>
-                    <a:pt x="17704" y="199322"/>
-                  </a:lnTo>
-                  <a:lnTo>
-                    <a:pt x="21944" y="200551"/>
-                  </a:lnTo>
-                  <a:lnTo>
-                    <a:pt x="26327" y="201083"/>
-                  </a:lnTo>
-                  <a:close/>
-                </a:path>
-              </a:pathLst>
-            </a:custGeom>
-            <a:solidFill>
-              <a:srgbClr val="FFFFFF">
-                <a:alpha val="100000"/>
-              </a:srgbClr>
-            </a:solidFill>
-          </p:spPr>
-          <p:txBody>
-            <a:bodyPr/>
-            <a:lstStyle/>
-            <a:p/>
-          </p:txBody>
-        </p:sp>
-        <p:sp>
-          <p:nvSpPr>
-            <p:cNvPr id="19" name="tx17"/>
-            <p:cNvSpPr/>
-            <p:nvPr/>
-          </p:nvSpPr>
-          <p:spPr>
-            <a:xfrm>
-              <a:off x="2837748" y="3248962"/>
-              <a:ext cx="1829358" cy="213307"/>
-            </a:xfrm>
-            <a:prstGeom prst="rect">
-              <a:avLst/>
-            </a:prstGeom>
-            <a:noFill/>
-          </p:spPr>
-          <p:txBody>
-            <a:bodyPr lIns="0" rIns="0" tIns="0" bIns="0" anchorCtr="1" anchor="ctr" wrap="none"/>
-            <a:lstStyle/>
-            <a:p>
-              <a:pPr algn="l" marL="0" marR="0" indent="0">
-                <a:lnSpc>
-                  <a:spcPts val="1800"/>
-                </a:lnSpc>
-                <a:spcBef>
-                  <a:spcPts val="0"/>
-                </a:spcBef>
-                <a:spcAft>
-                  <a:spcPts val="0"/>
-                </a:spcAft>
-              </a:pPr>
-              <a:r>
-                <a:rPr sz="1800" b="1">
-                  <a:solidFill>
-                    <a:srgbClr val="3E81CE">
-                      <a:alpha val="100000"/>
-                    </a:srgbClr>
-                  </a:solidFill>
-                  <a:latin typeface="Helvetica"/>
-                  <a:cs typeface="Helvetica"/>
-                </a:rPr>
-                <a:t>EV (sold in 2022)</a:t>
-              </a:r>
-            </a:p>
-          </p:txBody>
-        </p:sp>
-        <p:sp>
-          <p:nvSpPr>
-            <p:cNvPr id="20" name="pg18"/>
-            <p:cNvSpPr/>
-            <p:nvPr/>
-          </p:nvSpPr>
-          <p:spPr>
-            <a:xfrm>
-              <a:off x="2819460" y="3279453"/>
-              <a:ext cx="1865934" cy="201105"/>
-            </a:xfrm>
-            <a:custGeom>
-              <a:avLst/>
-              <a:pathLst>
-                <a:path w="1865934" h="201105">
-                  <a:moveTo>
-                    <a:pt x="27431" y="201105"/>
-                  </a:moveTo>
-                  <a:lnTo>
-                    <a:pt x="1838502" y="201105"/>
-                  </a:lnTo>
-                  <a:lnTo>
-                    <a:pt x="1837397" y="201083"/>
-                  </a:lnTo>
-                  <a:lnTo>
-                    <a:pt x="1841808" y="200905"/>
-                  </a:lnTo>
-                  <a:lnTo>
-                    <a:pt x="1846134" y="200022"/>
-                  </a:lnTo>
-                  <a:lnTo>
-                    <a:pt x="1850261" y="198456"/>
-                  </a:lnTo>
-                  <a:lnTo>
-                    <a:pt x="1854085" y="196249"/>
-                  </a:lnTo>
-                  <a:lnTo>
-                    <a:pt x="1857504" y="193457"/>
-                  </a:lnTo>
-                  <a:lnTo>
-                    <a:pt x="1860432" y="190153"/>
-                  </a:lnTo>
-                  <a:lnTo>
-                    <a:pt x="1862791" y="186421"/>
-                  </a:lnTo>
-                  <a:lnTo>
-                    <a:pt x="1864522" y="182360"/>
-                  </a:lnTo>
-                  <a:lnTo>
-                    <a:pt x="1865578" y="178073"/>
-                  </a:lnTo>
-                  <a:lnTo>
-                    <a:pt x="1865934" y="173673"/>
-                  </a:lnTo>
-                  <a:lnTo>
-                    <a:pt x="1865934" y="27431"/>
-                  </a:lnTo>
-                  <a:lnTo>
-                    <a:pt x="1865578" y="23031"/>
-                  </a:lnTo>
-                  <a:lnTo>
-                    <a:pt x="1864522" y="18745"/>
-                  </a:lnTo>
-                  <a:lnTo>
-                    <a:pt x="1862791" y="14683"/>
-                  </a:lnTo>
-                  <a:lnTo>
-                    <a:pt x="1860432" y="10952"/>
-                  </a:lnTo>
-                  <a:lnTo>
-                    <a:pt x="1857504" y="7647"/>
-                  </a:lnTo>
-                  <a:lnTo>
-                    <a:pt x="1854085" y="4855"/>
-                  </a:lnTo>
-                  <a:lnTo>
-                    <a:pt x="1850261" y="2648"/>
-                  </a:lnTo>
-                  <a:lnTo>
-                    <a:pt x="1846134" y="1083"/>
-                  </a:lnTo>
-                  <a:lnTo>
-                    <a:pt x="1841808" y="200"/>
-                  </a:lnTo>
-                  <a:lnTo>
-                    <a:pt x="1838502" y="0"/>
-                  </a:lnTo>
-                  <a:lnTo>
-                    <a:pt x="27431" y="0"/>
-                  </a:lnTo>
-                  <a:lnTo>
-                    <a:pt x="30738" y="200"/>
-                  </a:lnTo>
-                  <a:lnTo>
-                    <a:pt x="26327" y="22"/>
-                  </a:lnTo>
-                  <a:lnTo>
-                    <a:pt x="21944" y="554"/>
-                  </a:lnTo>
-                  <a:lnTo>
-                    <a:pt x="17704" y="1782"/>
-                  </a:lnTo>
-                  <a:lnTo>
-                    <a:pt x="13716" y="3675"/>
-                  </a:lnTo>
-                  <a:lnTo>
-                    <a:pt x="10082" y="6183"/>
-                  </a:lnTo>
-                  <a:lnTo>
-                    <a:pt x="6898" y="9241"/>
-                  </a:lnTo>
-                  <a:lnTo>
-                    <a:pt x="4246" y="12770"/>
-                  </a:lnTo>
-                  <a:lnTo>
-                    <a:pt x="2195" y="16679"/>
-                  </a:lnTo>
-                  <a:lnTo>
-                    <a:pt x="797" y="20867"/>
-                  </a:lnTo>
-                  <a:lnTo>
-                    <a:pt x="88" y="25224"/>
-                  </a:lnTo>
-                  <a:lnTo>
-                    <a:pt x="0" y="27431"/>
-                  </a:lnTo>
-                  <a:lnTo>
-                    <a:pt x="0" y="173673"/>
-                  </a:lnTo>
-                  <a:lnTo>
-                    <a:pt x="88" y="171466"/>
-                  </a:lnTo>
-                  <a:lnTo>
-                    <a:pt x="88" y="175880"/>
-                  </a:lnTo>
-                  <a:lnTo>
-                    <a:pt x="797" y="180238"/>
-                  </a:lnTo>
-                  <a:lnTo>
-                    <a:pt x="2195" y="184425"/>
-                  </a:lnTo>
-                  <a:lnTo>
-                    <a:pt x="4246" y="188334"/>
-                  </a:lnTo>
-                  <a:lnTo>
-                    <a:pt x="6898" y="191864"/>
-                  </a:lnTo>
-                  <a:lnTo>
-                    <a:pt x="10082" y="194922"/>
-                  </a:lnTo>
-                  <a:lnTo>
-                    <a:pt x="13716" y="197430"/>
-                  </a:lnTo>
-                  <a:lnTo>
-                    <a:pt x="17704" y="199322"/>
-                  </a:lnTo>
-                  <a:lnTo>
-                    <a:pt x="21944" y="200551"/>
-                  </a:lnTo>
-                  <a:lnTo>
-                    <a:pt x="26327" y="201083"/>
-                  </a:lnTo>
-                  <a:close/>
-                </a:path>
-              </a:pathLst>
-            </a:custGeom>
-            <a:solidFill>
-              <a:srgbClr val="FFFFFF">
-                <a:alpha val="100000"/>
-              </a:srgbClr>
-            </a:solidFill>
-          </p:spPr>
-          <p:txBody>
-            <a:bodyPr/>
-            <a:lstStyle/>
-            <a:p/>
-          </p:txBody>
-        </p:sp>
-        <p:sp>
-          <p:nvSpPr>
-            <p:cNvPr id="21" name="tx19"/>
-            <p:cNvSpPr/>
-            <p:nvPr/>
-          </p:nvSpPr>
-          <p:spPr>
-            <a:xfrm>
-              <a:off x="2837748" y="3248962"/>
-              <a:ext cx="1829358" cy="213307"/>
-            </a:xfrm>
-            <a:prstGeom prst="rect">
-              <a:avLst/>
-            </a:prstGeom>
-            <a:noFill/>
-          </p:spPr>
-          <p:txBody>
-            <a:bodyPr lIns="0" rIns="0" tIns="0" bIns="0" anchorCtr="1" anchor="ctr" wrap="none"/>
-            <a:lstStyle/>
-            <a:p>
-              <a:pPr algn="l" marL="0" marR="0" indent="0">
-                <a:lnSpc>
-                  <a:spcPts val="1800"/>
-                </a:lnSpc>
-                <a:spcBef>
-                  <a:spcPts val="0"/>
-                </a:spcBef>
-                <a:spcAft>
-                  <a:spcPts val="0"/>
-                </a:spcAft>
-              </a:pPr>
-              <a:r>
-                <a:rPr sz="1800" b="1">
-                  <a:solidFill>
-                    <a:srgbClr val="3E81CE">
-                      <a:alpha val="100000"/>
-                    </a:srgbClr>
-                  </a:solidFill>
-                  <a:latin typeface="Helvetica"/>
-                  <a:cs typeface="Helvetica"/>
-                </a:rPr>
-                <a:t>EV (sold in 2022)</a:t>
-              </a:r>
-            </a:p>
-          </p:txBody>
-        </p:sp>
-        <p:sp>
-          <p:nvSpPr>
-            <p:cNvPr id="22" name="pg20"/>
-            <p:cNvSpPr/>
-            <p:nvPr/>
-          </p:nvSpPr>
-          <p:spPr>
-            <a:xfrm>
-              <a:off x="2819460" y="3279453"/>
-              <a:ext cx="1865934" cy="201105"/>
-            </a:xfrm>
-            <a:custGeom>
-              <a:avLst/>
-              <a:pathLst>
-                <a:path w="1865934" h="201105">
-                  <a:moveTo>
-                    <a:pt x="27431" y="201105"/>
-                  </a:moveTo>
-                  <a:lnTo>
-                    <a:pt x="1838502" y="201105"/>
-                  </a:lnTo>
-                  <a:lnTo>
-                    <a:pt x="1837397" y="201083"/>
-                  </a:lnTo>
-                  <a:lnTo>
-                    <a:pt x="1841808" y="200905"/>
-                  </a:lnTo>
-                  <a:lnTo>
-                    <a:pt x="1846134" y="200022"/>
-                  </a:lnTo>
-                  <a:lnTo>
-                    <a:pt x="1850261" y="198456"/>
-                  </a:lnTo>
-                  <a:lnTo>
-                    <a:pt x="1854085" y="196249"/>
-                  </a:lnTo>
-                  <a:lnTo>
-                    <a:pt x="1857504" y="193457"/>
-                  </a:lnTo>
-                  <a:lnTo>
-                    <a:pt x="1860432" y="190153"/>
-                  </a:lnTo>
-                  <a:lnTo>
-                    <a:pt x="1862791" y="186421"/>
-                  </a:lnTo>
-                  <a:lnTo>
-                    <a:pt x="1864522" y="182360"/>
-                  </a:lnTo>
-                  <a:lnTo>
-                    <a:pt x="1865578" y="178073"/>
-                  </a:lnTo>
-                  <a:lnTo>
-                    <a:pt x="1865934" y="173673"/>
-                  </a:lnTo>
-                  <a:lnTo>
-                    <a:pt x="1865934" y="27431"/>
-                  </a:lnTo>
-                  <a:lnTo>
-                    <a:pt x="1865578" y="23031"/>
-                  </a:lnTo>
-                  <a:lnTo>
-                    <a:pt x="1864522" y="18745"/>
-                  </a:lnTo>
-                  <a:lnTo>
-                    <a:pt x="1862791" y="14683"/>
-                  </a:lnTo>
-                  <a:lnTo>
-                    <a:pt x="1860432" y="10952"/>
-                  </a:lnTo>
-                  <a:lnTo>
-                    <a:pt x="1857504" y="7647"/>
-                  </a:lnTo>
-                  <a:lnTo>
-                    <a:pt x="1854085" y="4855"/>
-                  </a:lnTo>
-                  <a:lnTo>
-                    <a:pt x="1850261" y="2648"/>
-                  </a:lnTo>
-                  <a:lnTo>
-                    <a:pt x="1846134" y="1083"/>
-                  </a:lnTo>
-                  <a:lnTo>
-                    <a:pt x="1841808" y="200"/>
-                  </a:lnTo>
-                  <a:lnTo>
-                    <a:pt x="1838502" y="0"/>
-                  </a:lnTo>
-                  <a:lnTo>
-                    <a:pt x="27431" y="0"/>
-                  </a:lnTo>
-                  <a:lnTo>
-                    <a:pt x="30738" y="200"/>
-                  </a:lnTo>
-                  <a:lnTo>
-                    <a:pt x="26327" y="22"/>
-                  </a:lnTo>
-                  <a:lnTo>
-                    <a:pt x="21944" y="554"/>
-                  </a:lnTo>
-                  <a:lnTo>
-                    <a:pt x="17704" y="1782"/>
-                  </a:lnTo>
-                  <a:lnTo>
-                    <a:pt x="13716" y="3675"/>
-                  </a:lnTo>
-                  <a:lnTo>
-                    <a:pt x="10082" y="6183"/>
-                  </a:lnTo>
-                  <a:lnTo>
-                    <a:pt x="6898" y="9241"/>
-                  </a:lnTo>
-                  <a:lnTo>
-                    <a:pt x="4246" y="12770"/>
-                  </a:lnTo>
-                  <a:lnTo>
-                    <a:pt x="2195" y="16679"/>
-                  </a:lnTo>
-                  <a:lnTo>
-                    <a:pt x="797" y="20867"/>
-                  </a:lnTo>
-                  <a:lnTo>
-                    <a:pt x="88" y="25224"/>
-                  </a:lnTo>
-                  <a:lnTo>
-                    <a:pt x="0" y="27431"/>
-                  </a:lnTo>
-                  <a:lnTo>
-                    <a:pt x="0" y="173673"/>
-                  </a:lnTo>
-                  <a:lnTo>
-                    <a:pt x="88" y="171466"/>
-                  </a:lnTo>
-                  <a:lnTo>
-                    <a:pt x="88" y="175880"/>
-                  </a:lnTo>
-                  <a:lnTo>
-                    <a:pt x="797" y="180238"/>
-                  </a:lnTo>
-                  <a:lnTo>
-                    <a:pt x="2195" y="184425"/>
-                  </a:lnTo>
-                  <a:lnTo>
-                    <a:pt x="4246" y="188334"/>
-                  </a:lnTo>
-                  <a:lnTo>
-                    <a:pt x="6898" y="191864"/>
-                  </a:lnTo>
-                  <a:lnTo>
-                    <a:pt x="10082" y="194922"/>
-                  </a:lnTo>
-                  <a:lnTo>
-                    <a:pt x="13716" y="197430"/>
-                  </a:lnTo>
-                  <a:lnTo>
-                    <a:pt x="17704" y="199322"/>
-                  </a:lnTo>
-                  <a:lnTo>
-                    <a:pt x="21944" y="200551"/>
-                  </a:lnTo>
-                  <a:lnTo>
-                    <a:pt x="26327" y="201083"/>
-                  </a:lnTo>
-                  <a:close/>
-                </a:path>
-              </a:pathLst>
-            </a:custGeom>
-            <a:solidFill>
-              <a:srgbClr val="FFFFFF">
-                <a:alpha val="100000"/>
-              </a:srgbClr>
-            </a:solidFill>
-          </p:spPr>
-          <p:txBody>
-            <a:bodyPr/>
-            <a:lstStyle/>
-            <a:p/>
-          </p:txBody>
-        </p:sp>
-        <p:sp>
-          <p:nvSpPr>
-            <p:cNvPr id="23" name="tx21"/>
-            <p:cNvSpPr/>
-            <p:nvPr/>
-          </p:nvSpPr>
-          <p:spPr>
-            <a:xfrm>
-              <a:off x="2837748" y="3248962"/>
-              <a:ext cx="1829358" cy="213307"/>
-            </a:xfrm>
-            <a:prstGeom prst="rect">
-              <a:avLst/>
-            </a:prstGeom>
-            <a:noFill/>
-          </p:spPr>
-          <p:txBody>
-            <a:bodyPr lIns="0" rIns="0" tIns="0" bIns="0" anchorCtr="1" anchor="ctr" wrap="none"/>
-            <a:lstStyle/>
-            <a:p>
-              <a:pPr algn="l" marL="0" marR="0" indent="0">
-                <a:lnSpc>
-                  <a:spcPts val="1800"/>
-                </a:lnSpc>
-                <a:spcBef>
-                  <a:spcPts val="0"/>
-                </a:spcBef>
-                <a:spcAft>
-                  <a:spcPts val="0"/>
-                </a:spcAft>
-              </a:pPr>
-              <a:r>
-                <a:rPr sz="1800" b="1">
-                  <a:solidFill>
-                    <a:srgbClr val="3E81CE">
-                      <a:alpha val="100000"/>
-                    </a:srgbClr>
-                  </a:solidFill>
-                  <a:latin typeface="Helvetica"/>
-                  <a:cs typeface="Helvetica"/>
-                </a:rPr>
-                <a:t>EV (sold in 2022)</a:t>
-              </a:r>
-            </a:p>
-          </p:txBody>
-        </p:sp>
-        <p:sp>
-          <p:nvSpPr>
-            <p:cNvPr id="24" name="pg22"/>
-            <p:cNvSpPr/>
-            <p:nvPr/>
-          </p:nvSpPr>
-          <p:spPr>
-            <a:xfrm>
-              <a:off x="2819460" y="3279453"/>
-              <a:ext cx="1865934" cy="201105"/>
-            </a:xfrm>
-            <a:custGeom>
-              <a:avLst/>
-              <a:pathLst>
-                <a:path w="1865934" h="201105">
-                  <a:moveTo>
-                    <a:pt x="27431" y="201105"/>
-                  </a:moveTo>
-                  <a:lnTo>
-                    <a:pt x="1838502" y="201105"/>
-                  </a:lnTo>
-                  <a:lnTo>
-                    <a:pt x="1837397" y="201083"/>
-                  </a:lnTo>
-                  <a:lnTo>
-                    <a:pt x="1841808" y="200905"/>
-                  </a:lnTo>
-                  <a:lnTo>
-                    <a:pt x="1846134" y="200022"/>
-                  </a:lnTo>
-                  <a:lnTo>
-                    <a:pt x="1850261" y="198456"/>
-                  </a:lnTo>
-                  <a:lnTo>
-                    <a:pt x="1854085" y="196249"/>
-                  </a:lnTo>
-                  <a:lnTo>
-                    <a:pt x="1857504" y="193457"/>
-                  </a:lnTo>
-                  <a:lnTo>
-                    <a:pt x="1860432" y="190153"/>
-                  </a:lnTo>
-                  <a:lnTo>
-                    <a:pt x="1862791" y="186421"/>
-                  </a:lnTo>
-                  <a:lnTo>
-                    <a:pt x="1864522" y="182360"/>
-                  </a:lnTo>
-                  <a:lnTo>
-                    <a:pt x="1865578" y="178073"/>
-                  </a:lnTo>
-                  <a:lnTo>
-                    <a:pt x="1865934" y="173673"/>
-                  </a:lnTo>
-                  <a:lnTo>
-                    <a:pt x="1865934" y="27431"/>
-                  </a:lnTo>
-                  <a:lnTo>
-                    <a:pt x="1865578" y="23031"/>
-                  </a:lnTo>
-                  <a:lnTo>
-                    <a:pt x="1864522" y="18745"/>
-                  </a:lnTo>
-                  <a:lnTo>
-                    <a:pt x="1862791" y="14683"/>
-                  </a:lnTo>
-                  <a:lnTo>
-                    <a:pt x="1860432" y="10952"/>
-                  </a:lnTo>
-                  <a:lnTo>
-                    <a:pt x="1857504" y="7647"/>
-                  </a:lnTo>
-                  <a:lnTo>
-                    <a:pt x="1854085" y="4855"/>
-                  </a:lnTo>
-                  <a:lnTo>
-                    <a:pt x="1850261" y="2648"/>
-                  </a:lnTo>
-                  <a:lnTo>
-                    <a:pt x="1846134" y="1083"/>
-                  </a:lnTo>
-                  <a:lnTo>
-                    <a:pt x="1841808" y="200"/>
-                  </a:lnTo>
-                  <a:lnTo>
-                    <a:pt x="1838502" y="0"/>
-                  </a:lnTo>
-                  <a:lnTo>
-                    <a:pt x="27431" y="0"/>
-                  </a:lnTo>
-                  <a:lnTo>
-                    <a:pt x="30738" y="200"/>
-                  </a:lnTo>
-                  <a:lnTo>
-                    <a:pt x="26327" y="22"/>
-                  </a:lnTo>
-                  <a:lnTo>
-                    <a:pt x="21944" y="554"/>
-                  </a:lnTo>
-                  <a:lnTo>
-                    <a:pt x="17704" y="1782"/>
-                  </a:lnTo>
-                  <a:lnTo>
-                    <a:pt x="13716" y="3675"/>
-                  </a:lnTo>
-                  <a:lnTo>
-                    <a:pt x="10082" y="6183"/>
-                  </a:lnTo>
-                  <a:lnTo>
-                    <a:pt x="6898" y="9241"/>
-                  </a:lnTo>
-                  <a:lnTo>
-                    <a:pt x="4246" y="12770"/>
-                  </a:lnTo>
-                  <a:lnTo>
-                    <a:pt x="2195" y="16679"/>
-                  </a:lnTo>
-                  <a:lnTo>
-                    <a:pt x="797" y="20867"/>
-                  </a:lnTo>
-                  <a:lnTo>
-                    <a:pt x="88" y="25224"/>
-                  </a:lnTo>
-                  <a:lnTo>
-                    <a:pt x="0" y="27431"/>
-                  </a:lnTo>
-                  <a:lnTo>
-                    <a:pt x="0" y="173673"/>
-                  </a:lnTo>
-                  <a:lnTo>
-                    <a:pt x="88" y="171466"/>
-                  </a:lnTo>
-                  <a:lnTo>
-                    <a:pt x="88" y="175880"/>
-                  </a:lnTo>
-                  <a:lnTo>
-                    <a:pt x="797" y="180238"/>
-                  </a:lnTo>
-                  <a:lnTo>
-                    <a:pt x="2195" y="184425"/>
-                  </a:lnTo>
-                  <a:lnTo>
-                    <a:pt x="4246" y="188334"/>
-                  </a:lnTo>
-                  <a:lnTo>
-                    <a:pt x="6898" y="191864"/>
-                  </a:lnTo>
-                  <a:lnTo>
-                    <a:pt x="10082" y="194922"/>
-                  </a:lnTo>
-                  <a:lnTo>
-                    <a:pt x="13716" y="197430"/>
-                  </a:lnTo>
-                  <a:lnTo>
-                    <a:pt x="17704" y="199322"/>
-                  </a:lnTo>
-                  <a:lnTo>
-                    <a:pt x="21944" y="200551"/>
-                  </a:lnTo>
-                  <a:lnTo>
-                    <a:pt x="26327" y="201083"/>
-                  </a:lnTo>
-                  <a:close/>
-                </a:path>
-              </a:pathLst>
-            </a:custGeom>
-            <a:solidFill>
-              <a:srgbClr val="FFFFFF">
-                <a:alpha val="100000"/>
-              </a:srgbClr>
-            </a:solidFill>
-          </p:spPr>
-          <p:txBody>
-            <a:bodyPr/>
-            <a:lstStyle/>
-            <a:p/>
-          </p:txBody>
-        </p:sp>
-        <p:sp>
-          <p:nvSpPr>
-            <p:cNvPr id="25" name="tx23"/>
-            <p:cNvSpPr/>
-            <p:nvPr/>
-          </p:nvSpPr>
-          <p:spPr>
-            <a:xfrm>
-              <a:off x="2837748" y="3248962"/>
-              <a:ext cx="1829358" cy="213307"/>
-            </a:xfrm>
-            <a:prstGeom prst="rect">
-              <a:avLst/>
-            </a:prstGeom>
-            <a:noFill/>
-          </p:spPr>
-          <p:txBody>
-            <a:bodyPr lIns="0" rIns="0" tIns="0" bIns="0" anchorCtr="1" anchor="ctr" wrap="none"/>
-            <a:lstStyle/>
-            <a:p>
-              <a:pPr algn="l" marL="0" marR="0" indent="0">
-                <a:lnSpc>
-                  <a:spcPts val="1800"/>
-                </a:lnSpc>
-                <a:spcBef>
-                  <a:spcPts val="0"/>
-                </a:spcBef>
-                <a:spcAft>
-                  <a:spcPts val="0"/>
-                </a:spcAft>
-              </a:pPr>
-              <a:r>
-                <a:rPr sz="1800" b="1">
-                  <a:solidFill>
-                    <a:srgbClr val="3E81CE">
-                      <a:alpha val="100000"/>
-                    </a:srgbClr>
-                  </a:solidFill>
-                  <a:latin typeface="Helvetica"/>
-                  <a:cs typeface="Helvetica"/>
-                </a:rPr>
-                <a:t>EV (sold in 2022)</a:t>
-              </a:r>
-            </a:p>
-          </p:txBody>
-        </p:sp>
-        <p:sp>
-          <p:nvSpPr>
-            <p:cNvPr id="26" name="pg24"/>
-            <p:cNvSpPr/>
-            <p:nvPr/>
-          </p:nvSpPr>
-          <p:spPr>
-            <a:xfrm>
-              <a:off x="2819460" y="3279453"/>
-              <a:ext cx="1865934" cy="201105"/>
-            </a:xfrm>
-            <a:custGeom>
-              <a:avLst/>
-              <a:pathLst>
-                <a:path w="1865934" h="201105">
-                  <a:moveTo>
-                    <a:pt x="27431" y="201105"/>
-                  </a:moveTo>
-                  <a:lnTo>
-                    <a:pt x="1838502" y="201105"/>
-                  </a:lnTo>
-                  <a:lnTo>
-                    <a:pt x="1837397" y="201083"/>
-                  </a:lnTo>
-                  <a:lnTo>
-                    <a:pt x="1841808" y="200905"/>
-                  </a:lnTo>
-                  <a:lnTo>
-                    <a:pt x="1846134" y="200022"/>
-                  </a:lnTo>
-                  <a:lnTo>
-                    <a:pt x="1850261" y="198456"/>
-                  </a:lnTo>
-                  <a:lnTo>
-                    <a:pt x="1854085" y="196249"/>
-                  </a:lnTo>
-                  <a:lnTo>
-                    <a:pt x="1857504" y="193457"/>
-                  </a:lnTo>
-                  <a:lnTo>
-                    <a:pt x="1860432" y="190153"/>
-                  </a:lnTo>
-                  <a:lnTo>
-                    <a:pt x="1862791" y="186421"/>
-                  </a:lnTo>
-                  <a:lnTo>
-                    <a:pt x="1864522" y="182360"/>
-                  </a:lnTo>
-                  <a:lnTo>
-                    <a:pt x="1865578" y="178073"/>
-                  </a:lnTo>
-                  <a:lnTo>
-                    <a:pt x="1865934" y="173673"/>
-                  </a:lnTo>
-                  <a:lnTo>
-                    <a:pt x="1865934" y="27431"/>
-                  </a:lnTo>
-                  <a:lnTo>
-                    <a:pt x="1865578" y="23031"/>
-                  </a:lnTo>
-                  <a:lnTo>
-                    <a:pt x="1864522" y="18745"/>
-                  </a:lnTo>
-                  <a:lnTo>
-                    <a:pt x="1862791" y="14683"/>
-                  </a:lnTo>
-                  <a:lnTo>
-                    <a:pt x="1860432" y="10952"/>
-                  </a:lnTo>
-                  <a:lnTo>
-                    <a:pt x="1857504" y="7647"/>
-                  </a:lnTo>
-                  <a:lnTo>
-                    <a:pt x="1854085" y="4855"/>
-                  </a:lnTo>
-                  <a:lnTo>
-                    <a:pt x="1850261" y="2648"/>
-                  </a:lnTo>
-                  <a:lnTo>
-                    <a:pt x="1846134" y="1083"/>
-                  </a:lnTo>
-                  <a:lnTo>
-                    <a:pt x="1841808" y="200"/>
-                  </a:lnTo>
-                  <a:lnTo>
-                    <a:pt x="1838502" y="0"/>
-                  </a:lnTo>
-                  <a:lnTo>
-                    <a:pt x="27431" y="0"/>
-                  </a:lnTo>
-                  <a:lnTo>
-                    <a:pt x="30738" y="200"/>
-                  </a:lnTo>
-                  <a:lnTo>
-                    <a:pt x="26327" y="22"/>
-                  </a:lnTo>
-                  <a:lnTo>
-                    <a:pt x="21944" y="554"/>
-                  </a:lnTo>
-                  <a:lnTo>
-                    <a:pt x="17704" y="1782"/>
-                  </a:lnTo>
-                  <a:lnTo>
-                    <a:pt x="13716" y="3675"/>
-                  </a:lnTo>
-                  <a:lnTo>
-                    <a:pt x="10082" y="6183"/>
-                  </a:lnTo>
-                  <a:lnTo>
-                    <a:pt x="6898" y="9241"/>
-                  </a:lnTo>
-                  <a:lnTo>
-                    <a:pt x="4246" y="12770"/>
-                  </a:lnTo>
-                  <a:lnTo>
-                    <a:pt x="2195" y="16679"/>
-                  </a:lnTo>
-                  <a:lnTo>
-                    <a:pt x="797" y="20867"/>
-                  </a:lnTo>
-                  <a:lnTo>
-                    <a:pt x="88" y="25224"/>
-                  </a:lnTo>
-                  <a:lnTo>
-                    <a:pt x="0" y="27431"/>
-                  </a:lnTo>
-                  <a:lnTo>
-                    <a:pt x="0" y="173673"/>
-                  </a:lnTo>
-                  <a:lnTo>
-                    <a:pt x="88" y="171466"/>
-                  </a:lnTo>
-                  <a:lnTo>
-                    <a:pt x="88" y="175880"/>
-                  </a:lnTo>
-                  <a:lnTo>
-                    <a:pt x="797" y="180238"/>
-                  </a:lnTo>
-                  <a:lnTo>
-                    <a:pt x="2195" y="184425"/>
-                  </a:lnTo>
-                  <a:lnTo>
-                    <a:pt x="4246" y="188334"/>
-                  </a:lnTo>
-                  <a:lnTo>
-                    <a:pt x="6898" y="191864"/>
-                  </a:lnTo>
-                  <a:lnTo>
-                    <a:pt x="10082" y="194922"/>
-                  </a:lnTo>
-                  <a:lnTo>
-                    <a:pt x="13716" y="197430"/>
-                  </a:lnTo>
-                  <a:lnTo>
-                    <a:pt x="17704" y="199322"/>
-                  </a:lnTo>
-                  <a:lnTo>
-                    <a:pt x="21944" y="200551"/>
-                  </a:lnTo>
-                  <a:lnTo>
-                    <a:pt x="26327" y="201083"/>
-                  </a:lnTo>
-                  <a:close/>
-                </a:path>
-              </a:pathLst>
-            </a:custGeom>
-            <a:solidFill>
-              <a:srgbClr val="FFFFFF">
-                <a:alpha val="100000"/>
-              </a:srgbClr>
-            </a:solidFill>
-          </p:spPr>
-          <p:txBody>
-            <a:bodyPr/>
-            <a:lstStyle/>
-            <a:p/>
-          </p:txBody>
-        </p:sp>
-        <p:sp>
-          <p:nvSpPr>
-            <p:cNvPr id="27" name="tx25"/>
-            <p:cNvSpPr/>
-            <p:nvPr/>
-          </p:nvSpPr>
-          <p:spPr>
-            <a:xfrm>
-              <a:off x="2837748" y="3248962"/>
-              <a:ext cx="1829358" cy="213307"/>
-            </a:xfrm>
-            <a:prstGeom prst="rect">
-              <a:avLst/>
-            </a:prstGeom>
-            <a:noFill/>
-          </p:spPr>
-          <p:txBody>
-            <a:bodyPr lIns="0" rIns="0" tIns="0" bIns="0" anchorCtr="1" anchor="ctr" wrap="none"/>
-            <a:lstStyle/>
-            <a:p>
-              <a:pPr algn="l" marL="0" marR="0" indent="0">
-                <a:lnSpc>
-                  <a:spcPts val="1800"/>
-                </a:lnSpc>
-                <a:spcBef>
-                  <a:spcPts val="0"/>
-                </a:spcBef>
-                <a:spcAft>
-                  <a:spcPts val="0"/>
-                </a:spcAft>
-              </a:pPr>
-              <a:r>
-                <a:rPr sz="1800" b="1">
-                  <a:solidFill>
-                    <a:srgbClr val="3E81CE">
-                      <a:alpha val="100000"/>
-                    </a:srgbClr>
-                  </a:solidFill>
-                  <a:latin typeface="Helvetica"/>
-                  <a:cs typeface="Helvetica"/>
-                </a:rPr>
-                <a:t>EV (sold in 2022)</a:t>
-              </a:r>
-            </a:p>
-          </p:txBody>
-        </p:sp>
-        <p:sp>
-          <p:nvSpPr>
-            <p:cNvPr id="28" name="pg26"/>
-            <p:cNvSpPr/>
-            <p:nvPr/>
-          </p:nvSpPr>
-          <p:spPr>
-            <a:xfrm>
-              <a:off x="3367771" y="2662847"/>
-              <a:ext cx="710097" cy="201105"/>
-            </a:xfrm>
-            <a:custGeom>
-              <a:avLst/>
-              <a:pathLst>
-                <a:path w="710097" h="201105">
-                  <a:moveTo>
-                    <a:pt x="27432" y="201105"/>
-                  </a:moveTo>
-                  <a:lnTo>
-                    <a:pt x="682665" y="201105"/>
-                  </a:lnTo>
-                  <a:lnTo>
-                    <a:pt x="681561" y="201083"/>
-                  </a:lnTo>
-                  <a:lnTo>
-                    <a:pt x="685972" y="200905"/>
-                  </a:lnTo>
-                  <a:lnTo>
-                    <a:pt x="690297" y="200022"/>
-                  </a:lnTo>
-                  <a:lnTo>
-                    <a:pt x="694425" y="198456"/>
-                  </a:lnTo>
-                  <a:lnTo>
-                    <a:pt x="698248" y="196249"/>
-                  </a:lnTo>
-                  <a:lnTo>
-                    <a:pt x="701668" y="193457"/>
-                  </a:lnTo>
-                  <a:lnTo>
-                    <a:pt x="704595" y="190153"/>
-                  </a:lnTo>
-                  <a:lnTo>
-                    <a:pt x="706955" y="186421"/>
-                  </a:lnTo>
-                  <a:lnTo>
-                    <a:pt x="708685" y="182360"/>
-                  </a:lnTo>
-                  <a:lnTo>
-                    <a:pt x="709742" y="178073"/>
-                  </a:lnTo>
-                  <a:lnTo>
-                    <a:pt x="710097" y="173673"/>
-                  </a:lnTo>
-                  <a:lnTo>
-                    <a:pt x="710097" y="27431"/>
-                  </a:lnTo>
-                  <a:lnTo>
-                    <a:pt x="709742" y="23031"/>
-                  </a:lnTo>
-                  <a:lnTo>
-                    <a:pt x="708685" y="18745"/>
-                  </a:lnTo>
-                  <a:lnTo>
-                    <a:pt x="706955" y="14683"/>
-                  </a:lnTo>
-                  <a:lnTo>
-                    <a:pt x="704595" y="10952"/>
-                  </a:lnTo>
-                  <a:lnTo>
-                    <a:pt x="701668" y="7647"/>
-                  </a:lnTo>
-                  <a:lnTo>
-                    <a:pt x="698248" y="4855"/>
-                  </a:lnTo>
-                  <a:lnTo>
-                    <a:pt x="694425" y="2648"/>
-                  </a:lnTo>
-                  <a:lnTo>
-                    <a:pt x="690297" y="1083"/>
-                  </a:lnTo>
-                  <a:lnTo>
-                    <a:pt x="685972" y="200"/>
-                  </a:lnTo>
-                  <a:lnTo>
-                    <a:pt x="682665" y="0"/>
-                  </a:lnTo>
-                  <a:lnTo>
-                    <a:pt x="27432" y="0"/>
-                  </a:lnTo>
-                  <a:lnTo>
-                    <a:pt x="30738" y="200"/>
-                  </a:lnTo>
-                  <a:lnTo>
-                    <a:pt x="26327" y="22"/>
-                  </a:lnTo>
-                  <a:lnTo>
-                    <a:pt x="21944" y="554"/>
-                  </a:lnTo>
-                  <a:lnTo>
-                    <a:pt x="17704" y="1782"/>
-                  </a:lnTo>
-                  <a:lnTo>
-                    <a:pt x="13716" y="3675"/>
-                  </a:lnTo>
-                  <a:lnTo>
-                    <a:pt x="10082" y="6183"/>
-                  </a:lnTo>
-                  <a:lnTo>
-                    <a:pt x="6898" y="9241"/>
-                  </a:lnTo>
-                  <a:lnTo>
-                    <a:pt x="4246" y="12770"/>
-                  </a:lnTo>
-                  <a:lnTo>
-                    <a:pt x="2195" y="16679"/>
-                  </a:lnTo>
-                  <a:lnTo>
-                    <a:pt x="797" y="20867"/>
-                  </a:lnTo>
-                  <a:lnTo>
-                    <a:pt x="88" y="25224"/>
-                  </a:lnTo>
-                  <a:lnTo>
-                    <a:pt x="0" y="27431"/>
-                  </a:lnTo>
-                  <a:lnTo>
-                    <a:pt x="0" y="173673"/>
-                  </a:lnTo>
-                  <a:lnTo>
-                    <a:pt x="88" y="171466"/>
-                  </a:lnTo>
-                  <a:lnTo>
-                    <a:pt x="88" y="175880"/>
-                  </a:lnTo>
-                  <a:lnTo>
-                    <a:pt x="797" y="180238"/>
-                  </a:lnTo>
-                  <a:lnTo>
-                    <a:pt x="2195" y="184425"/>
-                  </a:lnTo>
-                  <a:lnTo>
-                    <a:pt x="4246" y="188334"/>
-                  </a:lnTo>
-                  <a:lnTo>
-                    <a:pt x="6898" y="191864"/>
-                  </a:lnTo>
-                  <a:lnTo>
-                    <a:pt x="10082" y="194922"/>
-                  </a:lnTo>
-                  <a:lnTo>
-                    <a:pt x="13716" y="197430"/>
-                  </a:lnTo>
-                  <a:lnTo>
-                    <a:pt x="17704" y="199322"/>
-                  </a:lnTo>
-                  <a:lnTo>
-                    <a:pt x="21944" y="200551"/>
-                  </a:lnTo>
-                  <a:lnTo>
-                    <a:pt x="26327" y="201083"/>
-                  </a:lnTo>
-                  <a:close/>
-                </a:path>
-              </a:pathLst>
-            </a:custGeom>
-            <a:solidFill>
-              <a:srgbClr val="FFFFFF">
-                <a:alpha val="100000"/>
-              </a:srgbClr>
-            </a:solidFill>
-          </p:spPr>
-          <p:txBody>
-            <a:bodyPr/>
-            <a:lstStyle/>
-            <a:p/>
-          </p:txBody>
-        </p:sp>
-        <p:sp>
-          <p:nvSpPr>
-            <p:cNvPr id="29" name="tx27"/>
-            <p:cNvSpPr/>
-            <p:nvPr/>
-          </p:nvSpPr>
-          <p:spPr>
-            <a:xfrm>
-              <a:off x="3386059" y="2676000"/>
+              <a:off x="3225937" y="2676000"/>
               <a:ext cx="673521" cy="169664"/>
             </a:xfrm>
             <a:prstGeom prst="rect">
@@ -5683,13 +4339,13 @@
         </p:sp>
         <p:sp>
           <p:nvSpPr>
-            <p:cNvPr id="30" name="pg28"/>
+            <p:cNvPr id="18" name="pg16"/>
             <p:cNvSpPr/>
             <p:nvPr/>
           </p:nvSpPr>
           <p:spPr>
             <a:xfrm>
-              <a:off x="3367771" y="2662847"/>
+              <a:off x="3207649" y="2662847"/>
               <a:ext cx="710097" cy="201105"/>
             </a:xfrm>
             <a:custGeom>
@@ -5697,7 +4353,7 @@
               <a:pathLst>
                 <a:path w="710097" h="201105">
                   <a:moveTo>
-                    <a:pt x="27432" y="201105"/>
+                    <a:pt x="27431" y="201105"/>
                   </a:moveTo>
                   <a:lnTo>
                     <a:pt x="682665" y="201105"/>
@@ -5769,7 +4425,7 @@
                     <a:pt x="682665" y="0"/>
                   </a:lnTo>
                   <a:lnTo>
-                    <a:pt x="27432" y="0"/>
+                    <a:pt x="27431" y="0"/>
                   </a:lnTo>
                   <a:lnTo>
                     <a:pt x="30738" y="200"/>
@@ -5784,7 +4440,7 @@
                     <a:pt x="17704" y="1782"/>
                   </a:lnTo>
                   <a:lnTo>
-                    <a:pt x="13716" y="3675"/>
+                    <a:pt x="13715" y="3675"/>
                   </a:lnTo>
                   <a:lnTo>
                     <a:pt x="10082" y="6183"/>
@@ -5832,7 +4488,7 @@
                     <a:pt x="10082" y="194922"/>
                   </a:lnTo>
                   <a:lnTo>
-                    <a:pt x="13716" y="197430"/>
+                    <a:pt x="13715" y="197430"/>
                   </a:lnTo>
                   <a:lnTo>
                     <a:pt x="17704" y="199322"/>
@@ -5861,13 +4517,13 @@
         </p:sp>
         <p:sp>
           <p:nvSpPr>
-            <p:cNvPr id="31" name="tx29"/>
+            <p:cNvPr id="19" name="tx17"/>
             <p:cNvSpPr/>
             <p:nvPr/>
           </p:nvSpPr>
           <p:spPr>
             <a:xfrm>
-              <a:off x="3386059" y="2676000"/>
+              <a:off x="3225937" y="2676000"/>
               <a:ext cx="673521" cy="169664"/>
             </a:xfrm>
             <a:prstGeom prst="rect">
@@ -5907,13 +4563,13 @@
         </p:sp>
         <p:sp>
           <p:nvSpPr>
-            <p:cNvPr id="32" name="pg30"/>
+            <p:cNvPr id="20" name="pg18"/>
             <p:cNvSpPr/>
             <p:nvPr/>
           </p:nvSpPr>
           <p:spPr>
             <a:xfrm>
-              <a:off x="3367771" y="2662847"/>
+              <a:off x="3207649" y="2662847"/>
               <a:ext cx="710097" cy="201105"/>
             </a:xfrm>
             <a:custGeom>
@@ -5921,7 +4577,7 @@
               <a:pathLst>
                 <a:path w="710097" h="201105">
                   <a:moveTo>
-                    <a:pt x="27432" y="201105"/>
+                    <a:pt x="27431" y="201105"/>
                   </a:moveTo>
                   <a:lnTo>
                     <a:pt x="682665" y="201105"/>
@@ -5993,7 +4649,7 @@
                     <a:pt x="682665" y="0"/>
                   </a:lnTo>
                   <a:lnTo>
-                    <a:pt x="27432" y="0"/>
+                    <a:pt x="27431" y="0"/>
                   </a:lnTo>
                   <a:lnTo>
                     <a:pt x="30738" y="200"/>
@@ -6008,7 +4664,7 @@
                     <a:pt x="17704" y="1782"/>
                   </a:lnTo>
                   <a:lnTo>
-                    <a:pt x="13716" y="3675"/>
+                    <a:pt x="13715" y="3675"/>
                   </a:lnTo>
                   <a:lnTo>
                     <a:pt x="10082" y="6183"/>
@@ -6056,7 +4712,7 @@
                     <a:pt x="10082" y="194922"/>
                   </a:lnTo>
                   <a:lnTo>
-                    <a:pt x="13716" y="197430"/>
+                    <a:pt x="13715" y="197430"/>
                   </a:lnTo>
                   <a:lnTo>
                     <a:pt x="17704" y="199322"/>
@@ -6085,13 +4741,13 @@
         </p:sp>
         <p:sp>
           <p:nvSpPr>
-            <p:cNvPr id="33" name="tx31"/>
+            <p:cNvPr id="21" name="tx19"/>
             <p:cNvSpPr/>
             <p:nvPr/>
           </p:nvSpPr>
           <p:spPr>
             <a:xfrm>
-              <a:off x="3386059" y="2676000"/>
+              <a:off x="3225937" y="2676000"/>
               <a:ext cx="673521" cy="169664"/>
             </a:xfrm>
             <a:prstGeom prst="rect">
@@ -6131,13 +4787,13 @@
         </p:sp>
         <p:sp>
           <p:nvSpPr>
-            <p:cNvPr id="34" name="pg32"/>
+            <p:cNvPr id="22" name="pg20"/>
             <p:cNvSpPr/>
             <p:nvPr/>
           </p:nvSpPr>
           <p:spPr>
             <a:xfrm>
-              <a:off x="3367771" y="2662847"/>
+              <a:off x="3207649" y="2662847"/>
               <a:ext cx="710097" cy="201105"/>
             </a:xfrm>
             <a:custGeom>
@@ -6145,7 +4801,7 @@
               <a:pathLst>
                 <a:path w="710097" h="201105">
                   <a:moveTo>
-                    <a:pt x="27432" y="201105"/>
+                    <a:pt x="27431" y="201105"/>
                   </a:moveTo>
                   <a:lnTo>
                     <a:pt x="682665" y="201105"/>
@@ -6217,7 +4873,7 @@
                     <a:pt x="682665" y="0"/>
                   </a:lnTo>
                   <a:lnTo>
-                    <a:pt x="27432" y="0"/>
+                    <a:pt x="27431" y="0"/>
                   </a:lnTo>
                   <a:lnTo>
                     <a:pt x="30738" y="200"/>
@@ -6232,7 +4888,7 @@
                     <a:pt x="17704" y="1782"/>
                   </a:lnTo>
                   <a:lnTo>
-                    <a:pt x="13716" y="3675"/>
+                    <a:pt x="13715" y="3675"/>
                   </a:lnTo>
                   <a:lnTo>
                     <a:pt x="10082" y="6183"/>
@@ -6280,7 +4936,7 @@
                     <a:pt x="10082" y="194922"/>
                   </a:lnTo>
                   <a:lnTo>
-                    <a:pt x="13716" y="197430"/>
+                    <a:pt x="13715" y="197430"/>
                   </a:lnTo>
                   <a:lnTo>
                     <a:pt x="17704" y="199322"/>
@@ -6309,13 +4965,13 @@
         </p:sp>
         <p:sp>
           <p:nvSpPr>
-            <p:cNvPr id="35" name="tx33"/>
+            <p:cNvPr id="23" name="tx21"/>
             <p:cNvSpPr/>
             <p:nvPr/>
           </p:nvSpPr>
           <p:spPr>
             <a:xfrm>
-              <a:off x="3386059" y="2676000"/>
+              <a:off x="3225937" y="2676000"/>
               <a:ext cx="673521" cy="169664"/>
             </a:xfrm>
             <a:prstGeom prst="rect">
@@ -6355,13 +5011,13 @@
         </p:sp>
         <p:sp>
           <p:nvSpPr>
-            <p:cNvPr id="36" name="pg34"/>
+            <p:cNvPr id="24" name="pg22"/>
             <p:cNvSpPr/>
             <p:nvPr/>
           </p:nvSpPr>
           <p:spPr>
             <a:xfrm>
-              <a:off x="3367771" y="2662847"/>
+              <a:off x="3207649" y="2662847"/>
               <a:ext cx="710097" cy="201105"/>
             </a:xfrm>
             <a:custGeom>
@@ -6369,7 +5025,7 @@
               <a:pathLst>
                 <a:path w="710097" h="201105">
                   <a:moveTo>
-                    <a:pt x="27432" y="201105"/>
+                    <a:pt x="27431" y="201105"/>
                   </a:moveTo>
                   <a:lnTo>
                     <a:pt x="682665" y="201105"/>
@@ -6441,7 +5097,7 @@
                     <a:pt x="682665" y="0"/>
                   </a:lnTo>
                   <a:lnTo>
-                    <a:pt x="27432" y="0"/>
+                    <a:pt x="27431" y="0"/>
                   </a:lnTo>
                   <a:lnTo>
                     <a:pt x="30738" y="200"/>
@@ -6456,7 +5112,7 @@
                     <a:pt x="17704" y="1782"/>
                   </a:lnTo>
                   <a:lnTo>
-                    <a:pt x="13716" y="3675"/>
+                    <a:pt x="13715" y="3675"/>
                   </a:lnTo>
                   <a:lnTo>
                     <a:pt x="10082" y="6183"/>
@@ -6504,7 +5160,7 @@
                     <a:pt x="10082" y="194922"/>
                   </a:lnTo>
                   <a:lnTo>
-                    <a:pt x="13716" y="197430"/>
+                    <a:pt x="13715" y="197430"/>
                   </a:lnTo>
                   <a:lnTo>
                     <a:pt x="17704" y="199322"/>
@@ -6533,13 +5189,13 @@
         </p:sp>
         <p:sp>
           <p:nvSpPr>
-            <p:cNvPr id="37" name="tx35"/>
+            <p:cNvPr id="25" name="tx23"/>
             <p:cNvSpPr/>
             <p:nvPr/>
           </p:nvSpPr>
           <p:spPr>
             <a:xfrm>
-              <a:off x="3386059" y="2676000"/>
+              <a:off x="3225937" y="2676000"/>
               <a:ext cx="673521" cy="169664"/>
             </a:xfrm>
             <a:prstGeom prst="rect">
@@ -6579,13 +5235,13 @@
         </p:sp>
         <p:sp>
           <p:nvSpPr>
-            <p:cNvPr id="38" name="pg36"/>
+            <p:cNvPr id="26" name="pg24"/>
             <p:cNvSpPr/>
             <p:nvPr/>
           </p:nvSpPr>
           <p:spPr>
             <a:xfrm>
-              <a:off x="3367771" y="2662847"/>
+              <a:off x="3207649" y="2662847"/>
               <a:ext cx="710097" cy="201105"/>
             </a:xfrm>
             <a:custGeom>
@@ -6593,7 +5249,7 @@
               <a:pathLst>
                 <a:path w="710097" h="201105">
                   <a:moveTo>
-                    <a:pt x="27432" y="201105"/>
+                    <a:pt x="27431" y="201105"/>
                   </a:moveTo>
                   <a:lnTo>
                     <a:pt x="682665" y="201105"/>
@@ -6665,7 +5321,7 @@
                     <a:pt x="682665" y="0"/>
                   </a:lnTo>
                   <a:lnTo>
-                    <a:pt x="27432" y="0"/>
+                    <a:pt x="27431" y="0"/>
                   </a:lnTo>
                   <a:lnTo>
                     <a:pt x="30738" y="200"/>
@@ -6680,7 +5336,7 @@
                     <a:pt x="17704" y="1782"/>
                   </a:lnTo>
                   <a:lnTo>
-                    <a:pt x="13716" y="3675"/>
+                    <a:pt x="13715" y="3675"/>
                   </a:lnTo>
                   <a:lnTo>
                     <a:pt x="10082" y="6183"/>
@@ -6728,7 +5384,7 @@
                     <a:pt x="10082" y="194922"/>
                   </a:lnTo>
                   <a:lnTo>
-                    <a:pt x="13716" y="197430"/>
+                    <a:pt x="13715" y="197430"/>
                   </a:lnTo>
                   <a:lnTo>
                     <a:pt x="17704" y="199322"/>
@@ -6757,13 +5413,13 @@
         </p:sp>
         <p:sp>
           <p:nvSpPr>
-            <p:cNvPr id="39" name="tx37"/>
+            <p:cNvPr id="27" name="tx25"/>
             <p:cNvSpPr/>
             <p:nvPr/>
           </p:nvSpPr>
           <p:spPr>
             <a:xfrm>
-              <a:off x="3386059" y="2676000"/>
+              <a:off x="3225937" y="2676000"/>
               <a:ext cx="673521" cy="169664"/>
             </a:xfrm>
             <a:prstGeom prst="rect">
@@ -6803,13 +5459,13 @@
         </p:sp>
         <p:sp>
           <p:nvSpPr>
-            <p:cNvPr id="40" name="pg38"/>
+            <p:cNvPr id="28" name="pg26"/>
             <p:cNvSpPr/>
             <p:nvPr/>
           </p:nvSpPr>
           <p:spPr>
             <a:xfrm>
-              <a:off x="2108880" y="3896059"/>
+              <a:off x="2686557" y="3279453"/>
               <a:ext cx="1865934" cy="201105"/>
             </a:xfrm>
             <a:custGeom>
@@ -6981,13 +5637,13 @@
         </p:sp>
         <p:sp>
           <p:nvSpPr>
-            <p:cNvPr id="41" name="tx39"/>
+            <p:cNvPr id="29" name="tx27"/>
             <p:cNvSpPr/>
             <p:nvPr/>
           </p:nvSpPr>
           <p:spPr>
             <a:xfrm>
-              <a:off x="2127168" y="3865569"/>
+              <a:off x="2704845" y="3248962"/>
               <a:ext cx="1829358" cy="213307"/>
             </a:xfrm>
             <a:prstGeom prst="rect">
@@ -7013,27 +5669,27 @@
               <a:r>
                 <a:rPr sz="1800" b="1">
                   <a:solidFill>
-                    <a:srgbClr val="A3C7DF">
+                    <a:srgbClr val="F68B33">
                       <a:alpha val="100000"/>
                     </a:srgbClr>
                   </a:solidFill>
                   <a:latin typeface="Helvetica"/>
                   <a:cs typeface="Helvetica"/>
                 </a:rPr>
-                <a:t>EV (sold in 2030)</a:t>
+                <a:t>EV (sold in 2022)</a:t>
               </a:r>
             </a:p>
           </p:txBody>
         </p:sp>
         <p:sp>
           <p:nvSpPr>
-            <p:cNvPr id="42" name="pg40"/>
+            <p:cNvPr id="30" name="pg28"/>
             <p:cNvSpPr/>
             <p:nvPr/>
           </p:nvSpPr>
           <p:spPr>
             <a:xfrm>
-              <a:off x="2108880" y="3896059"/>
+              <a:off x="2686557" y="3279453"/>
               <a:ext cx="1865934" cy="201105"/>
             </a:xfrm>
             <a:custGeom>
@@ -7205,13 +5861,13 @@
         </p:sp>
         <p:sp>
           <p:nvSpPr>
-            <p:cNvPr id="43" name="tx41"/>
+            <p:cNvPr id="31" name="tx29"/>
             <p:cNvSpPr/>
             <p:nvPr/>
           </p:nvSpPr>
           <p:spPr>
             <a:xfrm>
-              <a:off x="2127168" y="3865569"/>
+              <a:off x="2704845" y="3248962"/>
               <a:ext cx="1829358" cy="213307"/>
             </a:xfrm>
             <a:prstGeom prst="rect">
@@ -7237,27 +5893,27 @@
               <a:r>
                 <a:rPr sz="1800" b="1">
                   <a:solidFill>
-                    <a:srgbClr val="A3C7DF">
+                    <a:srgbClr val="F68B33">
                       <a:alpha val="100000"/>
                     </a:srgbClr>
                   </a:solidFill>
                   <a:latin typeface="Helvetica"/>
                   <a:cs typeface="Helvetica"/>
                 </a:rPr>
-                <a:t>EV (sold in 2030)</a:t>
+                <a:t>EV (sold in 2022)</a:t>
               </a:r>
             </a:p>
           </p:txBody>
         </p:sp>
         <p:sp>
           <p:nvSpPr>
-            <p:cNvPr id="44" name="pg42"/>
+            <p:cNvPr id="32" name="pg30"/>
             <p:cNvSpPr/>
             <p:nvPr/>
           </p:nvSpPr>
           <p:spPr>
             <a:xfrm>
-              <a:off x="2108880" y="3896059"/>
+              <a:off x="2686557" y="3279453"/>
               <a:ext cx="1865934" cy="201105"/>
             </a:xfrm>
             <a:custGeom>
@@ -7429,13 +6085,13 @@
         </p:sp>
         <p:sp>
           <p:nvSpPr>
-            <p:cNvPr id="45" name="tx43"/>
+            <p:cNvPr id="33" name="tx31"/>
             <p:cNvSpPr/>
             <p:nvPr/>
           </p:nvSpPr>
           <p:spPr>
             <a:xfrm>
-              <a:off x="2127168" y="3865569"/>
+              <a:off x="2704845" y="3248962"/>
               <a:ext cx="1829358" cy="213307"/>
             </a:xfrm>
             <a:prstGeom prst="rect">
@@ -7461,27 +6117,27 @@
               <a:r>
                 <a:rPr sz="1800" b="1">
                   <a:solidFill>
-                    <a:srgbClr val="A3C7DF">
+                    <a:srgbClr val="F68B33">
                       <a:alpha val="100000"/>
                     </a:srgbClr>
                   </a:solidFill>
                   <a:latin typeface="Helvetica"/>
                   <a:cs typeface="Helvetica"/>
                 </a:rPr>
-                <a:t>EV (sold in 2030)</a:t>
+                <a:t>EV (sold in 2022)</a:t>
               </a:r>
             </a:p>
           </p:txBody>
         </p:sp>
         <p:sp>
           <p:nvSpPr>
-            <p:cNvPr id="46" name="pg44"/>
+            <p:cNvPr id="34" name="pg32"/>
             <p:cNvSpPr/>
             <p:nvPr/>
           </p:nvSpPr>
           <p:spPr>
             <a:xfrm>
-              <a:off x="2108880" y="3896059"/>
+              <a:off x="2686557" y="3279453"/>
               <a:ext cx="1865934" cy="201105"/>
             </a:xfrm>
             <a:custGeom>
@@ -7653,13 +6309,13 @@
         </p:sp>
         <p:sp>
           <p:nvSpPr>
-            <p:cNvPr id="47" name="tx45"/>
+            <p:cNvPr id="35" name="tx33"/>
             <p:cNvSpPr/>
             <p:nvPr/>
           </p:nvSpPr>
           <p:spPr>
             <a:xfrm>
-              <a:off x="2127168" y="3865569"/>
+              <a:off x="2704845" y="3248962"/>
               <a:ext cx="1829358" cy="213307"/>
             </a:xfrm>
             <a:prstGeom prst="rect">
@@ -7685,27 +6341,27 @@
               <a:r>
                 <a:rPr sz="1800" b="1">
                   <a:solidFill>
-                    <a:srgbClr val="A3C7DF">
+                    <a:srgbClr val="F68B33">
                       <a:alpha val="100000"/>
                     </a:srgbClr>
                   </a:solidFill>
                   <a:latin typeface="Helvetica"/>
                   <a:cs typeface="Helvetica"/>
                 </a:rPr>
-                <a:t>EV (sold in 2030)</a:t>
+                <a:t>EV (sold in 2022)</a:t>
               </a:r>
             </a:p>
           </p:txBody>
         </p:sp>
         <p:sp>
           <p:nvSpPr>
-            <p:cNvPr id="48" name="pg46"/>
+            <p:cNvPr id="36" name="pg34"/>
             <p:cNvSpPr/>
             <p:nvPr/>
           </p:nvSpPr>
           <p:spPr>
             <a:xfrm>
-              <a:off x="2108880" y="3896059"/>
+              <a:off x="2686557" y="3279453"/>
               <a:ext cx="1865934" cy="201105"/>
             </a:xfrm>
             <a:custGeom>
@@ -7877,13 +6533,13 @@
         </p:sp>
         <p:sp>
           <p:nvSpPr>
-            <p:cNvPr id="49" name="tx47"/>
+            <p:cNvPr id="37" name="tx35"/>
             <p:cNvSpPr/>
             <p:nvPr/>
           </p:nvSpPr>
           <p:spPr>
             <a:xfrm>
-              <a:off x="2127168" y="3865569"/>
+              <a:off x="2704845" y="3248962"/>
               <a:ext cx="1829358" cy="213307"/>
             </a:xfrm>
             <a:prstGeom prst="rect">
@@ -7909,27 +6565,27 @@
               <a:r>
                 <a:rPr sz="1800" b="1">
                   <a:solidFill>
-                    <a:srgbClr val="A3C7DF">
+                    <a:srgbClr val="F68B33">
                       <a:alpha val="100000"/>
                     </a:srgbClr>
                   </a:solidFill>
                   <a:latin typeface="Helvetica"/>
                   <a:cs typeface="Helvetica"/>
                 </a:rPr>
-                <a:t>EV (sold in 2030)</a:t>
+                <a:t>EV (sold in 2022)</a:t>
               </a:r>
             </a:p>
           </p:txBody>
         </p:sp>
         <p:sp>
           <p:nvSpPr>
-            <p:cNvPr id="50" name="pg48"/>
+            <p:cNvPr id="38" name="pg36"/>
             <p:cNvSpPr/>
             <p:nvPr/>
           </p:nvSpPr>
           <p:spPr>
             <a:xfrm>
-              <a:off x="2108880" y="3896059"/>
+              <a:off x="2686557" y="3279453"/>
               <a:ext cx="1865934" cy="201105"/>
             </a:xfrm>
             <a:custGeom>
@@ -8101,13 +6757,13 @@
         </p:sp>
         <p:sp>
           <p:nvSpPr>
-            <p:cNvPr id="51" name="tx49"/>
+            <p:cNvPr id="39" name="tx37"/>
             <p:cNvSpPr/>
             <p:nvPr/>
           </p:nvSpPr>
           <p:spPr>
             <a:xfrm>
-              <a:off x="2127168" y="3865569"/>
+              <a:off x="2704845" y="3248962"/>
               <a:ext cx="1829358" cy="213307"/>
             </a:xfrm>
             <a:prstGeom prst="rect">
@@ -8133,7 +6789,1351 @@
               <a:r>
                 <a:rPr sz="1800" b="1">
                   <a:solidFill>
-                    <a:srgbClr val="A3C7DF">
+                    <a:srgbClr val="F68B33">
+                      <a:alpha val="100000"/>
+                    </a:srgbClr>
+                  </a:solidFill>
+                  <a:latin typeface="Helvetica"/>
+                  <a:cs typeface="Helvetica"/>
+                </a:rPr>
+                <a:t>EV (sold in 2022)</a:t>
+              </a:r>
+            </a:p>
+          </p:txBody>
+        </p:sp>
+        <p:sp>
+          <p:nvSpPr>
+            <p:cNvPr id="40" name="pg38"/>
+            <p:cNvSpPr/>
+            <p:nvPr/>
+          </p:nvSpPr>
+          <p:spPr>
+            <a:xfrm>
+              <a:off x="2094407" y="3896059"/>
+              <a:ext cx="1865934" cy="201105"/>
+            </a:xfrm>
+            <a:custGeom>
+              <a:avLst/>
+              <a:pathLst>
+                <a:path w="1865934" h="201105">
+                  <a:moveTo>
+                    <a:pt x="27431" y="201105"/>
+                  </a:moveTo>
+                  <a:lnTo>
+                    <a:pt x="1838502" y="201105"/>
+                  </a:lnTo>
+                  <a:lnTo>
+                    <a:pt x="1837397" y="201083"/>
+                  </a:lnTo>
+                  <a:lnTo>
+                    <a:pt x="1841808" y="200905"/>
+                  </a:lnTo>
+                  <a:lnTo>
+                    <a:pt x="1846134" y="200022"/>
+                  </a:lnTo>
+                  <a:lnTo>
+                    <a:pt x="1850261" y="198456"/>
+                  </a:lnTo>
+                  <a:lnTo>
+                    <a:pt x="1854085" y="196249"/>
+                  </a:lnTo>
+                  <a:lnTo>
+                    <a:pt x="1857504" y="193457"/>
+                  </a:lnTo>
+                  <a:lnTo>
+                    <a:pt x="1860432" y="190153"/>
+                  </a:lnTo>
+                  <a:lnTo>
+                    <a:pt x="1862791" y="186421"/>
+                  </a:lnTo>
+                  <a:lnTo>
+                    <a:pt x="1864522" y="182360"/>
+                  </a:lnTo>
+                  <a:lnTo>
+                    <a:pt x="1865578" y="178073"/>
+                  </a:lnTo>
+                  <a:lnTo>
+                    <a:pt x="1865934" y="173673"/>
+                  </a:lnTo>
+                  <a:lnTo>
+                    <a:pt x="1865934" y="27431"/>
+                  </a:lnTo>
+                  <a:lnTo>
+                    <a:pt x="1865578" y="23031"/>
+                  </a:lnTo>
+                  <a:lnTo>
+                    <a:pt x="1864522" y="18745"/>
+                  </a:lnTo>
+                  <a:lnTo>
+                    <a:pt x="1862791" y="14683"/>
+                  </a:lnTo>
+                  <a:lnTo>
+                    <a:pt x="1860432" y="10952"/>
+                  </a:lnTo>
+                  <a:lnTo>
+                    <a:pt x="1857504" y="7647"/>
+                  </a:lnTo>
+                  <a:lnTo>
+                    <a:pt x="1854085" y="4855"/>
+                  </a:lnTo>
+                  <a:lnTo>
+                    <a:pt x="1850261" y="2648"/>
+                  </a:lnTo>
+                  <a:lnTo>
+                    <a:pt x="1846134" y="1083"/>
+                  </a:lnTo>
+                  <a:lnTo>
+                    <a:pt x="1841808" y="200"/>
+                  </a:lnTo>
+                  <a:lnTo>
+                    <a:pt x="1838502" y="0"/>
+                  </a:lnTo>
+                  <a:lnTo>
+                    <a:pt x="27431" y="0"/>
+                  </a:lnTo>
+                  <a:lnTo>
+                    <a:pt x="30738" y="200"/>
+                  </a:lnTo>
+                  <a:lnTo>
+                    <a:pt x="26327" y="22"/>
+                  </a:lnTo>
+                  <a:lnTo>
+                    <a:pt x="21944" y="554"/>
+                  </a:lnTo>
+                  <a:lnTo>
+                    <a:pt x="17704" y="1782"/>
+                  </a:lnTo>
+                  <a:lnTo>
+                    <a:pt x="13716" y="3675"/>
+                  </a:lnTo>
+                  <a:lnTo>
+                    <a:pt x="10082" y="6183"/>
+                  </a:lnTo>
+                  <a:lnTo>
+                    <a:pt x="6898" y="9241"/>
+                  </a:lnTo>
+                  <a:lnTo>
+                    <a:pt x="4246" y="12770"/>
+                  </a:lnTo>
+                  <a:lnTo>
+                    <a:pt x="2195" y="16679"/>
+                  </a:lnTo>
+                  <a:lnTo>
+                    <a:pt x="797" y="20867"/>
+                  </a:lnTo>
+                  <a:lnTo>
+                    <a:pt x="88" y="25224"/>
+                  </a:lnTo>
+                  <a:lnTo>
+                    <a:pt x="0" y="27431"/>
+                  </a:lnTo>
+                  <a:lnTo>
+                    <a:pt x="0" y="173673"/>
+                  </a:lnTo>
+                  <a:lnTo>
+                    <a:pt x="88" y="171466"/>
+                  </a:lnTo>
+                  <a:lnTo>
+                    <a:pt x="88" y="175880"/>
+                  </a:lnTo>
+                  <a:lnTo>
+                    <a:pt x="797" y="180238"/>
+                  </a:lnTo>
+                  <a:lnTo>
+                    <a:pt x="2195" y="184425"/>
+                  </a:lnTo>
+                  <a:lnTo>
+                    <a:pt x="4246" y="188334"/>
+                  </a:lnTo>
+                  <a:lnTo>
+                    <a:pt x="6898" y="191864"/>
+                  </a:lnTo>
+                  <a:lnTo>
+                    <a:pt x="10082" y="194922"/>
+                  </a:lnTo>
+                  <a:lnTo>
+                    <a:pt x="13716" y="197430"/>
+                  </a:lnTo>
+                  <a:lnTo>
+                    <a:pt x="17704" y="199322"/>
+                  </a:lnTo>
+                  <a:lnTo>
+                    <a:pt x="21944" y="200551"/>
+                  </a:lnTo>
+                  <a:lnTo>
+                    <a:pt x="26327" y="201083"/>
+                  </a:lnTo>
+                  <a:close/>
+                </a:path>
+              </a:pathLst>
+            </a:custGeom>
+            <a:solidFill>
+              <a:srgbClr val="FFFFFF">
+                <a:alpha val="100000"/>
+              </a:srgbClr>
+            </a:solidFill>
+          </p:spPr>
+          <p:txBody>
+            <a:bodyPr/>
+            <a:lstStyle/>
+            <a:p/>
+          </p:txBody>
+        </p:sp>
+        <p:sp>
+          <p:nvSpPr>
+            <p:cNvPr id="41" name="tx39"/>
+            <p:cNvSpPr/>
+            <p:nvPr/>
+          </p:nvSpPr>
+          <p:spPr>
+            <a:xfrm>
+              <a:off x="2112695" y="3865569"/>
+              <a:ext cx="1829358" cy="213307"/>
+            </a:xfrm>
+            <a:prstGeom prst="rect">
+              <a:avLst/>
+            </a:prstGeom>
+            <a:noFill/>
+          </p:spPr>
+          <p:txBody>
+            <a:bodyPr lIns="0" rIns="0" tIns="0" bIns="0" anchorCtr="1" anchor="ctr" wrap="none"/>
+            <a:lstStyle/>
+            <a:p>
+              <a:pPr algn="l" marL="0" marR="0" indent="0">
+                <a:lnSpc>
+                  <a:spcPts val="1800"/>
+                </a:lnSpc>
+                <a:spcBef>
+                  <a:spcPts val="0"/>
+                </a:spcBef>
+                <a:spcAft>
+                  <a:spcPts val="0"/>
+                </a:spcAft>
+              </a:pPr>
+              <a:r>
+                <a:rPr sz="1800" b="1">
+                  <a:solidFill>
+                    <a:srgbClr val="FFC35A">
+                      <a:alpha val="100000"/>
+                    </a:srgbClr>
+                  </a:solidFill>
+                  <a:latin typeface="Helvetica"/>
+                  <a:cs typeface="Helvetica"/>
+                </a:rPr>
+                <a:t>EV (sold in 2030)</a:t>
+              </a:r>
+            </a:p>
+          </p:txBody>
+        </p:sp>
+        <p:sp>
+          <p:nvSpPr>
+            <p:cNvPr id="42" name="pg40"/>
+            <p:cNvSpPr/>
+            <p:nvPr/>
+          </p:nvSpPr>
+          <p:spPr>
+            <a:xfrm>
+              <a:off x="2094407" y="3896059"/>
+              <a:ext cx="1865934" cy="201105"/>
+            </a:xfrm>
+            <a:custGeom>
+              <a:avLst/>
+              <a:pathLst>
+                <a:path w="1865934" h="201105">
+                  <a:moveTo>
+                    <a:pt x="27431" y="201105"/>
+                  </a:moveTo>
+                  <a:lnTo>
+                    <a:pt x="1838502" y="201105"/>
+                  </a:lnTo>
+                  <a:lnTo>
+                    <a:pt x="1837397" y="201083"/>
+                  </a:lnTo>
+                  <a:lnTo>
+                    <a:pt x="1841808" y="200905"/>
+                  </a:lnTo>
+                  <a:lnTo>
+                    <a:pt x="1846134" y="200022"/>
+                  </a:lnTo>
+                  <a:lnTo>
+                    <a:pt x="1850261" y="198456"/>
+                  </a:lnTo>
+                  <a:lnTo>
+                    <a:pt x="1854085" y="196249"/>
+                  </a:lnTo>
+                  <a:lnTo>
+                    <a:pt x="1857504" y="193457"/>
+                  </a:lnTo>
+                  <a:lnTo>
+                    <a:pt x="1860432" y="190153"/>
+                  </a:lnTo>
+                  <a:lnTo>
+                    <a:pt x="1862791" y="186421"/>
+                  </a:lnTo>
+                  <a:lnTo>
+                    <a:pt x="1864522" y="182360"/>
+                  </a:lnTo>
+                  <a:lnTo>
+                    <a:pt x="1865578" y="178073"/>
+                  </a:lnTo>
+                  <a:lnTo>
+                    <a:pt x="1865934" y="173673"/>
+                  </a:lnTo>
+                  <a:lnTo>
+                    <a:pt x="1865934" y="27431"/>
+                  </a:lnTo>
+                  <a:lnTo>
+                    <a:pt x="1865578" y="23031"/>
+                  </a:lnTo>
+                  <a:lnTo>
+                    <a:pt x="1864522" y="18745"/>
+                  </a:lnTo>
+                  <a:lnTo>
+                    <a:pt x="1862791" y="14683"/>
+                  </a:lnTo>
+                  <a:lnTo>
+                    <a:pt x="1860432" y="10952"/>
+                  </a:lnTo>
+                  <a:lnTo>
+                    <a:pt x="1857504" y="7647"/>
+                  </a:lnTo>
+                  <a:lnTo>
+                    <a:pt x="1854085" y="4855"/>
+                  </a:lnTo>
+                  <a:lnTo>
+                    <a:pt x="1850261" y="2648"/>
+                  </a:lnTo>
+                  <a:lnTo>
+                    <a:pt x="1846134" y="1083"/>
+                  </a:lnTo>
+                  <a:lnTo>
+                    <a:pt x="1841808" y="200"/>
+                  </a:lnTo>
+                  <a:lnTo>
+                    <a:pt x="1838502" y="0"/>
+                  </a:lnTo>
+                  <a:lnTo>
+                    <a:pt x="27431" y="0"/>
+                  </a:lnTo>
+                  <a:lnTo>
+                    <a:pt x="30738" y="200"/>
+                  </a:lnTo>
+                  <a:lnTo>
+                    <a:pt x="26327" y="22"/>
+                  </a:lnTo>
+                  <a:lnTo>
+                    <a:pt x="21944" y="554"/>
+                  </a:lnTo>
+                  <a:lnTo>
+                    <a:pt x="17704" y="1782"/>
+                  </a:lnTo>
+                  <a:lnTo>
+                    <a:pt x="13716" y="3675"/>
+                  </a:lnTo>
+                  <a:lnTo>
+                    <a:pt x="10082" y="6183"/>
+                  </a:lnTo>
+                  <a:lnTo>
+                    <a:pt x="6898" y="9241"/>
+                  </a:lnTo>
+                  <a:lnTo>
+                    <a:pt x="4246" y="12770"/>
+                  </a:lnTo>
+                  <a:lnTo>
+                    <a:pt x="2195" y="16679"/>
+                  </a:lnTo>
+                  <a:lnTo>
+                    <a:pt x="797" y="20867"/>
+                  </a:lnTo>
+                  <a:lnTo>
+                    <a:pt x="88" y="25224"/>
+                  </a:lnTo>
+                  <a:lnTo>
+                    <a:pt x="0" y="27431"/>
+                  </a:lnTo>
+                  <a:lnTo>
+                    <a:pt x="0" y="173673"/>
+                  </a:lnTo>
+                  <a:lnTo>
+                    <a:pt x="88" y="171466"/>
+                  </a:lnTo>
+                  <a:lnTo>
+                    <a:pt x="88" y="175880"/>
+                  </a:lnTo>
+                  <a:lnTo>
+                    <a:pt x="797" y="180238"/>
+                  </a:lnTo>
+                  <a:lnTo>
+                    <a:pt x="2195" y="184425"/>
+                  </a:lnTo>
+                  <a:lnTo>
+                    <a:pt x="4246" y="188334"/>
+                  </a:lnTo>
+                  <a:lnTo>
+                    <a:pt x="6898" y="191864"/>
+                  </a:lnTo>
+                  <a:lnTo>
+                    <a:pt x="10082" y="194922"/>
+                  </a:lnTo>
+                  <a:lnTo>
+                    <a:pt x="13716" y="197430"/>
+                  </a:lnTo>
+                  <a:lnTo>
+                    <a:pt x="17704" y="199322"/>
+                  </a:lnTo>
+                  <a:lnTo>
+                    <a:pt x="21944" y="200551"/>
+                  </a:lnTo>
+                  <a:lnTo>
+                    <a:pt x="26327" y="201083"/>
+                  </a:lnTo>
+                  <a:close/>
+                </a:path>
+              </a:pathLst>
+            </a:custGeom>
+            <a:solidFill>
+              <a:srgbClr val="FFFFFF">
+                <a:alpha val="100000"/>
+              </a:srgbClr>
+            </a:solidFill>
+          </p:spPr>
+          <p:txBody>
+            <a:bodyPr/>
+            <a:lstStyle/>
+            <a:p/>
+          </p:txBody>
+        </p:sp>
+        <p:sp>
+          <p:nvSpPr>
+            <p:cNvPr id="43" name="tx41"/>
+            <p:cNvSpPr/>
+            <p:nvPr/>
+          </p:nvSpPr>
+          <p:spPr>
+            <a:xfrm>
+              <a:off x="2112695" y="3865569"/>
+              <a:ext cx="1829358" cy="213307"/>
+            </a:xfrm>
+            <a:prstGeom prst="rect">
+              <a:avLst/>
+            </a:prstGeom>
+            <a:noFill/>
+          </p:spPr>
+          <p:txBody>
+            <a:bodyPr lIns="0" rIns="0" tIns="0" bIns="0" anchorCtr="1" anchor="ctr" wrap="none"/>
+            <a:lstStyle/>
+            <a:p>
+              <a:pPr algn="l" marL="0" marR="0" indent="0">
+                <a:lnSpc>
+                  <a:spcPts val="1800"/>
+                </a:lnSpc>
+                <a:spcBef>
+                  <a:spcPts val="0"/>
+                </a:spcBef>
+                <a:spcAft>
+                  <a:spcPts val="0"/>
+                </a:spcAft>
+              </a:pPr>
+              <a:r>
+                <a:rPr sz="1800" b="1">
+                  <a:solidFill>
+                    <a:srgbClr val="FFC35A">
+                      <a:alpha val="100000"/>
+                    </a:srgbClr>
+                  </a:solidFill>
+                  <a:latin typeface="Helvetica"/>
+                  <a:cs typeface="Helvetica"/>
+                </a:rPr>
+                <a:t>EV (sold in 2030)</a:t>
+              </a:r>
+            </a:p>
+          </p:txBody>
+        </p:sp>
+        <p:sp>
+          <p:nvSpPr>
+            <p:cNvPr id="44" name="pg42"/>
+            <p:cNvSpPr/>
+            <p:nvPr/>
+          </p:nvSpPr>
+          <p:spPr>
+            <a:xfrm>
+              <a:off x="2094407" y="3896059"/>
+              <a:ext cx="1865934" cy="201105"/>
+            </a:xfrm>
+            <a:custGeom>
+              <a:avLst/>
+              <a:pathLst>
+                <a:path w="1865934" h="201105">
+                  <a:moveTo>
+                    <a:pt x="27431" y="201105"/>
+                  </a:moveTo>
+                  <a:lnTo>
+                    <a:pt x="1838502" y="201105"/>
+                  </a:lnTo>
+                  <a:lnTo>
+                    <a:pt x="1837397" y="201083"/>
+                  </a:lnTo>
+                  <a:lnTo>
+                    <a:pt x="1841808" y="200905"/>
+                  </a:lnTo>
+                  <a:lnTo>
+                    <a:pt x="1846134" y="200022"/>
+                  </a:lnTo>
+                  <a:lnTo>
+                    <a:pt x="1850261" y="198456"/>
+                  </a:lnTo>
+                  <a:lnTo>
+                    <a:pt x="1854085" y="196249"/>
+                  </a:lnTo>
+                  <a:lnTo>
+                    <a:pt x="1857504" y="193457"/>
+                  </a:lnTo>
+                  <a:lnTo>
+                    <a:pt x="1860432" y="190153"/>
+                  </a:lnTo>
+                  <a:lnTo>
+                    <a:pt x="1862791" y="186421"/>
+                  </a:lnTo>
+                  <a:lnTo>
+                    <a:pt x="1864522" y="182360"/>
+                  </a:lnTo>
+                  <a:lnTo>
+                    <a:pt x="1865578" y="178073"/>
+                  </a:lnTo>
+                  <a:lnTo>
+                    <a:pt x="1865934" y="173673"/>
+                  </a:lnTo>
+                  <a:lnTo>
+                    <a:pt x="1865934" y="27431"/>
+                  </a:lnTo>
+                  <a:lnTo>
+                    <a:pt x="1865578" y="23031"/>
+                  </a:lnTo>
+                  <a:lnTo>
+                    <a:pt x="1864522" y="18745"/>
+                  </a:lnTo>
+                  <a:lnTo>
+                    <a:pt x="1862791" y="14683"/>
+                  </a:lnTo>
+                  <a:lnTo>
+                    <a:pt x="1860432" y="10952"/>
+                  </a:lnTo>
+                  <a:lnTo>
+                    <a:pt x="1857504" y="7647"/>
+                  </a:lnTo>
+                  <a:lnTo>
+                    <a:pt x="1854085" y="4855"/>
+                  </a:lnTo>
+                  <a:lnTo>
+                    <a:pt x="1850261" y="2648"/>
+                  </a:lnTo>
+                  <a:lnTo>
+                    <a:pt x="1846134" y="1083"/>
+                  </a:lnTo>
+                  <a:lnTo>
+                    <a:pt x="1841808" y="200"/>
+                  </a:lnTo>
+                  <a:lnTo>
+                    <a:pt x="1838502" y="0"/>
+                  </a:lnTo>
+                  <a:lnTo>
+                    <a:pt x="27431" y="0"/>
+                  </a:lnTo>
+                  <a:lnTo>
+                    <a:pt x="30738" y="200"/>
+                  </a:lnTo>
+                  <a:lnTo>
+                    <a:pt x="26327" y="22"/>
+                  </a:lnTo>
+                  <a:lnTo>
+                    <a:pt x="21944" y="554"/>
+                  </a:lnTo>
+                  <a:lnTo>
+                    <a:pt x="17704" y="1782"/>
+                  </a:lnTo>
+                  <a:lnTo>
+                    <a:pt x="13716" y="3675"/>
+                  </a:lnTo>
+                  <a:lnTo>
+                    <a:pt x="10082" y="6183"/>
+                  </a:lnTo>
+                  <a:lnTo>
+                    <a:pt x="6898" y="9241"/>
+                  </a:lnTo>
+                  <a:lnTo>
+                    <a:pt x="4246" y="12770"/>
+                  </a:lnTo>
+                  <a:lnTo>
+                    <a:pt x="2195" y="16679"/>
+                  </a:lnTo>
+                  <a:lnTo>
+                    <a:pt x="797" y="20867"/>
+                  </a:lnTo>
+                  <a:lnTo>
+                    <a:pt x="88" y="25224"/>
+                  </a:lnTo>
+                  <a:lnTo>
+                    <a:pt x="0" y="27431"/>
+                  </a:lnTo>
+                  <a:lnTo>
+                    <a:pt x="0" y="173673"/>
+                  </a:lnTo>
+                  <a:lnTo>
+                    <a:pt x="88" y="171466"/>
+                  </a:lnTo>
+                  <a:lnTo>
+                    <a:pt x="88" y="175880"/>
+                  </a:lnTo>
+                  <a:lnTo>
+                    <a:pt x="797" y="180238"/>
+                  </a:lnTo>
+                  <a:lnTo>
+                    <a:pt x="2195" y="184425"/>
+                  </a:lnTo>
+                  <a:lnTo>
+                    <a:pt x="4246" y="188334"/>
+                  </a:lnTo>
+                  <a:lnTo>
+                    <a:pt x="6898" y="191864"/>
+                  </a:lnTo>
+                  <a:lnTo>
+                    <a:pt x="10082" y="194922"/>
+                  </a:lnTo>
+                  <a:lnTo>
+                    <a:pt x="13716" y="197430"/>
+                  </a:lnTo>
+                  <a:lnTo>
+                    <a:pt x="17704" y="199322"/>
+                  </a:lnTo>
+                  <a:lnTo>
+                    <a:pt x="21944" y="200551"/>
+                  </a:lnTo>
+                  <a:lnTo>
+                    <a:pt x="26327" y="201083"/>
+                  </a:lnTo>
+                  <a:close/>
+                </a:path>
+              </a:pathLst>
+            </a:custGeom>
+            <a:solidFill>
+              <a:srgbClr val="FFFFFF">
+                <a:alpha val="100000"/>
+              </a:srgbClr>
+            </a:solidFill>
+          </p:spPr>
+          <p:txBody>
+            <a:bodyPr/>
+            <a:lstStyle/>
+            <a:p/>
+          </p:txBody>
+        </p:sp>
+        <p:sp>
+          <p:nvSpPr>
+            <p:cNvPr id="45" name="tx43"/>
+            <p:cNvSpPr/>
+            <p:nvPr/>
+          </p:nvSpPr>
+          <p:spPr>
+            <a:xfrm>
+              <a:off x="2112695" y="3865569"/>
+              <a:ext cx="1829358" cy="213307"/>
+            </a:xfrm>
+            <a:prstGeom prst="rect">
+              <a:avLst/>
+            </a:prstGeom>
+            <a:noFill/>
+          </p:spPr>
+          <p:txBody>
+            <a:bodyPr lIns="0" rIns="0" tIns="0" bIns="0" anchorCtr="1" anchor="ctr" wrap="none"/>
+            <a:lstStyle/>
+            <a:p>
+              <a:pPr algn="l" marL="0" marR="0" indent="0">
+                <a:lnSpc>
+                  <a:spcPts val="1800"/>
+                </a:lnSpc>
+                <a:spcBef>
+                  <a:spcPts val="0"/>
+                </a:spcBef>
+                <a:spcAft>
+                  <a:spcPts val="0"/>
+                </a:spcAft>
+              </a:pPr>
+              <a:r>
+                <a:rPr sz="1800" b="1">
+                  <a:solidFill>
+                    <a:srgbClr val="FFC35A">
+                      <a:alpha val="100000"/>
+                    </a:srgbClr>
+                  </a:solidFill>
+                  <a:latin typeface="Helvetica"/>
+                  <a:cs typeface="Helvetica"/>
+                </a:rPr>
+                <a:t>EV (sold in 2030)</a:t>
+              </a:r>
+            </a:p>
+          </p:txBody>
+        </p:sp>
+        <p:sp>
+          <p:nvSpPr>
+            <p:cNvPr id="46" name="pg44"/>
+            <p:cNvSpPr/>
+            <p:nvPr/>
+          </p:nvSpPr>
+          <p:spPr>
+            <a:xfrm>
+              <a:off x="2094407" y="3896059"/>
+              <a:ext cx="1865934" cy="201105"/>
+            </a:xfrm>
+            <a:custGeom>
+              <a:avLst/>
+              <a:pathLst>
+                <a:path w="1865934" h="201105">
+                  <a:moveTo>
+                    <a:pt x="27431" y="201105"/>
+                  </a:moveTo>
+                  <a:lnTo>
+                    <a:pt x="1838502" y="201105"/>
+                  </a:lnTo>
+                  <a:lnTo>
+                    <a:pt x="1837397" y="201083"/>
+                  </a:lnTo>
+                  <a:lnTo>
+                    <a:pt x="1841808" y="200905"/>
+                  </a:lnTo>
+                  <a:lnTo>
+                    <a:pt x="1846134" y="200022"/>
+                  </a:lnTo>
+                  <a:lnTo>
+                    <a:pt x="1850261" y="198456"/>
+                  </a:lnTo>
+                  <a:lnTo>
+                    <a:pt x="1854085" y="196249"/>
+                  </a:lnTo>
+                  <a:lnTo>
+                    <a:pt x="1857504" y="193457"/>
+                  </a:lnTo>
+                  <a:lnTo>
+                    <a:pt x="1860432" y="190153"/>
+                  </a:lnTo>
+                  <a:lnTo>
+                    <a:pt x="1862791" y="186421"/>
+                  </a:lnTo>
+                  <a:lnTo>
+                    <a:pt x="1864522" y="182360"/>
+                  </a:lnTo>
+                  <a:lnTo>
+                    <a:pt x="1865578" y="178073"/>
+                  </a:lnTo>
+                  <a:lnTo>
+                    <a:pt x="1865934" y="173673"/>
+                  </a:lnTo>
+                  <a:lnTo>
+                    <a:pt x="1865934" y="27431"/>
+                  </a:lnTo>
+                  <a:lnTo>
+                    <a:pt x="1865578" y="23031"/>
+                  </a:lnTo>
+                  <a:lnTo>
+                    <a:pt x="1864522" y="18745"/>
+                  </a:lnTo>
+                  <a:lnTo>
+                    <a:pt x="1862791" y="14683"/>
+                  </a:lnTo>
+                  <a:lnTo>
+                    <a:pt x="1860432" y="10952"/>
+                  </a:lnTo>
+                  <a:lnTo>
+                    <a:pt x="1857504" y="7647"/>
+                  </a:lnTo>
+                  <a:lnTo>
+                    <a:pt x="1854085" y="4855"/>
+                  </a:lnTo>
+                  <a:lnTo>
+                    <a:pt x="1850261" y="2648"/>
+                  </a:lnTo>
+                  <a:lnTo>
+                    <a:pt x="1846134" y="1083"/>
+                  </a:lnTo>
+                  <a:lnTo>
+                    <a:pt x="1841808" y="200"/>
+                  </a:lnTo>
+                  <a:lnTo>
+                    <a:pt x="1838502" y="0"/>
+                  </a:lnTo>
+                  <a:lnTo>
+                    <a:pt x="27431" y="0"/>
+                  </a:lnTo>
+                  <a:lnTo>
+                    <a:pt x="30738" y="200"/>
+                  </a:lnTo>
+                  <a:lnTo>
+                    <a:pt x="26327" y="22"/>
+                  </a:lnTo>
+                  <a:lnTo>
+                    <a:pt x="21944" y="554"/>
+                  </a:lnTo>
+                  <a:lnTo>
+                    <a:pt x="17704" y="1782"/>
+                  </a:lnTo>
+                  <a:lnTo>
+                    <a:pt x="13716" y="3675"/>
+                  </a:lnTo>
+                  <a:lnTo>
+                    <a:pt x="10082" y="6183"/>
+                  </a:lnTo>
+                  <a:lnTo>
+                    <a:pt x="6898" y="9241"/>
+                  </a:lnTo>
+                  <a:lnTo>
+                    <a:pt x="4246" y="12770"/>
+                  </a:lnTo>
+                  <a:lnTo>
+                    <a:pt x="2195" y="16679"/>
+                  </a:lnTo>
+                  <a:lnTo>
+                    <a:pt x="797" y="20867"/>
+                  </a:lnTo>
+                  <a:lnTo>
+                    <a:pt x="88" y="25224"/>
+                  </a:lnTo>
+                  <a:lnTo>
+                    <a:pt x="0" y="27431"/>
+                  </a:lnTo>
+                  <a:lnTo>
+                    <a:pt x="0" y="173673"/>
+                  </a:lnTo>
+                  <a:lnTo>
+                    <a:pt x="88" y="171466"/>
+                  </a:lnTo>
+                  <a:lnTo>
+                    <a:pt x="88" y="175880"/>
+                  </a:lnTo>
+                  <a:lnTo>
+                    <a:pt x="797" y="180238"/>
+                  </a:lnTo>
+                  <a:lnTo>
+                    <a:pt x="2195" y="184425"/>
+                  </a:lnTo>
+                  <a:lnTo>
+                    <a:pt x="4246" y="188334"/>
+                  </a:lnTo>
+                  <a:lnTo>
+                    <a:pt x="6898" y="191864"/>
+                  </a:lnTo>
+                  <a:lnTo>
+                    <a:pt x="10082" y="194922"/>
+                  </a:lnTo>
+                  <a:lnTo>
+                    <a:pt x="13716" y="197430"/>
+                  </a:lnTo>
+                  <a:lnTo>
+                    <a:pt x="17704" y="199322"/>
+                  </a:lnTo>
+                  <a:lnTo>
+                    <a:pt x="21944" y="200551"/>
+                  </a:lnTo>
+                  <a:lnTo>
+                    <a:pt x="26327" y="201083"/>
+                  </a:lnTo>
+                  <a:close/>
+                </a:path>
+              </a:pathLst>
+            </a:custGeom>
+            <a:solidFill>
+              <a:srgbClr val="FFFFFF">
+                <a:alpha val="100000"/>
+              </a:srgbClr>
+            </a:solidFill>
+          </p:spPr>
+          <p:txBody>
+            <a:bodyPr/>
+            <a:lstStyle/>
+            <a:p/>
+          </p:txBody>
+        </p:sp>
+        <p:sp>
+          <p:nvSpPr>
+            <p:cNvPr id="47" name="tx45"/>
+            <p:cNvSpPr/>
+            <p:nvPr/>
+          </p:nvSpPr>
+          <p:spPr>
+            <a:xfrm>
+              <a:off x="2112695" y="3865569"/>
+              <a:ext cx="1829358" cy="213307"/>
+            </a:xfrm>
+            <a:prstGeom prst="rect">
+              <a:avLst/>
+            </a:prstGeom>
+            <a:noFill/>
+          </p:spPr>
+          <p:txBody>
+            <a:bodyPr lIns="0" rIns="0" tIns="0" bIns="0" anchorCtr="1" anchor="ctr" wrap="none"/>
+            <a:lstStyle/>
+            <a:p>
+              <a:pPr algn="l" marL="0" marR="0" indent="0">
+                <a:lnSpc>
+                  <a:spcPts val="1800"/>
+                </a:lnSpc>
+                <a:spcBef>
+                  <a:spcPts val="0"/>
+                </a:spcBef>
+                <a:spcAft>
+                  <a:spcPts val="0"/>
+                </a:spcAft>
+              </a:pPr>
+              <a:r>
+                <a:rPr sz="1800" b="1">
+                  <a:solidFill>
+                    <a:srgbClr val="FFC35A">
+                      <a:alpha val="100000"/>
+                    </a:srgbClr>
+                  </a:solidFill>
+                  <a:latin typeface="Helvetica"/>
+                  <a:cs typeface="Helvetica"/>
+                </a:rPr>
+                <a:t>EV (sold in 2030)</a:t>
+              </a:r>
+            </a:p>
+          </p:txBody>
+        </p:sp>
+        <p:sp>
+          <p:nvSpPr>
+            <p:cNvPr id="48" name="pg46"/>
+            <p:cNvSpPr/>
+            <p:nvPr/>
+          </p:nvSpPr>
+          <p:spPr>
+            <a:xfrm>
+              <a:off x="2094407" y="3896059"/>
+              <a:ext cx="1865934" cy="201105"/>
+            </a:xfrm>
+            <a:custGeom>
+              <a:avLst/>
+              <a:pathLst>
+                <a:path w="1865934" h="201105">
+                  <a:moveTo>
+                    <a:pt x="27431" y="201105"/>
+                  </a:moveTo>
+                  <a:lnTo>
+                    <a:pt x="1838502" y="201105"/>
+                  </a:lnTo>
+                  <a:lnTo>
+                    <a:pt x="1837397" y="201083"/>
+                  </a:lnTo>
+                  <a:lnTo>
+                    <a:pt x="1841808" y="200905"/>
+                  </a:lnTo>
+                  <a:lnTo>
+                    <a:pt x="1846134" y="200022"/>
+                  </a:lnTo>
+                  <a:lnTo>
+                    <a:pt x="1850261" y="198456"/>
+                  </a:lnTo>
+                  <a:lnTo>
+                    <a:pt x="1854085" y="196249"/>
+                  </a:lnTo>
+                  <a:lnTo>
+                    <a:pt x="1857504" y="193457"/>
+                  </a:lnTo>
+                  <a:lnTo>
+                    <a:pt x="1860432" y="190153"/>
+                  </a:lnTo>
+                  <a:lnTo>
+                    <a:pt x="1862791" y="186421"/>
+                  </a:lnTo>
+                  <a:lnTo>
+                    <a:pt x="1864522" y="182360"/>
+                  </a:lnTo>
+                  <a:lnTo>
+                    <a:pt x="1865578" y="178073"/>
+                  </a:lnTo>
+                  <a:lnTo>
+                    <a:pt x="1865934" y="173673"/>
+                  </a:lnTo>
+                  <a:lnTo>
+                    <a:pt x="1865934" y="27431"/>
+                  </a:lnTo>
+                  <a:lnTo>
+                    <a:pt x="1865578" y="23031"/>
+                  </a:lnTo>
+                  <a:lnTo>
+                    <a:pt x="1864522" y="18745"/>
+                  </a:lnTo>
+                  <a:lnTo>
+                    <a:pt x="1862791" y="14683"/>
+                  </a:lnTo>
+                  <a:lnTo>
+                    <a:pt x="1860432" y="10952"/>
+                  </a:lnTo>
+                  <a:lnTo>
+                    <a:pt x="1857504" y="7647"/>
+                  </a:lnTo>
+                  <a:lnTo>
+                    <a:pt x="1854085" y="4855"/>
+                  </a:lnTo>
+                  <a:lnTo>
+                    <a:pt x="1850261" y="2648"/>
+                  </a:lnTo>
+                  <a:lnTo>
+                    <a:pt x="1846134" y="1083"/>
+                  </a:lnTo>
+                  <a:lnTo>
+                    <a:pt x="1841808" y="200"/>
+                  </a:lnTo>
+                  <a:lnTo>
+                    <a:pt x="1838502" y="0"/>
+                  </a:lnTo>
+                  <a:lnTo>
+                    <a:pt x="27431" y="0"/>
+                  </a:lnTo>
+                  <a:lnTo>
+                    <a:pt x="30738" y="200"/>
+                  </a:lnTo>
+                  <a:lnTo>
+                    <a:pt x="26327" y="22"/>
+                  </a:lnTo>
+                  <a:lnTo>
+                    <a:pt x="21944" y="554"/>
+                  </a:lnTo>
+                  <a:lnTo>
+                    <a:pt x="17704" y="1782"/>
+                  </a:lnTo>
+                  <a:lnTo>
+                    <a:pt x="13716" y="3675"/>
+                  </a:lnTo>
+                  <a:lnTo>
+                    <a:pt x="10082" y="6183"/>
+                  </a:lnTo>
+                  <a:lnTo>
+                    <a:pt x="6898" y="9241"/>
+                  </a:lnTo>
+                  <a:lnTo>
+                    <a:pt x="4246" y="12770"/>
+                  </a:lnTo>
+                  <a:lnTo>
+                    <a:pt x="2195" y="16679"/>
+                  </a:lnTo>
+                  <a:lnTo>
+                    <a:pt x="797" y="20867"/>
+                  </a:lnTo>
+                  <a:lnTo>
+                    <a:pt x="88" y="25224"/>
+                  </a:lnTo>
+                  <a:lnTo>
+                    <a:pt x="0" y="27431"/>
+                  </a:lnTo>
+                  <a:lnTo>
+                    <a:pt x="0" y="173673"/>
+                  </a:lnTo>
+                  <a:lnTo>
+                    <a:pt x="88" y="171466"/>
+                  </a:lnTo>
+                  <a:lnTo>
+                    <a:pt x="88" y="175880"/>
+                  </a:lnTo>
+                  <a:lnTo>
+                    <a:pt x="797" y="180238"/>
+                  </a:lnTo>
+                  <a:lnTo>
+                    <a:pt x="2195" y="184425"/>
+                  </a:lnTo>
+                  <a:lnTo>
+                    <a:pt x="4246" y="188334"/>
+                  </a:lnTo>
+                  <a:lnTo>
+                    <a:pt x="6898" y="191864"/>
+                  </a:lnTo>
+                  <a:lnTo>
+                    <a:pt x="10082" y="194922"/>
+                  </a:lnTo>
+                  <a:lnTo>
+                    <a:pt x="13716" y="197430"/>
+                  </a:lnTo>
+                  <a:lnTo>
+                    <a:pt x="17704" y="199322"/>
+                  </a:lnTo>
+                  <a:lnTo>
+                    <a:pt x="21944" y="200551"/>
+                  </a:lnTo>
+                  <a:lnTo>
+                    <a:pt x="26327" y="201083"/>
+                  </a:lnTo>
+                  <a:close/>
+                </a:path>
+              </a:pathLst>
+            </a:custGeom>
+            <a:solidFill>
+              <a:srgbClr val="FFFFFF">
+                <a:alpha val="100000"/>
+              </a:srgbClr>
+            </a:solidFill>
+          </p:spPr>
+          <p:txBody>
+            <a:bodyPr/>
+            <a:lstStyle/>
+            <a:p/>
+          </p:txBody>
+        </p:sp>
+        <p:sp>
+          <p:nvSpPr>
+            <p:cNvPr id="49" name="tx47"/>
+            <p:cNvSpPr/>
+            <p:nvPr/>
+          </p:nvSpPr>
+          <p:spPr>
+            <a:xfrm>
+              <a:off x="2112695" y="3865569"/>
+              <a:ext cx="1829358" cy="213307"/>
+            </a:xfrm>
+            <a:prstGeom prst="rect">
+              <a:avLst/>
+            </a:prstGeom>
+            <a:noFill/>
+          </p:spPr>
+          <p:txBody>
+            <a:bodyPr lIns="0" rIns="0" tIns="0" bIns="0" anchorCtr="1" anchor="ctr" wrap="none"/>
+            <a:lstStyle/>
+            <a:p>
+              <a:pPr algn="l" marL="0" marR="0" indent="0">
+                <a:lnSpc>
+                  <a:spcPts val="1800"/>
+                </a:lnSpc>
+                <a:spcBef>
+                  <a:spcPts val="0"/>
+                </a:spcBef>
+                <a:spcAft>
+                  <a:spcPts val="0"/>
+                </a:spcAft>
+              </a:pPr>
+              <a:r>
+                <a:rPr sz="1800" b="1">
+                  <a:solidFill>
+                    <a:srgbClr val="FFC35A">
+                      <a:alpha val="100000"/>
+                    </a:srgbClr>
+                  </a:solidFill>
+                  <a:latin typeface="Helvetica"/>
+                  <a:cs typeface="Helvetica"/>
+                </a:rPr>
+                <a:t>EV (sold in 2030)</a:t>
+              </a:r>
+            </a:p>
+          </p:txBody>
+        </p:sp>
+        <p:sp>
+          <p:nvSpPr>
+            <p:cNvPr id="50" name="pg48"/>
+            <p:cNvSpPr/>
+            <p:nvPr/>
+          </p:nvSpPr>
+          <p:spPr>
+            <a:xfrm>
+              <a:off x="2094407" y="3896059"/>
+              <a:ext cx="1865934" cy="201105"/>
+            </a:xfrm>
+            <a:custGeom>
+              <a:avLst/>
+              <a:pathLst>
+                <a:path w="1865934" h="201105">
+                  <a:moveTo>
+                    <a:pt x="27431" y="201105"/>
+                  </a:moveTo>
+                  <a:lnTo>
+                    <a:pt x="1838502" y="201105"/>
+                  </a:lnTo>
+                  <a:lnTo>
+                    <a:pt x="1837397" y="201083"/>
+                  </a:lnTo>
+                  <a:lnTo>
+                    <a:pt x="1841808" y="200905"/>
+                  </a:lnTo>
+                  <a:lnTo>
+                    <a:pt x="1846134" y="200022"/>
+                  </a:lnTo>
+                  <a:lnTo>
+                    <a:pt x="1850261" y="198456"/>
+                  </a:lnTo>
+                  <a:lnTo>
+                    <a:pt x="1854085" y="196249"/>
+                  </a:lnTo>
+                  <a:lnTo>
+                    <a:pt x="1857504" y="193457"/>
+                  </a:lnTo>
+                  <a:lnTo>
+                    <a:pt x="1860432" y="190153"/>
+                  </a:lnTo>
+                  <a:lnTo>
+                    <a:pt x="1862791" y="186421"/>
+                  </a:lnTo>
+                  <a:lnTo>
+                    <a:pt x="1864522" y="182360"/>
+                  </a:lnTo>
+                  <a:lnTo>
+                    <a:pt x="1865578" y="178073"/>
+                  </a:lnTo>
+                  <a:lnTo>
+                    <a:pt x="1865934" y="173673"/>
+                  </a:lnTo>
+                  <a:lnTo>
+                    <a:pt x="1865934" y="27431"/>
+                  </a:lnTo>
+                  <a:lnTo>
+                    <a:pt x="1865578" y="23031"/>
+                  </a:lnTo>
+                  <a:lnTo>
+                    <a:pt x="1864522" y="18745"/>
+                  </a:lnTo>
+                  <a:lnTo>
+                    <a:pt x="1862791" y="14683"/>
+                  </a:lnTo>
+                  <a:lnTo>
+                    <a:pt x="1860432" y="10952"/>
+                  </a:lnTo>
+                  <a:lnTo>
+                    <a:pt x="1857504" y="7647"/>
+                  </a:lnTo>
+                  <a:lnTo>
+                    <a:pt x="1854085" y="4855"/>
+                  </a:lnTo>
+                  <a:lnTo>
+                    <a:pt x="1850261" y="2648"/>
+                  </a:lnTo>
+                  <a:lnTo>
+                    <a:pt x="1846134" y="1083"/>
+                  </a:lnTo>
+                  <a:lnTo>
+                    <a:pt x="1841808" y="200"/>
+                  </a:lnTo>
+                  <a:lnTo>
+                    <a:pt x="1838502" y="0"/>
+                  </a:lnTo>
+                  <a:lnTo>
+                    <a:pt x="27431" y="0"/>
+                  </a:lnTo>
+                  <a:lnTo>
+                    <a:pt x="30738" y="200"/>
+                  </a:lnTo>
+                  <a:lnTo>
+                    <a:pt x="26327" y="22"/>
+                  </a:lnTo>
+                  <a:lnTo>
+                    <a:pt x="21944" y="554"/>
+                  </a:lnTo>
+                  <a:lnTo>
+                    <a:pt x="17704" y="1782"/>
+                  </a:lnTo>
+                  <a:lnTo>
+                    <a:pt x="13716" y="3675"/>
+                  </a:lnTo>
+                  <a:lnTo>
+                    <a:pt x="10082" y="6183"/>
+                  </a:lnTo>
+                  <a:lnTo>
+                    <a:pt x="6898" y="9241"/>
+                  </a:lnTo>
+                  <a:lnTo>
+                    <a:pt x="4246" y="12770"/>
+                  </a:lnTo>
+                  <a:lnTo>
+                    <a:pt x="2195" y="16679"/>
+                  </a:lnTo>
+                  <a:lnTo>
+                    <a:pt x="797" y="20867"/>
+                  </a:lnTo>
+                  <a:lnTo>
+                    <a:pt x="88" y="25224"/>
+                  </a:lnTo>
+                  <a:lnTo>
+                    <a:pt x="0" y="27431"/>
+                  </a:lnTo>
+                  <a:lnTo>
+                    <a:pt x="0" y="173673"/>
+                  </a:lnTo>
+                  <a:lnTo>
+                    <a:pt x="88" y="171466"/>
+                  </a:lnTo>
+                  <a:lnTo>
+                    <a:pt x="88" y="175880"/>
+                  </a:lnTo>
+                  <a:lnTo>
+                    <a:pt x="797" y="180238"/>
+                  </a:lnTo>
+                  <a:lnTo>
+                    <a:pt x="2195" y="184425"/>
+                  </a:lnTo>
+                  <a:lnTo>
+                    <a:pt x="4246" y="188334"/>
+                  </a:lnTo>
+                  <a:lnTo>
+                    <a:pt x="6898" y="191864"/>
+                  </a:lnTo>
+                  <a:lnTo>
+                    <a:pt x="10082" y="194922"/>
+                  </a:lnTo>
+                  <a:lnTo>
+                    <a:pt x="13716" y="197430"/>
+                  </a:lnTo>
+                  <a:lnTo>
+                    <a:pt x="17704" y="199322"/>
+                  </a:lnTo>
+                  <a:lnTo>
+                    <a:pt x="21944" y="200551"/>
+                  </a:lnTo>
+                  <a:lnTo>
+                    <a:pt x="26327" y="201083"/>
+                  </a:lnTo>
+                  <a:close/>
+                </a:path>
+              </a:pathLst>
+            </a:custGeom>
+            <a:solidFill>
+              <a:srgbClr val="FFFFFF">
+                <a:alpha val="100000"/>
+              </a:srgbClr>
+            </a:solidFill>
+          </p:spPr>
+          <p:txBody>
+            <a:bodyPr/>
+            <a:lstStyle/>
+            <a:p/>
+          </p:txBody>
+        </p:sp>
+        <p:sp>
+          <p:nvSpPr>
+            <p:cNvPr id="51" name="tx49"/>
+            <p:cNvSpPr/>
+            <p:nvPr/>
+          </p:nvSpPr>
+          <p:spPr>
+            <a:xfrm>
+              <a:off x="2112695" y="3865569"/>
+              <a:ext cx="1829358" cy="213307"/>
+            </a:xfrm>
+            <a:prstGeom prst="rect">
+              <a:avLst/>
+            </a:prstGeom>
+            <a:noFill/>
+          </p:spPr>
+          <p:txBody>
+            <a:bodyPr lIns="0" rIns="0" tIns="0" bIns="0" anchorCtr="1" anchor="ctr" wrap="none"/>
+            <a:lstStyle/>
+            <a:p>
+              <a:pPr algn="l" marL="0" marR="0" indent="0">
+                <a:lnSpc>
+                  <a:spcPts val="1800"/>
+                </a:lnSpc>
+                <a:spcBef>
+                  <a:spcPts val="0"/>
+                </a:spcBef>
+                <a:spcAft>
+                  <a:spcPts val="0"/>
+                </a:spcAft>
+              </a:pPr>
+              <a:r>
+                <a:rPr sz="1800" b="1">
+                  <a:solidFill>
+                    <a:srgbClr val="FFC35A">
                       <a:alpha val="100000"/>
                     </a:srgbClr>
                   </a:solidFill>
@@ -8325,7 +8325,7 @@
           </p:nvSpPr>
           <p:spPr>
             <a:xfrm>
-              <a:off x="3337922" y="4613218"/>
+              <a:off x="3041847" y="4613218"/>
               <a:ext cx="0" cy="56936"/>
             </a:xfrm>
             <a:custGeom>
@@ -8365,7 +8365,7 @@
           </p:nvSpPr>
           <p:spPr>
             <a:xfrm>
-              <a:off x="4818298" y="4613218"/>
+              <a:off x="4226147" y="4613218"/>
               <a:ext cx="0" cy="56936"/>
             </a:xfrm>
             <a:custGeom>
@@ -8405,7 +8405,7 @@
           </p:nvSpPr>
           <p:spPr>
             <a:xfrm>
-              <a:off x="6298673" y="4613218"/>
+              <a:off x="5410448" y="4613218"/>
               <a:ext cx="0" cy="56936"/>
             </a:xfrm>
             <a:custGeom>
@@ -8445,7 +8445,7 @@
           </p:nvSpPr>
           <p:spPr>
             <a:xfrm>
-              <a:off x="7779049" y="4613218"/>
+              <a:off x="6594748" y="4613218"/>
               <a:ext cx="0" cy="56936"/>
             </a:xfrm>
             <a:custGeom>
@@ -8479,7 +8479,47 @@
         </p:sp>
         <p:sp>
           <p:nvSpPr>
-            <p:cNvPr id="60" name="tx58"/>
+            <p:cNvPr id="60" name="pl58"/>
+            <p:cNvSpPr/>
+            <p:nvPr/>
+          </p:nvSpPr>
+          <p:spPr>
+            <a:xfrm>
+              <a:off x="7779049" y="4613218"/>
+              <a:ext cx="0" cy="56936"/>
+            </a:xfrm>
+            <a:custGeom>
+              <a:avLst/>
+              <a:pathLst>
+                <a:path w="0" h="56936">
+                  <a:moveTo>
+                    <a:pt x="0" y="56936"/>
+                  </a:moveTo>
+                  <a:lnTo>
+                    <a:pt x="0" y="0"/>
+                  </a:lnTo>
+                </a:path>
+              </a:pathLst>
+            </a:custGeom>
+            <a:ln w="7143" cap="flat">
+              <a:solidFill>
+                <a:srgbClr val="000000">
+                  <a:alpha val="100000"/>
+                </a:srgbClr>
+              </a:solidFill>
+              <a:prstDash val="solid"/>
+              <a:round/>
+            </a:ln>
+          </p:spPr>
+          <p:txBody>
+            <a:bodyPr/>
+            <a:lstStyle/>
+            <a:p/>
+          </p:txBody>
+        </p:sp>
+        <p:sp>
+          <p:nvSpPr>
+            <p:cNvPr id="61" name="tx59"/>
             <p:cNvSpPr/>
             <p:nvPr/>
           </p:nvSpPr>
@@ -8525,13 +8565,13 @@
         </p:sp>
         <p:sp>
           <p:nvSpPr>
-            <p:cNvPr id="61" name="tx59"/>
+            <p:cNvPr id="62" name="tx60"/>
             <p:cNvSpPr/>
             <p:nvPr/>
           </p:nvSpPr>
           <p:spPr>
             <a:xfrm>
-              <a:off x="3147217" y="4715480"/>
+              <a:off x="2851142" y="4715480"/>
               <a:ext cx="381409" cy="164194"/>
             </a:xfrm>
             <a:prstGeom prst="rect">
@@ -8571,13 +8611,13 @@
         </p:sp>
         <p:sp>
           <p:nvSpPr>
-            <p:cNvPr id="62" name="tx60"/>
+            <p:cNvPr id="63" name="tx61"/>
             <p:cNvSpPr/>
             <p:nvPr/>
           </p:nvSpPr>
           <p:spPr>
             <a:xfrm>
-              <a:off x="4564025" y="4715480"/>
+              <a:off x="3971875" y="4715480"/>
               <a:ext cx="508545" cy="164194"/>
             </a:xfrm>
             <a:prstGeom prst="rect">
@@ -8617,13 +8657,13 @@
         </p:sp>
         <p:sp>
           <p:nvSpPr>
-            <p:cNvPr id="63" name="tx61"/>
+            <p:cNvPr id="64" name="tx62"/>
             <p:cNvSpPr/>
             <p:nvPr/>
           </p:nvSpPr>
           <p:spPr>
             <a:xfrm>
-              <a:off x="6044400" y="4715480"/>
+              <a:off x="5156175" y="4715480"/>
               <a:ext cx="508545" cy="164194"/>
             </a:xfrm>
             <a:prstGeom prst="rect">
@@ -8663,13 +8703,13 @@
         </p:sp>
         <p:sp>
           <p:nvSpPr>
-            <p:cNvPr id="64" name="tx62"/>
+            <p:cNvPr id="65" name="tx63"/>
             <p:cNvSpPr/>
             <p:nvPr/>
           </p:nvSpPr>
           <p:spPr>
             <a:xfrm>
-              <a:off x="7524776" y="4714922"/>
+              <a:off x="6340476" y="4714922"/>
               <a:ext cx="508545" cy="164752"/>
             </a:xfrm>
             <a:prstGeom prst="rect">
@@ -8709,7 +8749,53 @@
         </p:sp>
         <p:sp>
           <p:nvSpPr>
-            <p:cNvPr id="65" name="tx63"/>
+            <p:cNvPr id="66" name="tx64"/>
+            <p:cNvSpPr/>
+            <p:nvPr/>
+          </p:nvSpPr>
+          <p:spPr>
+            <a:xfrm>
+              <a:off x="7524776" y="4714922"/>
+              <a:ext cx="508545" cy="164752"/>
+            </a:xfrm>
+            <a:prstGeom prst="rect">
+              <a:avLst/>
+            </a:prstGeom>
+            <a:noFill/>
+          </p:spPr>
+          <p:txBody>
+            <a:bodyPr lIns="0" rIns="0" tIns="0" bIns="0" anchorCtr="1" anchor="ctr" wrap="none"/>
+            <a:lstStyle/>
+            <a:p>
+              <a:pPr algn="l" marL="0" marR="0" indent="0">
+                <a:lnSpc>
+                  <a:spcPts val="1800"/>
+                </a:lnSpc>
+                <a:spcBef>
+                  <a:spcPts val="0"/>
+                </a:spcBef>
+                <a:spcAft>
+                  <a:spcPts val="0"/>
+                </a:spcAft>
+              </a:pPr>
+              <a:r>
+                <a:rPr sz="1800">
+                  <a:solidFill>
+                    <a:srgbClr val="000000">
+                      <a:alpha val="100000"/>
+                    </a:srgbClr>
+                  </a:solidFill>
+                  <a:latin typeface="Helvetica"/>
+                  <a:cs typeface="Helvetica"/>
+                </a:rPr>
+                <a:t>2500</a:t>
+              </a:r>
+            </a:p>
+          </p:txBody>
+        </p:sp>
+        <p:sp>
+          <p:nvSpPr>
+            <p:cNvPr id="67" name="tx65"/>
             <p:cNvSpPr/>
             <p:nvPr/>
           </p:nvSpPr>

</xml_diff>

<commit_message>
updated charts and documentation
</commit_message>
<xml_diff>
--- a/atlas/co2_ev-vs-diesel/co2_ev-vs-diesel_normal/co2_ev-vs-diesel_normal_normal.pptx
+++ b/atlas/co2_ev-vs-diesel/co2_ev-vs-diesel_normal/co2_ev-vs-diesel_normal_normal.pptx
@@ -3799,8 +3799,8 @@
           </p:nvSpPr>
           <p:spPr>
             <a:xfrm>
-              <a:off x="1857546" y="91439"/>
-              <a:ext cx="6010325" cy="4521778"/>
+              <a:off x="1184360" y="91439"/>
+              <a:ext cx="6683511" cy="4521778"/>
             </a:xfrm>
             <a:prstGeom prst="rect">
               <a:avLst/>
@@ -3825,21 +3825,21 @@
           </p:nvSpPr>
           <p:spPr>
             <a:xfrm>
-              <a:off x="1857546" y="3380006"/>
-              <a:ext cx="6010325" cy="0"/>
+              <a:off x="1184360" y="91439"/>
+              <a:ext cx="0" cy="4521778"/>
             </a:xfrm>
             <a:custGeom>
               <a:avLst/>
               <a:pathLst>
-                <a:path w="6010325" h="0">
+                <a:path w="0" h="4521778">
                   <a:moveTo>
+                    <a:pt x="0" y="4521778"/>
+                  </a:moveTo>
+                  <a:lnTo>
                     <a:pt x="0" y="0"/>
-                  </a:moveTo>
-                  <a:lnTo>
-                    <a:pt x="6010325" y="0"/>
-                  </a:lnTo>
-                  <a:lnTo>
-                    <a:pt x="6010325" y="0"/>
+                  </a:lnTo>
+                  <a:lnTo>
+                    <a:pt x="0" y="0"/>
                   </a:lnTo>
                 </a:path>
               </a:pathLst>
@@ -3868,21 +3868,21 @@
           </p:nvSpPr>
           <p:spPr>
             <a:xfrm>
-              <a:off x="1857546" y="1324652"/>
-              <a:ext cx="6010325" cy="0"/>
+              <a:off x="2501308" y="91439"/>
+              <a:ext cx="0" cy="4521778"/>
             </a:xfrm>
             <a:custGeom>
               <a:avLst/>
               <a:pathLst>
-                <a:path w="6010325" h="0">
+                <a:path w="0" h="4521778">
                   <a:moveTo>
+                    <a:pt x="0" y="4521778"/>
+                  </a:moveTo>
+                  <a:lnTo>
                     <a:pt x="0" y="0"/>
-                  </a:moveTo>
-                  <a:lnTo>
-                    <a:pt x="6010325" y="0"/>
-                  </a:lnTo>
-                  <a:lnTo>
-                    <a:pt x="6010325" y="0"/>
+                  </a:lnTo>
+                  <a:lnTo>
+                    <a:pt x="0" y="0"/>
                   </a:lnTo>
                 </a:path>
               </a:pathLst>
@@ -3905,14 +3905,186 @@
         </p:sp>
         <p:sp>
           <p:nvSpPr>
-            <p:cNvPr id="10" name="rc8"/>
+            <p:cNvPr id="10" name="pl8"/>
             <p:cNvSpPr/>
             <p:nvPr/>
           </p:nvSpPr>
           <p:spPr>
             <a:xfrm>
-              <a:off x="1857546" y="433998"/>
-              <a:ext cx="4899112" cy="548094"/>
+              <a:off x="3818256" y="91439"/>
+              <a:ext cx="0" cy="4521778"/>
+            </a:xfrm>
+            <a:custGeom>
+              <a:avLst/>
+              <a:pathLst>
+                <a:path w="0" h="4521778">
+                  <a:moveTo>
+                    <a:pt x="0" y="4521778"/>
+                  </a:moveTo>
+                  <a:lnTo>
+                    <a:pt x="0" y="0"/>
+                  </a:lnTo>
+                  <a:lnTo>
+                    <a:pt x="0" y="0"/>
+                  </a:lnTo>
+                </a:path>
+              </a:pathLst>
+            </a:custGeom>
+            <a:ln w="4762" cap="flat">
+              <a:solidFill>
+                <a:srgbClr val="C3C7CB">
+                  <a:alpha val="100000"/>
+                </a:srgbClr>
+              </a:solidFill>
+              <a:prstDash val="solid"/>
+              <a:round/>
+            </a:ln>
+          </p:spPr>
+          <p:txBody>
+            <a:bodyPr/>
+            <a:lstStyle/>
+            <a:p/>
+          </p:txBody>
+        </p:sp>
+        <p:sp>
+          <p:nvSpPr>
+            <p:cNvPr id="11" name="pl9"/>
+            <p:cNvSpPr/>
+            <p:nvPr/>
+          </p:nvSpPr>
+          <p:spPr>
+            <a:xfrm>
+              <a:off x="5135204" y="91439"/>
+              <a:ext cx="0" cy="4521778"/>
+            </a:xfrm>
+            <a:custGeom>
+              <a:avLst/>
+              <a:pathLst>
+                <a:path w="0" h="4521778">
+                  <a:moveTo>
+                    <a:pt x="0" y="4521778"/>
+                  </a:moveTo>
+                  <a:lnTo>
+                    <a:pt x="0" y="0"/>
+                  </a:lnTo>
+                  <a:lnTo>
+                    <a:pt x="0" y="0"/>
+                  </a:lnTo>
+                </a:path>
+              </a:pathLst>
+            </a:custGeom>
+            <a:ln w="4762" cap="flat">
+              <a:solidFill>
+                <a:srgbClr val="C3C7CB">
+                  <a:alpha val="100000"/>
+                </a:srgbClr>
+              </a:solidFill>
+              <a:prstDash val="solid"/>
+              <a:round/>
+            </a:ln>
+          </p:spPr>
+          <p:txBody>
+            <a:bodyPr/>
+            <a:lstStyle/>
+            <a:p/>
+          </p:txBody>
+        </p:sp>
+        <p:sp>
+          <p:nvSpPr>
+            <p:cNvPr id="12" name="pl10"/>
+            <p:cNvSpPr/>
+            <p:nvPr/>
+          </p:nvSpPr>
+          <p:spPr>
+            <a:xfrm>
+              <a:off x="6452152" y="91439"/>
+              <a:ext cx="0" cy="4521778"/>
+            </a:xfrm>
+            <a:custGeom>
+              <a:avLst/>
+              <a:pathLst>
+                <a:path w="0" h="4521778">
+                  <a:moveTo>
+                    <a:pt x="0" y="4521778"/>
+                  </a:moveTo>
+                  <a:lnTo>
+                    <a:pt x="0" y="0"/>
+                  </a:lnTo>
+                  <a:lnTo>
+                    <a:pt x="0" y="0"/>
+                  </a:lnTo>
+                </a:path>
+              </a:pathLst>
+            </a:custGeom>
+            <a:ln w="4762" cap="flat">
+              <a:solidFill>
+                <a:srgbClr val="C3C7CB">
+                  <a:alpha val="100000"/>
+                </a:srgbClr>
+              </a:solidFill>
+              <a:prstDash val="solid"/>
+              <a:round/>
+            </a:ln>
+          </p:spPr>
+          <p:txBody>
+            <a:bodyPr/>
+            <a:lstStyle/>
+            <a:p/>
+          </p:txBody>
+        </p:sp>
+        <p:sp>
+          <p:nvSpPr>
+            <p:cNvPr id="13" name="pl11"/>
+            <p:cNvSpPr/>
+            <p:nvPr/>
+          </p:nvSpPr>
+          <p:spPr>
+            <a:xfrm>
+              <a:off x="7769100" y="91439"/>
+              <a:ext cx="0" cy="4521778"/>
+            </a:xfrm>
+            <a:custGeom>
+              <a:avLst/>
+              <a:pathLst>
+                <a:path w="0" h="4521778">
+                  <a:moveTo>
+                    <a:pt x="0" y="4521778"/>
+                  </a:moveTo>
+                  <a:lnTo>
+                    <a:pt x="0" y="0"/>
+                  </a:lnTo>
+                  <a:lnTo>
+                    <a:pt x="0" y="0"/>
+                  </a:lnTo>
+                </a:path>
+              </a:pathLst>
+            </a:custGeom>
+            <a:ln w="4762" cap="flat">
+              <a:solidFill>
+                <a:srgbClr val="C3C7CB">
+                  <a:alpha val="100000"/>
+                </a:srgbClr>
+              </a:solidFill>
+              <a:prstDash val="solid"/>
+              <a:round/>
+            </a:ln>
+          </p:spPr>
+          <p:txBody>
+            <a:bodyPr/>
+            <a:lstStyle/>
+            <a:p/>
+          </p:txBody>
+        </p:sp>
+        <p:sp>
+          <p:nvSpPr>
+            <p:cNvPr id="14" name="rc12"/>
+            <p:cNvSpPr/>
+            <p:nvPr/>
+          </p:nvSpPr>
+          <p:spPr>
+            <a:xfrm>
+              <a:off x="1184360" y="433998"/>
+              <a:ext cx="5447837" cy="548094"/>
             </a:xfrm>
             <a:prstGeom prst="rect">
               <a:avLst/>
@@ -3940,14 +4112,14 @@
         </p:sp>
         <p:sp>
           <p:nvSpPr>
-            <p:cNvPr id="11" name="rc9"/>
+            <p:cNvPr id="15" name="rc13"/>
             <p:cNvSpPr/>
             <p:nvPr/>
           </p:nvSpPr>
           <p:spPr>
             <a:xfrm>
-              <a:off x="1857546" y="1050605"/>
-              <a:ext cx="2544979" cy="548094"/>
+              <a:off x="1184360" y="1050605"/>
+              <a:ext cx="2830030" cy="548094"/>
             </a:xfrm>
             <a:prstGeom prst="rect">
               <a:avLst/>
@@ -3975,14 +4147,14 @@
         </p:sp>
         <p:sp>
           <p:nvSpPr>
-            <p:cNvPr id="12" name="rc10"/>
+            <p:cNvPr id="16" name="rc14"/>
             <p:cNvSpPr/>
             <p:nvPr/>
           </p:nvSpPr>
           <p:spPr>
             <a:xfrm>
-              <a:off x="1857546" y="1667211"/>
-              <a:ext cx="662073" cy="548094"/>
+              <a:off x="1184360" y="1667211"/>
+              <a:ext cx="736228" cy="548094"/>
             </a:xfrm>
             <a:prstGeom prst="rect">
               <a:avLst/>
@@ -4010,14 +4182,14 @@
         </p:sp>
         <p:sp>
           <p:nvSpPr>
-            <p:cNvPr id="13" name="rc11"/>
+            <p:cNvPr id="17" name="rc15"/>
             <p:cNvSpPr/>
             <p:nvPr/>
           </p:nvSpPr>
           <p:spPr>
             <a:xfrm>
-              <a:off x="1857546" y="2489352"/>
-              <a:ext cx="1283399" cy="548094"/>
+              <a:off x="1184360" y="2489352"/>
+              <a:ext cx="1427147" cy="548094"/>
             </a:xfrm>
             <a:prstGeom prst="rect">
               <a:avLst/>
@@ -4045,14 +4217,14 @@
         </p:sp>
         <p:sp>
           <p:nvSpPr>
-            <p:cNvPr id="14" name="rc12"/>
+            <p:cNvPr id="18" name="rc16"/>
             <p:cNvSpPr/>
             <p:nvPr/>
           </p:nvSpPr>
           <p:spPr>
             <a:xfrm>
-              <a:off x="1857546" y="3105958"/>
-              <a:ext cx="755649" cy="548094"/>
+              <a:off x="1184360" y="3105958"/>
+              <a:ext cx="840286" cy="548094"/>
             </a:xfrm>
             <a:prstGeom prst="rect">
               <a:avLst/>
@@ -4080,14 +4252,14 @@
         </p:sp>
         <p:sp>
           <p:nvSpPr>
-            <p:cNvPr id="15" name="rc13"/>
+            <p:cNvPr id="19" name="rc17"/>
             <p:cNvSpPr/>
             <p:nvPr/>
           </p:nvSpPr>
           <p:spPr>
             <a:xfrm>
-              <a:off x="1857546" y="3722565"/>
-              <a:ext cx="170803" cy="548094"/>
+              <a:off x="1184360" y="3722565"/>
+              <a:ext cx="189933" cy="548094"/>
             </a:xfrm>
             <a:prstGeom prst="rect">
               <a:avLst/>
@@ -4115,13 +4287,13 @@
         </p:sp>
         <p:sp>
           <p:nvSpPr>
-            <p:cNvPr id="16" name="pg14"/>
+            <p:cNvPr id="20" name="pg18"/>
             <p:cNvSpPr/>
             <p:nvPr/>
           </p:nvSpPr>
           <p:spPr>
             <a:xfrm>
-              <a:off x="3207649" y="2662847"/>
+              <a:off x="2685681" y="2662847"/>
               <a:ext cx="710097" cy="201105"/>
             </a:xfrm>
             <a:custGeom>
@@ -4216,7 +4388,7 @@
                     <a:pt x="17704" y="1782"/>
                   </a:lnTo>
                   <a:lnTo>
-                    <a:pt x="13715" y="3675"/>
+                    <a:pt x="13716" y="3675"/>
                   </a:lnTo>
                   <a:lnTo>
                     <a:pt x="10082" y="6183"/>
@@ -4264,455 +4436,7 @@
                     <a:pt x="10082" y="194922"/>
                   </a:lnTo>
                   <a:lnTo>
-                    <a:pt x="13715" y="197430"/>
-                  </a:lnTo>
-                  <a:lnTo>
-                    <a:pt x="17704" y="199322"/>
-                  </a:lnTo>
-                  <a:lnTo>
-                    <a:pt x="21944" y="200551"/>
-                  </a:lnTo>
-                  <a:lnTo>
-                    <a:pt x="26327" y="201083"/>
-                  </a:lnTo>
-                  <a:close/>
-                </a:path>
-              </a:pathLst>
-            </a:custGeom>
-            <a:solidFill>
-              <a:srgbClr val="FFFFFF">
-                <a:alpha val="100000"/>
-              </a:srgbClr>
-            </a:solidFill>
-          </p:spPr>
-          <p:txBody>
-            <a:bodyPr/>
-            <a:lstStyle/>
-            <a:p/>
-          </p:txBody>
-        </p:sp>
-        <p:sp>
-          <p:nvSpPr>
-            <p:cNvPr id="17" name="tx15"/>
-            <p:cNvSpPr/>
-            <p:nvPr/>
-          </p:nvSpPr>
-          <p:spPr>
-            <a:xfrm>
-              <a:off x="3225937" y="2676000"/>
-              <a:ext cx="673521" cy="169664"/>
-            </a:xfrm>
-            <a:prstGeom prst="rect">
-              <a:avLst/>
-            </a:prstGeom>
-            <a:noFill/>
-          </p:spPr>
-          <p:txBody>
-            <a:bodyPr lIns="0" rIns="0" tIns="0" bIns="0" anchorCtr="1" anchor="ctr" wrap="none"/>
-            <a:lstStyle/>
-            <a:p>
-              <a:pPr algn="l" marL="0" marR="0" indent="0">
-                <a:lnSpc>
-                  <a:spcPts val="1800"/>
-                </a:lnSpc>
-                <a:spcBef>
-                  <a:spcPts val="0"/>
-                </a:spcBef>
-                <a:spcAft>
-                  <a:spcPts val="0"/>
-                </a:spcAft>
-              </a:pPr>
-              <a:r>
-                <a:rPr sz="1800" b="1">
-                  <a:solidFill>
-                    <a:srgbClr val="A02226">
-                      <a:alpha val="100000"/>
-                    </a:srgbClr>
-                  </a:solidFill>
-                  <a:latin typeface="Helvetica"/>
-                  <a:cs typeface="Helvetica"/>
-                </a:rPr>
-                <a:t>Diesel</a:t>
-              </a:r>
-            </a:p>
-          </p:txBody>
-        </p:sp>
-        <p:sp>
-          <p:nvSpPr>
-            <p:cNvPr id="18" name="pg16"/>
-            <p:cNvSpPr/>
-            <p:nvPr/>
-          </p:nvSpPr>
-          <p:spPr>
-            <a:xfrm>
-              <a:off x="3207649" y="2662847"/>
-              <a:ext cx="710097" cy="201105"/>
-            </a:xfrm>
-            <a:custGeom>
-              <a:avLst/>
-              <a:pathLst>
-                <a:path w="710097" h="201105">
-                  <a:moveTo>
-                    <a:pt x="27431" y="201105"/>
-                  </a:moveTo>
-                  <a:lnTo>
-                    <a:pt x="682665" y="201105"/>
-                  </a:lnTo>
-                  <a:lnTo>
-                    <a:pt x="681561" y="201083"/>
-                  </a:lnTo>
-                  <a:lnTo>
-                    <a:pt x="685972" y="200905"/>
-                  </a:lnTo>
-                  <a:lnTo>
-                    <a:pt x="690297" y="200022"/>
-                  </a:lnTo>
-                  <a:lnTo>
-                    <a:pt x="694425" y="198456"/>
-                  </a:lnTo>
-                  <a:lnTo>
-                    <a:pt x="698248" y="196249"/>
-                  </a:lnTo>
-                  <a:lnTo>
-                    <a:pt x="701668" y="193457"/>
-                  </a:lnTo>
-                  <a:lnTo>
-                    <a:pt x="704595" y="190153"/>
-                  </a:lnTo>
-                  <a:lnTo>
-                    <a:pt x="706955" y="186421"/>
-                  </a:lnTo>
-                  <a:lnTo>
-                    <a:pt x="708685" y="182360"/>
-                  </a:lnTo>
-                  <a:lnTo>
-                    <a:pt x="709742" y="178073"/>
-                  </a:lnTo>
-                  <a:lnTo>
-                    <a:pt x="710097" y="173673"/>
-                  </a:lnTo>
-                  <a:lnTo>
-                    <a:pt x="710097" y="27431"/>
-                  </a:lnTo>
-                  <a:lnTo>
-                    <a:pt x="709742" y="23031"/>
-                  </a:lnTo>
-                  <a:lnTo>
-                    <a:pt x="708685" y="18745"/>
-                  </a:lnTo>
-                  <a:lnTo>
-                    <a:pt x="706955" y="14683"/>
-                  </a:lnTo>
-                  <a:lnTo>
-                    <a:pt x="704595" y="10952"/>
-                  </a:lnTo>
-                  <a:lnTo>
-                    <a:pt x="701668" y="7647"/>
-                  </a:lnTo>
-                  <a:lnTo>
-                    <a:pt x="698248" y="4855"/>
-                  </a:lnTo>
-                  <a:lnTo>
-                    <a:pt x="694425" y="2648"/>
-                  </a:lnTo>
-                  <a:lnTo>
-                    <a:pt x="690297" y="1083"/>
-                  </a:lnTo>
-                  <a:lnTo>
-                    <a:pt x="685972" y="200"/>
-                  </a:lnTo>
-                  <a:lnTo>
-                    <a:pt x="682665" y="0"/>
-                  </a:lnTo>
-                  <a:lnTo>
-                    <a:pt x="27431" y="0"/>
-                  </a:lnTo>
-                  <a:lnTo>
-                    <a:pt x="30738" y="200"/>
-                  </a:lnTo>
-                  <a:lnTo>
-                    <a:pt x="26327" y="22"/>
-                  </a:lnTo>
-                  <a:lnTo>
-                    <a:pt x="21944" y="554"/>
-                  </a:lnTo>
-                  <a:lnTo>
-                    <a:pt x="17704" y="1782"/>
-                  </a:lnTo>
-                  <a:lnTo>
-                    <a:pt x="13715" y="3675"/>
-                  </a:lnTo>
-                  <a:lnTo>
-                    <a:pt x="10082" y="6183"/>
-                  </a:lnTo>
-                  <a:lnTo>
-                    <a:pt x="6898" y="9241"/>
-                  </a:lnTo>
-                  <a:lnTo>
-                    <a:pt x="4246" y="12770"/>
-                  </a:lnTo>
-                  <a:lnTo>
-                    <a:pt x="2195" y="16679"/>
-                  </a:lnTo>
-                  <a:lnTo>
-                    <a:pt x="797" y="20867"/>
-                  </a:lnTo>
-                  <a:lnTo>
-                    <a:pt x="88" y="25224"/>
-                  </a:lnTo>
-                  <a:lnTo>
-                    <a:pt x="0" y="27431"/>
-                  </a:lnTo>
-                  <a:lnTo>
-                    <a:pt x="0" y="173673"/>
-                  </a:lnTo>
-                  <a:lnTo>
-                    <a:pt x="88" y="171466"/>
-                  </a:lnTo>
-                  <a:lnTo>
-                    <a:pt x="88" y="175880"/>
-                  </a:lnTo>
-                  <a:lnTo>
-                    <a:pt x="797" y="180238"/>
-                  </a:lnTo>
-                  <a:lnTo>
-                    <a:pt x="2195" y="184425"/>
-                  </a:lnTo>
-                  <a:lnTo>
-                    <a:pt x="4246" y="188334"/>
-                  </a:lnTo>
-                  <a:lnTo>
-                    <a:pt x="6898" y="191864"/>
-                  </a:lnTo>
-                  <a:lnTo>
-                    <a:pt x="10082" y="194922"/>
-                  </a:lnTo>
-                  <a:lnTo>
-                    <a:pt x="13715" y="197430"/>
-                  </a:lnTo>
-                  <a:lnTo>
-                    <a:pt x="17704" y="199322"/>
-                  </a:lnTo>
-                  <a:lnTo>
-                    <a:pt x="21944" y="200551"/>
-                  </a:lnTo>
-                  <a:lnTo>
-                    <a:pt x="26327" y="201083"/>
-                  </a:lnTo>
-                  <a:close/>
-                </a:path>
-              </a:pathLst>
-            </a:custGeom>
-            <a:solidFill>
-              <a:srgbClr val="FFFFFF">
-                <a:alpha val="100000"/>
-              </a:srgbClr>
-            </a:solidFill>
-          </p:spPr>
-          <p:txBody>
-            <a:bodyPr/>
-            <a:lstStyle/>
-            <a:p/>
-          </p:txBody>
-        </p:sp>
-        <p:sp>
-          <p:nvSpPr>
-            <p:cNvPr id="19" name="tx17"/>
-            <p:cNvSpPr/>
-            <p:nvPr/>
-          </p:nvSpPr>
-          <p:spPr>
-            <a:xfrm>
-              <a:off x="3225937" y="2676000"/>
-              <a:ext cx="673521" cy="169664"/>
-            </a:xfrm>
-            <a:prstGeom prst="rect">
-              <a:avLst/>
-            </a:prstGeom>
-            <a:noFill/>
-          </p:spPr>
-          <p:txBody>
-            <a:bodyPr lIns="0" rIns="0" tIns="0" bIns="0" anchorCtr="1" anchor="ctr" wrap="none"/>
-            <a:lstStyle/>
-            <a:p>
-              <a:pPr algn="l" marL="0" marR="0" indent="0">
-                <a:lnSpc>
-                  <a:spcPts val="1800"/>
-                </a:lnSpc>
-                <a:spcBef>
-                  <a:spcPts val="0"/>
-                </a:spcBef>
-                <a:spcAft>
-                  <a:spcPts val="0"/>
-                </a:spcAft>
-              </a:pPr>
-              <a:r>
-                <a:rPr sz="1800" b="1">
-                  <a:solidFill>
-                    <a:srgbClr val="A02226">
-                      <a:alpha val="100000"/>
-                    </a:srgbClr>
-                  </a:solidFill>
-                  <a:latin typeface="Helvetica"/>
-                  <a:cs typeface="Helvetica"/>
-                </a:rPr>
-                <a:t>Diesel</a:t>
-              </a:r>
-            </a:p>
-          </p:txBody>
-        </p:sp>
-        <p:sp>
-          <p:nvSpPr>
-            <p:cNvPr id="20" name="pg18"/>
-            <p:cNvSpPr/>
-            <p:nvPr/>
-          </p:nvSpPr>
-          <p:spPr>
-            <a:xfrm>
-              <a:off x="3207649" y="2662847"/>
-              <a:ext cx="710097" cy="201105"/>
-            </a:xfrm>
-            <a:custGeom>
-              <a:avLst/>
-              <a:pathLst>
-                <a:path w="710097" h="201105">
-                  <a:moveTo>
-                    <a:pt x="27431" y="201105"/>
-                  </a:moveTo>
-                  <a:lnTo>
-                    <a:pt x="682665" y="201105"/>
-                  </a:lnTo>
-                  <a:lnTo>
-                    <a:pt x="681561" y="201083"/>
-                  </a:lnTo>
-                  <a:lnTo>
-                    <a:pt x="685972" y="200905"/>
-                  </a:lnTo>
-                  <a:lnTo>
-                    <a:pt x="690297" y="200022"/>
-                  </a:lnTo>
-                  <a:lnTo>
-                    <a:pt x="694425" y="198456"/>
-                  </a:lnTo>
-                  <a:lnTo>
-                    <a:pt x="698248" y="196249"/>
-                  </a:lnTo>
-                  <a:lnTo>
-                    <a:pt x="701668" y="193457"/>
-                  </a:lnTo>
-                  <a:lnTo>
-                    <a:pt x="704595" y="190153"/>
-                  </a:lnTo>
-                  <a:lnTo>
-                    <a:pt x="706955" y="186421"/>
-                  </a:lnTo>
-                  <a:lnTo>
-                    <a:pt x="708685" y="182360"/>
-                  </a:lnTo>
-                  <a:lnTo>
-                    <a:pt x="709742" y="178073"/>
-                  </a:lnTo>
-                  <a:lnTo>
-                    <a:pt x="710097" y="173673"/>
-                  </a:lnTo>
-                  <a:lnTo>
-                    <a:pt x="710097" y="27431"/>
-                  </a:lnTo>
-                  <a:lnTo>
-                    <a:pt x="709742" y="23031"/>
-                  </a:lnTo>
-                  <a:lnTo>
-                    <a:pt x="708685" y="18745"/>
-                  </a:lnTo>
-                  <a:lnTo>
-                    <a:pt x="706955" y="14683"/>
-                  </a:lnTo>
-                  <a:lnTo>
-                    <a:pt x="704595" y="10952"/>
-                  </a:lnTo>
-                  <a:lnTo>
-                    <a:pt x="701668" y="7647"/>
-                  </a:lnTo>
-                  <a:lnTo>
-                    <a:pt x="698248" y="4855"/>
-                  </a:lnTo>
-                  <a:lnTo>
-                    <a:pt x="694425" y="2648"/>
-                  </a:lnTo>
-                  <a:lnTo>
-                    <a:pt x="690297" y="1083"/>
-                  </a:lnTo>
-                  <a:lnTo>
-                    <a:pt x="685972" y="200"/>
-                  </a:lnTo>
-                  <a:lnTo>
-                    <a:pt x="682665" y="0"/>
-                  </a:lnTo>
-                  <a:lnTo>
-                    <a:pt x="27431" y="0"/>
-                  </a:lnTo>
-                  <a:lnTo>
-                    <a:pt x="30738" y="200"/>
-                  </a:lnTo>
-                  <a:lnTo>
-                    <a:pt x="26327" y="22"/>
-                  </a:lnTo>
-                  <a:lnTo>
-                    <a:pt x="21944" y="554"/>
-                  </a:lnTo>
-                  <a:lnTo>
-                    <a:pt x="17704" y="1782"/>
-                  </a:lnTo>
-                  <a:lnTo>
-                    <a:pt x="13715" y="3675"/>
-                  </a:lnTo>
-                  <a:lnTo>
-                    <a:pt x="10082" y="6183"/>
-                  </a:lnTo>
-                  <a:lnTo>
-                    <a:pt x="6898" y="9241"/>
-                  </a:lnTo>
-                  <a:lnTo>
-                    <a:pt x="4246" y="12770"/>
-                  </a:lnTo>
-                  <a:lnTo>
-                    <a:pt x="2195" y="16679"/>
-                  </a:lnTo>
-                  <a:lnTo>
-                    <a:pt x="797" y="20867"/>
-                  </a:lnTo>
-                  <a:lnTo>
-                    <a:pt x="88" y="25224"/>
-                  </a:lnTo>
-                  <a:lnTo>
-                    <a:pt x="0" y="27431"/>
-                  </a:lnTo>
-                  <a:lnTo>
-                    <a:pt x="0" y="173673"/>
-                  </a:lnTo>
-                  <a:lnTo>
-                    <a:pt x="88" y="171466"/>
-                  </a:lnTo>
-                  <a:lnTo>
-                    <a:pt x="88" y="175880"/>
-                  </a:lnTo>
-                  <a:lnTo>
-                    <a:pt x="797" y="180238"/>
-                  </a:lnTo>
-                  <a:lnTo>
-                    <a:pt x="2195" y="184425"/>
-                  </a:lnTo>
-                  <a:lnTo>
-                    <a:pt x="4246" y="188334"/>
-                  </a:lnTo>
-                  <a:lnTo>
-                    <a:pt x="6898" y="191864"/>
-                  </a:lnTo>
-                  <a:lnTo>
-                    <a:pt x="10082" y="194922"/>
-                  </a:lnTo>
-                  <a:lnTo>
-                    <a:pt x="13715" y="197430"/>
+                    <a:pt x="13716" y="197430"/>
                   </a:lnTo>
                   <a:lnTo>
                     <a:pt x="17704" y="199322"/>
@@ -4747,7 +4471,7 @@
           </p:nvSpPr>
           <p:spPr>
             <a:xfrm>
-              <a:off x="3225937" y="2676000"/>
+              <a:off x="2703969" y="2676000"/>
               <a:ext cx="673521" cy="169664"/>
             </a:xfrm>
             <a:prstGeom prst="rect">
@@ -4793,7 +4517,7 @@
           </p:nvSpPr>
           <p:spPr>
             <a:xfrm>
-              <a:off x="3207649" y="2662847"/>
+              <a:off x="2685681" y="2662847"/>
               <a:ext cx="710097" cy="201105"/>
             </a:xfrm>
             <a:custGeom>
@@ -4888,7 +4612,7 @@
                     <a:pt x="17704" y="1782"/>
                   </a:lnTo>
                   <a:lnTo>
-                    <a:pt x="13715" y="3675"/>
+                    <a:pt x="13716" y="3675"/>
                   </a:lnTo>
                   <a:lnTo>
                     <a:pt x="10082" y="6183"/>
@@ -4936,7 +4660,7 @@
                     <a:pt x="10082" y="194922"/>
                   </a:lnTo>
                   <a:lnTo>
-                    <a:pt x="13715" y="197430"/>
+                    <a:pt x="13716" y="197430"/>
                   </a:lnTo>
                   <a:lnTo>
                     <a:pt x="17704" y="199322"/>
@@ -4971,7 +4695,7 @@
           </p:nvSpPr>
           <p:spPr>
             <a:xfrm>
-              <a:off x="3225937" y="2676000"/>
+              <a:off x="2703969" y="2676000"/>
               <a:ext cx="673521" cy="169664"/>
             </a:xfrm>
             <a:prstGeom prst="rect">
@@ -5017,7 +4741,7 @@
           </p:nvSpPr>
           <p:spPr>
             <a:xfrm>
-              <a:off x="3207649" y="2662847"/>
+              <a:off x="2685681" y="2662847"/>
               <a:ext cx="710097" cy="201105"/>
             </a:xfrm>
             <a:custGeom>
@@ -5112,7 +4836,7 @@
                     <a:pt x="17704" y="1782"/>
                   </a:lnTo>
                   <a:lnTo>
-                    <a:pt x="13715" y="3675"/>
+                    <a:pt x="13716" y="3675"/>
                   </a:lnTo>
                   <a:lnTo>
                     <a:pt x="10082" y="6183"/>
@@ -5160,7 +4884,7 @@
                     <a:pt x="10082" y="194922"/>
                   </a:lnTo>
                   <a:lnTo>
-                    <a:pt x="13715" y="197430"/>
+                    <a:pt x="13716" y="197430"/>
                   </a:lnTo>
                   <a:lnTo>
                     <a:pt x="17704" y="199322"/>
@@ -5195,7 +4919,7 @@
           </p:nvSpPr>
           <p:spPr>
             <a:xfrm>
-              <a:off x="3225937" y="2676000"/>
+              <a:off x="2703969" y="2676000"/>
               <a:ext cx="673521" cy="169664"/>
             </a:xfrm>
             <a:prstGeom prst="rect">
@@ -5241,7 +4965,7 @@
           </p:nvSpPr>
           <p:spPr>
             <a:xfrm>
-              <a:off x="3207649" y="2662847"/>
+              <a:off x="2685681" y="2662847"/>
               <a:ext cx="710097" cy="201105"/>
             </a:xfrm>
             <a:custGeom>
@@ -5336,7 +5060,7 @@
                     <a:pt x="17704" y="1782"/>
                   </a:lnTo>
                   <a:lnTo>
-                    <a:pt x="13715" y="3675"/>
+                    <a:pt x="13716" y="3675"/>
                   </a:lnTo>
                   <a:lnTo>
                     <a:pt x="10082" y="6183"/>
@@ -5384,7 +5108,7 @@
                     <a:pt x="10082" y="194922"/>
                   </a:lnTo>
                   <a:lnTo>
-                    <a:pt x="13715" y="197430"/>
+                    <a:pt x="13716" y="197430"/>
                   </a:lnTo>
                   <a:lnTo>
                     <a:pt x="17704" y="199322"/>
@@ -5419,7 +5143,7 @@
           </p:nvSpPr>
           <p:spPr>
             <a:xfrm>
-              <a:off x="3225937" y="2676000"/>
+              <a:off x="2703969" y="2676000"/>
               <a:ext cx="673521" cy="169664"/>
             </a:xfrm>
             <a:prstGeom prst="rect">
@@ -5465,84 +5189,84 @@
           </p:nvSpPr>
           <p:spPr>
             <a:xfrm>
-              <a:off x="2686557" y="3279453"/>
-              <a:ext cx="1865934" cy="201105"/>
+              <a:off x="2685681" y="2662847"/>
+              <a:ext cx="710097" cy="201105"/>
             </a:xfrm>
             <a:custGeom>
               <a:avLst/>
               <a:pathLst>
-                <a:path w="1865934" h="201105">
+                <a:path w="710097" h="201105">
                   <a:moveTo>
                     <a:pt x="27431" y="201105"/>
                   </a:moveTo>
                   <a:lnTo>
-                    <a:pt x="1838502" y="201105"/>
-                  </a:lnTo>
-                  <a:lnTo>
-                    <a:pt x="1837397" y="201083"/>
-                  </a:lnTo>
-                  <a:lnTo>
-                    <a:pt x="1841808" y="200905"/>
-                  </a:lnTo>
-                  <a:lnTo>
-                    <a:pt x="1846134" y="200022"/>
-                  </a:lnTo>
-                  <a:lnTo>
-                    <a:pt x="1850261" y="198456"/>
-                  </a:lnTo>
-                  <a:lnTo>
-                    <a:pt x="1854085" y="196249"/>
-                  </a:lnTo>
-                  <a:lnTo>
-                    <a:pt x="1857504" y="193457"/>
-                  </a:lnTo>
-                  <a:lnTo>
-                    <a:pt x="1860432" y="190153"/>
-                  </a:lnTo>
-                  <a:lnTo>
-                    <a:pt x="1862791" y="186421"/>
-                  </a:lnTo>
-                  <a:lnTo>
-                    <a:pt x="1864522" y="182360"/>
-                  </a:lnTo>
-                  <a:lnTo>
-                    <a:pt x="1865578" y="178073"/>
-                  </a:lnTo>
-                  <a:lnTo>
-                    <a:pt x="1865934" y="173673"/>
-                  </a:lnTo>
-                  <a:lnTo>
-                    <a:pt x="1865934" y="27431"/>
-                  </a:lnTo>
-                  <a:lnTo>
-                    <a:pt x="1865578" y="23031"/>
-                  </a:lnTo>
-                  <a:lnTo>
-                    <a:pt x="1864522" y="18745"/>
-                  </a:lnTo>
-                  <a:lnTo>
-                    <a:pt x="1862791" y="14683"/>
-                  </a:lnTo>
-                  <a:lnTo>
-                    <a:pt x="1860432" y="10952"/>
-                  </a:lnTo>
-                  <a:lnTo>
-                    <a:pt x="1857504" y="7647"/>
-                  </a:lnTo>
-                  <a:lnTo>
-                    <a:pt x="1854085" y="4855"/>
-                  </a:lnTo>
-                  <a:lnTo>
-                    <a:pt x="1850261" y="2648"/>
-                  </a:lnTo>
-                  <a:lnTo>
-                    <a:pt x="1846134" y="1083"/>
-                  </a:lnTo>
-                  <a:lnTo>
-                    <a:pt x="1841808" y="200"/>
-                  </a:lnTo>
-                  <a:lnTo>
-                    <a:pt x="1838502" y="0"/>
+                    <a:pt x="682665" y="201105"/>
+                  </a:lnTo>
+                  <a:lnTo>
+                    <a:pt x="681561" y="201083"/>
+                  </a:lnTo>
+                  <a:lnTo>
+                    <a:pt x="685972" y="200905"/>
+                  </a:lnTo>
+                  <a:lnTo>
+                    <a:pt x="690297" y="200022"/>
+                  </a:lnTo>
+                  <a:lnTo>
+                    <a:pt x="694425" y="198456"/>
+                  </a:lnTo>
+                  <a:lnTo>
+                    <a:pt x="698248" y="196249"/>
+                  </a:lnTo>
+                  <a:lnTo>
+                    <a:pt x="701668" y="193457"/>
+                  </a:lnTo>
+                  <a:lnTo>
+                    <a:pt x="704595" y="190153"/>
+                  </a:lnTo>
+                  <a:lnTo>
+                    <a:pt x="706955" y="186421"/>
+                  </a:lnTo>
+                  <a:lnTo>
+                    <a:pt x="708685" y="182360"/>
+                  </a:lnTo>
+                  <a:lnTo>
+                    <a:pt x="709742" y="178073"/>
+                  </a:lnTo>
+                  <a:lnTo>
+                    <a:pt x="710097" y="173673"/>
+                  </a:lnTo>
+                  <a:lnTo>
+                    <a:pt x="710097" y="27431"/>
+                  </a:lnTo>
+                  <a:lnTo>
+                    <a:pt x="709742" y="23031"/>
+                  </a:lnTo>
+                  <a:lnTo>
+                    <a:pt x="708685" y="18745"/>
+                  </a:lnTo>
+                  <a:lnTo>
+                    <a:pt x="706955" y="14683"/>
+                  </a:lnTo>
+                  <a:lnTo>
+                    <a:pt x="704595" y="10952"/>
+                  </a:lnTo>
+                  <a:lnTo>
+                    <a:pt x="701668" y="7647"/>
+                  </a:lnTo>
+                  <a:lnTo>
+                    <a:pt x="698248" y="4855"/>
+                  </a:lnTo>
+                  <a:lnTo>
+                    <a:pt x="694425" y="2648"/>
+                  </a:lnTo>
+                  <a:lnTo>
+                    <a:pt x="690297" y="1083"/>
+                  </a:lnTo>
+                  <a:lnTo>
+                    <a:pt x="685972" y="200"/>
+                  </a:lnTo>
+                  <a:lnTo>
+                    <a:pt x="682665" y="0"/>
                   </a:lnTo>
                   <a:lnTo>
                     <a:pt x="27431" y="0"/>
@@ -5643,8 +5367,8 @@
           </p:nvSpPr>
           <p:spPr>
             <a:xfrm>
-              <a:off x="2704845" y="3248962"/>
-              <a:ext cx="1829358" cy="213307"/>
+              <a:off x="2703969" y="2676000"/>
+              <a:ext cx="673521" cy="169664"/>
             </a:xfrm>
             <a:prstGeom prst="rect">
               <a:avLst/>
@@ -5669,14 +5393,14 @@
               <a:r>
                 <a:rPr sz="1800" b="1">
                   <a:solidFill>
-                    <a:srgbClr val="F68B33">
+                    <a:srgbClr val="A02226">
                       <a:alpha val="100000"/>
                     </a:srgbClr>
                   </a:solidFill>
                   <a:latin typeface="Helvetica"/>
                   <a:cs typeface="Helvetica"/>
                 </a:rPr>
-                <a:t>EV (sold in 2022)</a:t>
+                <a:t>Diesel</a:t>
               </a:r>
             </a:p>
           </p:txBody>
@@ -5689,84 +5413,84 @@
           </p:nvSpPr>
           <p:spPr>
             <a:xfrm>
-              <a:off x="2686557" y="3279453"/>
-              <a:ext cx="1865934" cy="201105"/>
+              <a:off x="2685681" y="2662847"/>
+              <a:ext cx="710097" cy="201105"/>
             </a:xfrm>
             <a:custGeom>
               <a:avLst/>
               <a:pathLst>
-                <a:path w="1865934" h="201105">
+                <a:path w="710097" h="201105">
                   <a:moveTo>
                     <a:pt x="27431" y="201105"/>
                   </a:moveTo>
                   <a:lnTo>
-                    <a:pt x="1838502" y="201105"/>
-                  </a:lnTo>
-                  <a:lnTo>
-                    <a:pt x="1837397" y="201083"/>
-                  </a:lnTo>
-                  <a:lnTo>
-                    <a:pt x="1841808" y="200905"/>
-                  </a:lnTo>
-                  <a:lnTo>
-                    <a:pt x="1846134" y="200022"/>
-                  </a:lnTo>
-                  <a:lnTo>
-                    <a:pt x="1850261" y="198456"/>
-                  </a:lnTo>
-                  <a:lnTo>
-                    <a:pt x="1854085" y="196249"/>
-                  </a:lnTo>
-                  <a:lnTo>
-                    <a:pt x="1857504" y="193457"/>
-                  </a:lnTo>
-                  <a:lnTo>
-                    <a:pt x="1860432" y="190153"/>
-                  </a:lnTo>
-                  <a:lnTo>
-                    <a:pt x="1862791" y="186421"/>
-                  </a:lnTo>
-                  <a:lnTo>
-                    <a:pt x="1864522" y="182360"/>
-                  </a:lnTo>
-                  <a:lnTo>
-                    <a:pt x="1865578" y="178073"/>
-                  </a:lnTo>
-                  <a:lnTo>
-                    <a:pt x="1865934" y="173673"/>
-                  </a:lnTo>
-                  <a:lnTo>
-                    <a:pt x="1865934" y="27431"/>
-                  </a:lnTo>
-                  <a:lnTo>
-                    <a:pt x="1865578" y="23031"/>
-                  </a:lnTo>
-                  <a:lnTo>
-                    <a:pt x="1864522" y="18745"/>
-                  </a:lnTo>
-                  <a:lnTo>
-                    <a:pt x="1862791" y="14683"/>
-                  </a:lnTo>
-                  <a:lnTo>
-                    <a:pt x="1860432" y="10952"/>
-                  </a:lnTo>
-                  <a:lnTo>
-                    <a:pt x="1857504" y="7647"/>
-                  </a:lnTo>
-                  <a:lnTo>
-                    <a:pt x="1854085" y="4855"/>
-                  </a:lnTo>
-                  <a:lnTo>
-                    <a:pt x="1850261" y="2648"/>
-                  </a:lnTo>
-                  <a:lnTo>
-                    <a:pt x="1846134" y="1083"/>
-                  </a:lnTo>
-                  <a:lnTo>
-                    <a:pt x="1841808" y="200"/>
-                  </a:lnTo>
-                  <a:lnTo>
-                    <a:pt x="1838502" y="0"/>
+                    <a:pt x="682665" y="201105"/>
+                  </a:lnTo>
+                  <a:lnTo>
+                    <a:pt x="681561" y="201083"/>
+                  </a:lnTo>
+                  <a:lnTo>
+                    <a:pt x="685972" y="200905"/>
+                  </a:lnTo>
+                  <a:lnTo>
+                    <a:pt x="690297" y="200022"/>
+                  </a:lnTo>
+                  <a:lnTo>
+                    <a:pt x="694425" y="198456"/>
+                  </a:lnTo>
+                  <a:lnTo>
+                    <a:pt x="698248" y="196249"/>
+                  </a:lnTo>
+                  <a:lnTo>
+                    <a:pt x="701668" y="193457"/>
+                  </a:lnTo>
+                  <a:lnTo>
+                    <a:pt x="704595" y="190153"/>
+                  </a:lnTo>
+                  <a:lnTo>
+                    <a:pt x="706955" y="186421"/>
+                  </a:lnTo>
+                  <a:lnTo>
+                    <a:pt x="708685" y="182360"/>
+                  </a:lnTo>
+                  <a:lnTo>
+                    <a:pt x="709742" y="178073"/>
+                  </a:lnTo>
+                  <a:lnTo>
+                    <a:pt x="710097" y="173673"/>
+                  </a:lnTo>
+                  <a:lnTo>
+                    <a:pt x="710097" y="27431"/>
+                  </a:lnTo>
+                  <a:lnTo>
+                    <a:pt x="709742" y="23031"/>
+                  </a:lnTo>
+                  <a:lnTo>
+                    <a:pt x="708685" y="18745"/>
+                  </a:lnTo>
+                  <a:lnTo>
+                    <a:pt x="706955" y="14683"/>
+                  </a:lnTo>
+                  <a:lnTo>
+                    <a:pt x="704595" y="10952"/>
+                  </a:lnTo>
+                  <a:lnTo>
+                    <a:pt x="701668" y="7647"/>
+                  </a:lnTo>
+                  <a:lnTo>
+                    <a:pt x="698248" y="4855"/>
+                  </a:lnTo>
+                  <a:lnTo>
+                    <a:pt x="694425" y="2648"/>
+                  </a:lnTo>
+                  <a:lnTo>
+                    <a:pt x="690297" y="1083"/>
+                  </a:lnTo>
+                  <a:lnTo>
+                    <a:pt x="685972" y="200"/>
+                  </a:lnTo>
+                  <a:lnTo>
+                    <a:pt x="682665" y="0"/>
                   </a:lnTo>
                   <a:lnTo>
                     <a:pt x="27431" y="0"/>
@@ -5867,8 +5591,8 @@
           </p:nvSpPr>
           <p:spPr>
             <a:xfrm>
-              <a:off x="2704845" y="3248962"/>
-              <a:ext cx="1829358" cy="213307"/>
+              <a:off x="2703969" y="2676000"/>
+              <a:ext cx="673521" cy="169664"/>
             </a:xfrm>
             <a:prstGeom prst="rect">
               <a:avLst/>
@@ -5893,14 +5617,14 @@
               <a:r>
                 <a:rPr sz="1800" b="1">
                   <a:solidFill>
-                    <a:srgbClr val="F68B33">
+                    <a:srgbClr val="A02226">
                       <a:alpha val="100000"/>
                     </a:srgbClr>
                   </a:solidFill>
                   <a:latin typeface="Helvetica"/>
                   <a:cs typeface="Helvetica"/>
                 </a:rPr>
-                <a:t>EV (sold in 2022)</a:t>
+                <a:t>Diesel</a:t>
               </a:r>
             </a:p>
           </p:txBody>
@@ -5913,7 +5637,7 @@
           </p:nvSpPr>
           <p:spPr>
             <a:xfrm>
-              <a:off x="2686557" y="3279453"/>
+              <a:off x="2106223" y="3279453"/>
               <a:ext cx="1865934" cy="201105"/>
             </a:xfrm>
             <a:custGeom>
@@ -6091,7 +5815,7 @@
           </p:nvSpPr>
           <p:spPr>
             <a:xfrm>
-              <a:off x="2704845" y="3248962"/>
+              <a:off x="2124511" y="3248962"/>
               <a:ext cx="1829358" cy="213307"/>
             </a:xfrm>
             <a:prstGeom prst="rect">
@@ -6137,7 +5861,7 @@
           </p:nvSpPr>
           <p:spPr>
             <a:xfrm>
-              <a:off x="2686557" y="3279453"/>
+              <a:off x="2106223" y="3279453"/>
               <a:ext cx="1865934" cy="201105"/>
             </a:xfrm>
             <a:custGeom>
@@ -6315,7 +6039,7 @@
           </p:nvSpPr>
           <p:spPr>
             <a:xfrm>
-              <a:off x="2704845" y="3248962"/>
+              <a:off x="2124511" y="3248962"/>
               <a:ext cx="1829358" cy="213307"/>
             </a:xfrm>
             <a:prstGeom prst="rect">
@@ -6361,7 +6085,7 @@
           </p:nvSpPr>
           <p:spPr>
             <a:xfrm>
-              <a:off x="2686557" y="3279453"/>
+              <a:off x="2106223" y="3279453"/>
               <a:ext cx="1865934" cy="201105"/>
             </a:xfrm>
             <a:custGeom>
@@ -6539,7 +6263,7 @@
           </p:nvSpPr>
           <p:spPr>
             <a:xfrm>
-              <a:off x="2704845" y="3248962"/>
+              <a:off x="2124511" y="3248962"/>
               <a:ext cx="1829358" cy="213307"/>
             </a:xfrm>
             <a:prstGeom prst="rect">
@@ -6585,7 +6309,7 @@
           </p:nvSpPr>
           <p:spPr>
             <a:xfrm>
-              <a:off x="2686557" y="3279453"/>
+              <a:off x="2106223" y="3279453"/>
               <a:ext cx="1865934" cy="201105"/>
             </a:xfrm>
             <a:custGeom>
@@ -6763,7 +6487,7 @@
           </p:nvSpPr>
           <p:spPr>
             <a:xfrm>
-              <a:off x="2704845" y="3248962"/>
+              <a:off x="2124511" y="3248962"/>
               <a:ext cx="1829358" cy="213307"/>
             </a:xfrm>
             <a:prstGeom prst="rect">
@@ -6809,7 +6533,7 @@
           </p:nvSpPr>
           <p:spPr>
             <a:xfrm>
-              <a:off x="2094407" y="3896059"/>
+              <a:off x="2106223" y="3279453"/>
               <a:ext cx="1865934" cy="201105"/>
             </a:xfrm>
             <a:custGeom>
@@ -6987,7 +6711,7 @@
           </p:nvSpPr>
           <p:spPr>
             <a:xfrm>
-              <a:off x="2112695" y="3865569"/>
+              <a:off x="2124511" y="3248962"/>
               <a:ext cx="1829358" cy="213307"/>
             </a:xfrm>
             <a:prstGeom prst="rect">
@@ -7013,14 +6737,14 @@
               <a:r>
                 <a:rPr sz="1800" b="1">
                   <a:solidFill>
-                    <a:srgbClr val="FFC35A">
+                    <a:srgbClr val="F68B33">
                       <a:alpha val="100000"/>
                     </a:srgbClr>
                   </a:solidFill>
                   <a:latin typeface="Helvetica"/>
                   <a:cs typeface="Helvetica"/>
                 </a:rPr>
-                <a:t>EV (sold in 2030)</a:t>
+                <a:t>EV (sold in 2022)</a:t>
               </a:r>
             </a:p>
           </p:txBody>
@@ -7033,7 +6757,7 @@
           </p:nvSpPr>
           <p:spPr>
             <a:xfrm>
-              <a:off x="2094407" y="3896059"/>
+              <a:off x="2106223" y="3279453"/>
               <a:ext cx="1865934" cy="201105"/>
             </a:xfrm>
             <a:custGeom>
@@ -7211,7 +6935,7 @@
           </p:nvSpPr>
           <p:spPr>
             <a:xfrm>
-              <a:off x="2112695" y="3865569"/>
+              <a:off x="2124511" y="3248962"/>
               <a:ext cx="1829358" cy="213307"/>
             </a:xfrm>
             <a:prstGeom prst="rect">
@@ -7237,14 +6961,14 @@
               <a:r>
                 <a:rPr sz="1800" b="1">
                   <a:solidFill>
-                    <a:srgbClr val="FFC35A">
+                    <a:srgbClr val="F68B33">
                       <a:alpha val="100000"/>
                     </a:srgbClr>
                   </a:solidFill>
                   <a:latin typeface="Helvetica"/>
                   <a:cs typeface="Helvetica"/>
                 </a:rPr>
-                <a:t>EV (sold in 2030)</a:t>
+                <a:t>EV (sold in 2022)</a:t>
               </a:r>
             </a:p>
           </p:txBody>
@@ -7257,7 +6981,7 @@
           </p:nvSpPr>
           <p:spPr>
             <a:xfrm>
-              <a:off x="2094407" y="3896059"/>
+              <a:off x="1447749" y="3896059"/>
               <a:ext cx="1865934" cy="201105"/>
             </a:xfrm>
             <a:custGeom>
@@ -7352,7 +7076,7 @@
                     <a:pt x="17704" y="1782"/>
                   </a:lnTo>
                   <a:lnTo>
-                    <a:pt x="13716" y="3675"/>
+                    <a:pt x="13715" y="3675"/>
                   </a:lnTo>
                   <a:lnTo>
                     <a:pt x="10082" y="6183"/>
@@ -7400,7 +7124,7 @@
                     <a:pt x="10082" y="194922"/>
                   </a:lnTo>
                   <a:lnTo>
-                    <a:pt x="13716" y="197430"/>
+                    <a:pt x="13715" y="197430"/>
                   </a:lnTo>
                   <a:lnTo>
                     <a:pt x="17704" y="199322"/>
@@ -7435,7 +7159,7 @@
           </p:nvSpPr>
           <p:spPr>
             <a:xfrm>
-              <a:off x="2112695" y="3865569"/>
+              <a:off x="1466037" y="3865569"/>
               <a:ext cx="1829358" cy="213307"/>
             </a:xfrm>
             <a:prstGeom prst="rect">
@@ -7481,7 +7205,7 @@
           </p:nvSpPr>
           <p:spPr>
             <a:xfrm>
-              <a:off x="2094407" y="3896059"/>
+              <a:off x="1447749" y="3896059"/>
               <a:ext cx="1865934" cy="201105"/>
             </a:xfrm>
             <a:custGeom>
@@ -7576,7 +7300,7 @@
                     <a:pt x="17704" y="1782"/>
                   </a:lnTo>
                   <a:lnTo>
-                    <a:pt x="13716" y="3675"/>
+                    <a:pt x="13715" y="3675"/>
                   </a:lnTo>
                   <a:lnTo>
                     <a:pt x="10082" y="6183"/>
@@ -7624,7 +7348,7 @@
                     <a:pt x="10082" y="194922"/>
                   </a:lnTo>
                   <a:lnTo>
-                    <a:pt x="13716" y="197430"/>
+                    <a:pt x="13715" y="197430"/>
                   </a:lnTo>
                   <a:lnTo>
                     <a:pt x="17704" y="199322"/>
@@ -7659,7 +7383,7 @@
           </p:nvSpPr>
           <p:spPr>
             <a:xfrm>
-              <a:off x="2112695" y="3865569"/>
+              <a:off x="1466037" y="3865569"/>
               <a:ext cx="1829358" cy="213307"/>
             </a:xfrm>
             <a:prstGeom prst="rect">
@@ -7705,7 +7429,7 @@
           </p:nvSpPr>
           <p:spPr>
             <a:xfrm>
-              <a:off x="2094407" y="3896059"/>
+              <a:off x="1447749" y="3896059"/>
               <a:ext cx="1865934" cy="201105"/>
             </a:xfrm>
             <a:custGeom>
@@ -7800,7 +7524,7 @@
                     <a:pt x="17704" y="1782"/>
                   </a:lnTo>
                   <a:lnTo>
-                    <a:pt x="13716" y="3675"/>
+                    <a:pt x="13715" y="3675"/>
                   </a:lnTo>
                   <a:lnTo>
                     <a:pt x="10082" y="6183"/>
@@ -7848,7 +7572,7 @@
                     <a:pt x="10082" y="194922"/>
                   </a:lnTo>
                   <a:lnTo>
-                    <a:pt x="13716" y="197430"/>
+                    <a:pt x="13715" y="197430"/>
                   </a:lnTo>
                   <a:lnTo>
                     <a:pt x="17704" y="199322"/>
@@ -7883,7 +7607,7 @@
           </p:nvSpPr>
           <p:spPr>
             <a:xfrm>
-              <a:off x="2112695" y="3865569"/>
+              <a:off x="1466037" y="3865569"/>
               <a:ext cx="1829358" cy="213307"/>
             </a:xfrm>
             <a:prstGeom prst="rect">
@@ -7929,7 +7653,7 @@
           </p:nvSpPr>
           <p:spPr>
             <a:xfrm>
-              <a:off x="2094407" y="3896059"/>
+              <a:off x="1447749" y="3896059"/>
               <a:ext cx="1865934" cy="201105"/>
             </a:xfrm>
             <a:custGeom>
@@ -8024,7 +7748,7 @@
                     <a:pt x="17704" y="1782"/>
                   </a:lnTo>
                   <a:lnTo>
-                    <a:pt x="13716" y="3675"/>
+                    <a:pt x="13715" y="3675"/>
                   </a:lnTo>
                   <a:lnTo>
                     <a:pt x="10082" y="6183"/>
@@ -8072,7 +7796,7 @@
                     <a:pt x="10082" y="194922"/>
                   </a:lnTo>
                   <a:lnTo>
-                    <a:pt x="13716" y="197430"/>
+                    <a:pt x="13715" y="197430"/>
                   </a:lnTo>
                   <a:lnTo>
                     <a:pt x="17704" y="199322"/>
@@ -8107,7 +7831,7 @@
           </p:nvSpPr>
           <p:spPr>
             <a:xfrm>
-              <a:off x="2112695" y="3865569"/>
+              <a:off x="1466037" y="3865569"/>
               <a:ext cx="1829358" cy="213307"/>
             </a:xfrm>
             <a:prstGeom prst="rect">
@@ -8147,14 +7871,502 @@
         </p:sp>
         <p:sp>
           <p:nvSpPr>
-            <p:cNvPr id="52" name="tx50"/>
+            <p:cNvPr id="52" name="pg50"/>
             <p:cNvSpPr/>
             <p:nvPr/>
           </p:nvSpPr>
           <p:spPr>
             <a:xfrm>
-              <a:off x="560938" y="3246897"/>
-              <a:ext cx="1194122" cy="215093"/>
+              <a:off x="1447749" y="3896059"/>
+              <a:ext cx="1865934" cy="201105"/>
+            </a:xfrm>
+            <a:custGeom>
+              <a:avLst/>
+              <a:pathLst>
+                <a:path w="1865934" h="201105">
+                  <a:moveTo>
+                    <a:pt x="27431" y="201105"/>
+                  </a:moveTo>
+                  <a:lnTo>
+                    <a:pt x="1838502" y="201105"/>
+                  </a:lnTo>
+                  <a:lnTo>
+                    <a:pt x="1837397" y="201083"/>
+                  </a:lnTo>
+                  <a:lnTo>
+                    <a:pt x="1841808" y="200905"/>
+                  </a:lnTo>
+                  <a:lnTo>
+                    <a:pt x="1846134" y="200022"/>
+                  </a:lnTo>
+                  <a:lnTo>
+                    <a:pt x="1850261" y="198456"/>
+                  </a:lnTo>
+                  <a:lnTo>
+                    <a:pt x="1854085" y="196249"/>
+                  </a:lnTo>
+                  <a:lnTo>
+                    <a:pt x="1857504" y="193457"/>
+                  </a:lnTo>
+                  <a:lnTo>
+                    <a:pt x="1860432" y="190153"/>
+                  </a:lnTo>
+                  <a:lnTo>
+                    <a:pt x="1862791" y="186421"/>
+                  </a:lnTo>
+                  <a:lnTo>
+                    <a:pt x="1864522" y="182360"/>
+                  </a:lnTo>
+                  <a:lnTo>
+                    <a:pt x="1865578" y="178073"/>
+                  </a:lnTo>
+                  <a:lnTo>
+                    <a:pt x="1865934" y="173673"/>
+                  </a:lnTo>
+                  <a:lnTo>
+                    <a:pt x="1865934" y="27431"/>
+                  </a:lnTo>
+                  <a:lnTo>
+                    <a:pt x="1865578" y="23031"/>
+                  </a:lnTo>
+                  <a:lnTo>
+                    <a:pt x="1864522" y="18745"/>
+                  </a:lnTo>
+                  <a:lnTo>
+                    <a:pt x="1862791" y="14683"/>
+                  </a:lnTo>
+                  <a:lnTo>
+                    <a:pt x="1860432" y="10952"/>
+                  </a:lnTo>
+                  <a:lnTo>
+                    <a:pt x="1857504" y="7647"/>
+                  </a:lnTo>
+                  <a:lnTo>
+                    <a:pt x="1854085" y="4855"/>
+                  </a:lnTo>
+                  <a:lnTo>
+                    <a:pt x="1850261" y="2648"/>
+                  </a:lnTo>
+                  <a:lnTo>
+                    <a:pt x="1846134" y="1083"/>
+                  </a:lnTo>
+                  <a:lnTo>
+                    <a:pt x="1841808" y="200"/>
+                  </a:lnTo>
+                  <a:lnTo>
+                    <a:pt x="1838502" y="0"/>
+                  </a:lnTo>
+                  <a:lnTo>
+                    <a:pt x="27431" y="0"/>
+                  </a:lnTo>
+                  <a:lnTo>
+                    <a:pt x="30738" y="200"/>
+                  </a:lnTo>
+                  <a:lnTo>
+                    <a:pt x="26327" y="22"/>
+                  </a:lnTo>
+                  <a:lnTo>
+                    <a:pt x="21944" y="554"/>
+                  </a:lnTo>
+                  <a:lnTo>
+                    <a:pt x="17704" y="1782"/>
+                  </a:lnTo>
+                  <a:lnTo>
+                    <a:pt x="13715" y="3675"/>
+                  </a:lnTo>
+                  <a:lnTo>
+                    <a:pt x="10082" y="6183"/>
+                  </a:lnTo>
+                  <a:lnTo>
+                    <a:pt x="6898" y="9241"/>
+                  </a:lnTo>
+                  <a:lnTo>
+                    <a:pt x="4246" y="12770"/>
+                  </a:lnTo>
+                  <a:lnTo>
+                    <a:pt x="2195" y="16679"/>
+                  </a:lnTo>
+                  <a:lnTo>
+                    <a:pt x="797" y="20867"/>
+                  </a:lnTo>
+                  <a:lnTo>
+                    <a:pt x="88" y="25224"/>
+                  </a:lnTo>
+                  <a:lnTo>
+                    <a:pt x="0" y="27431"/>
+                  </a:lnTo>
+                  <a:lnTo>
+                    <a:pt x="0" y="173673"/>
+                  </a:lnTo>
+                  <a:lnTo>
+                    <a:pt x="88" y="171466"/>
+                  </a:lnTo>
+                  <a:lnTo>
+                    <a:pt x="88" y="175880"/>
+                  </a:lnTo>
+                  <a:lnTo>
+                    <a:pt x="797" y="180238"/>
+                  </a:lnTo>
+                  <a:lnTo>
+                    <a:pt x="2195" y="184425"/>
+                  </a:lnTo>
+                  <a:lnTo>
+                    <a:pt x="4246" y="188334"/>
+                  </a:lnTo>
+                  <a:lnTo>
+                    <a:pt x="6898" y="191864"/>
+                  </a:lnTo>
+                  <a:lnTo>
+                    <a:pt x="10082" y="194922"/>
+                  </a:lnTo>
+                  <a:lnTo>
+                    <a:pt x="13715" y="197430"/>
+                  </a:lnTo>
+                  <a:lnTo>
+                    <a:pt x="17704" y="199322"/>
+                  </a:lnTo>
+                  <a:lnTo>
+                    <a:pt x="21944" y="200551"/>
+                  </a:lnTo>
+                  <a:lnTo>
+                    <a:pt x="26327" y="201083"/>
+                  </a:lnTo>
+                  <a:close/>
+                </a:path>
+              </a:pathLst>
+            </a:custGeom>
+            <a:solidFill>
+              <a:srgbClr val="FFFFFF">
+                <a:alpha val="100000"/>
+              </a:srgbClr>
+            </a:solidFill>
+          </p:spPr>
+          <p:txBody>
+            <a:bodyPr/>
+            <a:lstStyle/>
+            <a:p/>
+          </p:txBody>
+        </p:sp>
+        <p:sp>
+          <p:nvSpPr>
+            <p:cNvPr id="53" name="tx51"/>
+            <p:cNvSpPr/>
+            <p:nvPr/>
+          </p:nvSpPr>
+          <p:spPr>
+            <a:xfrm>
+              <a:off x="1466037" y="3865569"/>
+              <a:ext cx="1829358" cy="213307"/>
+            </a:xfrm>
+            <a:prstGeom prst="rect">
+              <a:avLst/>
+            </a:prstGeom>
+            <a:noFill/>
+          </p:spPr>
+          <p:txBody>
+            <a:bodyPr lIns="0" rIns="0" tIns="0" bIns="0" anchorCtr="1" anchor="ctr" wrap="none"/>
+            <a:lstStyle/>
+            <a:p>
+              <a:pPr algn="l" marL="0" marR="0" indent="0">
+                <a:lnSpc>
+                  <a:spcPts val="1800"/>
+                </a:lnSpc>
+                <a:spcBef>
+                  <a:spcPts val="0"/>
+                </a:spcBef>
+                <a:spcAft>
+                  <a:spcPts val="0"/>
+                </a:spcAft>
+              </a:pPr>
+              <a:r>
+                <a:rPr sz="1800" b="1">
+                  <a:solidFill>
+                    <a:srgbClr val="FFC35A">
+                      <a:alpha val="100000"/>
+                    </a:srgbClr>
+                  </a:solidFill>
+                  <a:latin typeface="Helvetica"/>
+                  <a:cs typeface="Helvetica"/>
+                </a:rPr>
+                <a:t>EV (sold in 2030)</a:t>
+              </a:r>
+            </a:p>
+          </p:txBody>
+        </p:sp>
+        <p:sp>
+          <p:nvSpPr>
+            <p:cNvPr id="54" name="pg52"/>
+            <p:cNvSpPr/>
+            <p:nvPr/>
+          </p:nvSpPr>
+          <p:spPr>
+            <a:xfrm>
+              <a:off x="1447749" y="3896059"/>
+              <a:ext cx="1865934" cy="201105"/>
+            </a:xfrm>
+            <a:custGeom>
+              <a:avLst/>
+              <a:pathLst>
+                <a:path w="1865934" h="201105">
+                  <a:moveTo>
+                    <a:pt x="27431" y="201105"/>
+                  </a:moveTo>
+                  <a:lnTo>
+                    <a:pt x="1838502" y="201105"/>
+                  </a:lnTo>
+                  <a:lnTo>
+                    <a:pt x="1837397" y="201083"/>
+                  </a:lnTo>
+                  <a:lnTo>
+                    <a:pt x="1841808" y="200905"/>
+                  </a:lnTo>
+                  <a:lnTo>
+                    <a:pt x="1846134" y="200022"/>
+                  </a:lnTo>
+                  <a:lnTo>
+                    <a:pt x="1850261" y="198456"/>
+                  </a:lnTo>
+                  <a:lnTo>
+                    <a:pt x="1854085" y="196249"/>
+                  </a:lnTo>
+                  <a:lnTo>
+                    <a:pt x="1857504" y="193457"/>
+                  </a:lnTo>
+                  <a:lnTo>
+                    <a:pt x="1860432" y="190153"/>
+                  </a:lnTo>
+                  <a:lnTo>
+                    <a:pt x="1862791" y="186421"/>
+                  </a:lnTo>
+                  <a:lnTo>
+                    <a:pt x="1864522" y="182360"/>
+                  </a:lnTo>
+                  <a:lnTo>
+                    <a:pt x="1865578" y="178073"/>
+                  </a:lnTo>
+                  <a:lnTo>
+                    <a:pt x="1865934" y="173673"/>
+                  </a:lnTo>
+                  <a:lnTo>
+                    <a:pt x="1865934" y="27431"/>
+                  </a:lnTo>
+                  <a:lnTo>
+                    <a:pt x="1865578" y="23031"/>
+                  </a:lnTo>
+                  <a:lnTo>
+                    <a:pt x="1864522" y="18745"/>
+                  </a:lnTo>
+                  <a:lnTo>
+                    <a:pt x="1862791" y="14683"/>
+                  </a:lnTo>
+                  <a:lnTo>
+                    <a:pt x="1860432" y="10952"/>
+                  </a:lnTo>
+                  <a:lnTo>
+                    <a:pt x="1857504" y="7647"/>
+                  </a:lnTo>
+                  <a:lnTo>
+                    <a:pt x="1854085" y="4855"/>
+                  </a:lnTo>
+                  <a:lnTo>
+                    <a:pt x="1850261" y="2648"/>
+                  </a:lnTo>
+                  <a:lnTo>
+                    <a:pt x="1846134" y="1083"/>
+                  </a:lnTo>
+                  <a:lnTo>
+                    <a:pt x="1841808" y="200"/>
+                  </a:lnTo>
+                  <a:lnTo>
+                    <a:pt x="1838502" y="0"/>
+                  </a:lnTo>
+                  <a:lnTo>
+                    <a:pt x="27431" y="0"/>
+                  </a:lnTo>
+                  <a:lnTo>
+                    <a:pt x="30738" y="200"/>
+                  </a:lnTo>
+                  <a:lnTo>
+                    <a:pt x="26327" y="22"/>
+                  </a:lnTo>
+                  <a:lnTo>
+                    <a:pt x="21944" y="554"/>
+                  </a:lnTo>
+                  <a:lnTo>
+                    <a:pt x="17704" y="1782"/>
+                  </a:lnTo>
+                  <a:lnTo>
+                    <a:pt x="13715" y="3675"/>
+                  </a:lnTo>
+                  <a:lnTo>
+                    <a:pt x="10082" y="6183"/>
+                  </a:lnTo>
+                  <a:lnTo>
+                    <a:pt x="6898" y="9241"/>
+                  </a:lnTo>
+                  <a:lnTo>
+                    <a:pt x="4246" y="12770"/>
+                  </a:lnTo>
+                  <a:lnTo>
+                    <a:pt x="2195" y="16679"/>
+                  </a:lnTo>
+                  <a:lnTo>
+                    <a:pt x="797" y="20867"/>
+                  </a:lnTo>
+                  <a:lnTo>
+                    <a:pt x="88" y="25224"/>
+                  </a:lnTo>
+                  <a:lnTo>
+                    <a:pt x="0" y="27431"/>
+                  </a:lnTo>
+                  <a:lnTo>
+                    <a:pt x="0" y="173673"/>
+                  </a:lnTo>
+                  <a:lnTo>
+                    <a:pt x="88" y="171466"/>
+                  </a:lnTo>
+                  <a:lnTo>
+                    <a:pt x="88" y="175880"/>
+                  </a:lnTo>
+                  <a:lnTo>
+                    <a:pt x="797" y="180238"/>
+                  </a:lnTo>
+                  <a:lnTo>
+                    <a:pt x="2195" y="184425"/>
+                  </a:lnTo>
+                  <a:lnTo>
+                    <a:pt x="4246" y="188334"/>
+                  </a:lnTo>
+                  <a:lnTo>
+                    <a:pt x="6898" y="191864"/>
+                  </a:lnTo>
+                  <a:lnTo>
+                    <a:pt x="10082" y="194922"/>
+                  </a:lnTo>
+                  <a:lnTo>
+                    <a:pt x="13715" y="197430"/>
+                  </a:lnTo>
+                  <a:lnTo>
+                    <a:pt x="17704" y="199322"/>
+                  </a:lnTo>
+                  <a:lnTo>
+                    <a:pt x="21944" y="200551"/>
+                  </a:lnTo>
+                  <a:lnTo>
+                    <a:pt x="26327" y="201083"/>
+                  </a:lnTo>
+                  <a:close/>
+                </a:path>
+              </a:pathLst>
+            </a:custGeom>
+            <a:solidFill>
+              <a:srgbClr val="FFFFFF">
+                <a:alpha val="100000"/>
+              </a:srgbClr>
+            </a:solidFill>
+          </p:spPr>
+          <p:txBody>
+            <a:bodyPr/>
+            <a:lstStyle/>
+            <a:p/>
+          </p:txBody>
+        </p:sp>
+        <p:sp>
+          <p:nvSpPr>
+            <p:cNvPr id="55" name="tx53"/>
+            <p:cNvSpPr/>
+            <p:nvPr/>
+          </p:nvSpPr>
+          <p:spPr>
+            <a:xfrm>
+              <a:off x="1466037" y="3865569"/>
+              <a:ext cx="1829358" cy="213307"/>
+            </a:xfrm>
+            <a:prstGeom prst="rect">
+              <a:avLst/>
+            </a:prstGeom>
+            <a:noFill/>
+          </p:spPr>
+          <p:txBody>
+            <a:bodyPr lIns="0" rIns="0" tIns="0" bIns="0" anchorCtr="1" anchor="ctr" wrap="none"/>
+            <a:lstStyle/>
+            <a:p>
+              <a:pPr algn="l" marL="0" marR="0" indent="0">
+                <a:lnSpc>
+                  <a:spcPts val="1800"/>
+                </a:lnSpc>
+                <a:spcBef>
+                  <a:spcPts val="0"/>
+                </a:spcBef>
+                <a:spcAft>
+                  <a:spcPts val="0"/>
+                </a:spcAft>
+              </a:pPr>
+              <a:r>
+                <a:rPr sz="1800" b="1">
+                  <a:solidFill>
+                    <a:srgbClr val="FFC35A">
+                      <a:alpha val="100000"/>
+                    </a:srgbClr>
+                  </a:solidFill>
+                  <a:latin typeface="Helvetica"/>
+                  <a:cs typeface="Helvetica"/>
+                </a:rPr>
+                <a:t>EV (sold in 2030)</a:t>
+              </a:r>
+            </a:p>
+          </p:txBody>
+        </p:sp>
+        <p:sp>
+          <p:nvSpPr>
+            <p:cNvPr id="56" name="pl54"/>
+            <p:cNvSpPr/>
+            <p:nvPr/>
+          </p:nvSpPr>
+          <p:spPr>
+            <a:xfrm>
+              <a:off x="1184360" y="91439"/>
+              <a:ext cx="0" cy="4521778"/>
+            </a:xfrm>
+            <a:custGeom>
+              <a:avLst/>
+              <a:pathLst>
+                <a:path w="0" h="4521778">
+                  <a:moveTo>
+                    <a:pt x="0" y="4521778"/>
+                  </a:moveTo>
+                  <a:lnTo>
+                    <a:pt x="0" y="0"/>
+                  </a:lnTo>
+                </a:path>
+              </a:pathLst>
+            </a:custGeom>
+            <a:ln w="9525" cap="flat">
+              <a:solidFill>
+                <a:srgbClr val="000000">
+                  <a:alpha val="100000"/>
+                </a:srgbClr>
+              </a:solidFill>
+              <a:prstDash val="solid"/>
+              <a:round/>
+            </a:ln>
+          </p:spPr>
+          <p:txBody>
+            <a:bodyPr/>
+            <a:lstStyle/>
+            <a:p/>
+          </p:txBody>
+        </p:sp>
+        <p:sp>
+          <p:nvSpPr>
+            <p:cNvPr id="57" name="tx55"/>
+            <p:cNvSpPr/>
+            <p:nvPr/>
+          </p:nvSpPr>
+          <p:spPr>
+            <a:xfrm>
+              <a:off x="560938" y="3123453"/>
+              <a:ext cx="520935" cy="215093"/>
             </a:xfrm>
             <a:prstGeom prst="rect">
               <a:avLst/>
@@ -8186,21 +8398,21 @@
                   <a:latin typeface="Helvetica"/>
                   <a:cs typeface="Helvetica"/>
                 </a:rPr>
-                <a:t>Rigid trucks</a:t>
+                <a:t>Rigid</a:t>
               </a:r>
             </a:p>
           </p:txBody>
         </p:sp>
         <p:sp>
           <p:nvSpPr>
-            <p:cNvPr id="53" name="tx51"/>
+            <p:cNvPr id="58" name="tx56"/>
             <p:cNvSpPr/>
             <p:nvPr/>
           </p:nvSpPr>
           <p:spPr>
             <a:xfrm>
-              <a:off x="1828" y="1237532"/>
-              <a:ext cx="1753232" cy="169105"/>
+              <a:off x="472200" y="3416887"/>
+              <a:ext cx="609674" cy="168547"/>
             </a:xfrm>
             <a:prstGeom prst="rect">
               <a:avLst/>
@@ -8232,71 +8444,123 @@
                   <a:latin typeface="Helvetica"/>
                   <a:cs typeface="Helvetica"/>
                 </a:rPr>
-                <a:t>Articulated trucks</a:t>
+                <a:t>trucks</a:t>
               </a:r>
             </a:p>
           </p:txBody>
         </p:sp>
         <p:sp>
           <p:nvSpPr>
-            <p:cNvPr id="54" name="pl52"/>
+            <p:cNvPr id="59" name="tx57"/>
             <p:cNvSpPr/>
             <p:nvPr/>
           </p:nvSpPr>
           <p:spPr>
             <a:xfrm>
-              <a:off x="1857546" y="4613218"/>
-              <a:ext cx="6010325" cy="0"/>
+              <a:off x="1828" y="1114422"/>
+              <a:ext cx="1080045" cy="168771"/>
             </a:xfrm>
-            <a:custGeom>
+            <a:prstGeom prst="rect">
               <a:avLst/>
-              <a:pathLst>
-                <a:path w="6010325" h="0">
-                  <a:moveTo>
-                    <a:pt x="0" y="0"/>
-                  </a:moveTo>
-                  <a:lnTo>
-                    <a:pt x="6010325" y="0"/>
-                  </a:lnTo>
-                </a:path>
-              </a:pathLst>
-            </a:custGeom>
-            <a:ln w="9525" cap="flat">
-              <a:solidFill>
-                <a:srgbClr val="000000">
-                  <a:alpha val="100000"/>
-                </a:srgbClr>
-              </a:solidFill>
-              <a:prstDash val="solid"/>
-              <a:round/>
-            </a:ln>
+            </a:prstGeom>
+            <a:noFill/>
           </p:spPr>
           <p:txBody>
-            <a:bodyPr/>
+            <a:bodyPr lIns="0" rIns="0" tIns="0" bIns="0" anchorCtr="1" anchor="ctr" wrap="none"/>
             <a:lstStyle/>
-            <a:p/>
+            <a:p>
+              <a:pPr algn="l" marL="0" marR="0" indent="0">
+                <a:lnSpc>
+                  <a:spcPts val="1800"/>
+                </a:lnSpc>
+                <a:spcBef>
+                  <a:spcPts val="0"/>
+                </a:spcBef>
+                <a:spcAft>
+                  <a:spcPts val="0"/>
+                </a:spcAft>
+              </a:pPr>
+              <a:r>
+                <a:rPr sz="1800">
+                  <a:solidFill>
+                    <a:srgbClr val="000000">
+                      <a:alpha val="100000"/>
+                    </a:srgbClr>
+                  </a:solidFill>
+                  <a:latin typeface="Helvetica"/>
+                  <a:cs typeface="Helvetica"/>
+                </a:rPr>
+                <a:t>Articulated</a:t>
+              </a:r>
+            </a:p>
           </p:txBody>
         </p:sp>
         <p:sp>
           <p:nvSpPr>
-            <p:cNvPr id="55" name="pl53"/>
+            <p:cNvPr id="60" name="tx58"/>
             <p:cNvSpPr/>
             <p:nvPr/>
           </p:nvSpPr>
           <p:spPr>
             <a:xfrm>
-              <a:off x="1857546" y="4613218"/>
-              <a:ext cx="0" cy="56936"/>
+              <a:off x="472200" y="1361534"/>
+              <a:ext cx="609674" cy="168547"/>
+            </a:xfrm>
+            <a:prstGeom prst="rect">
+              <a:avLst/>
+            </a:prstGeom>
+            <a:noFill/>
+          </p:spPr>
+          <p:txBody>
+            <a:bodyPr lIns="0" rIns="0" tIns="0" bIns="0" anchorCtr="1" anchor="ctr" wrap="none"/>
+            <a:lstStyle/>
+            <a:p>
+              <a:pPr algn="l" marL="0" marR="0" indent="0">
+                <a:lnSpc>
+                  <a:spcPts val="1800"/>
+                </a:lnSpc>
+                <a:spcBef>
+                  <a:spcPts val="0"/>
+                </a:spcBef>
+                <a:spcAft>
+                  <a:spcPts val="0"/>
+                </a:spcAft>
+              </a:pPr>
+              <a:r>
+                <a:rPr sz="1800">
+                  <a:solidFill>
+                    <a:srgbClr val="000000">
+                      <a:alpha val="100000"/>
+                    </a:srgbClr>
+                  </a:solidFill>
+                  <a:latin typeface="Helvetica"/>
+                  <a:cs typeface="Helvetica"/>
+                </a:rPr>
+                <a:t>trucks</a:t>
+              </a:r>
+            </a:p>
+          </p:txBody>
+        </p:sp>
+        <p:sp>
+          <p:nvSpPr>
+            <p:cNvPr id="61" name="pl59"/>
+            <p:cNvSpPr/>
+            <p:nvPr/>
+          </p:nvSpPr>
+          <p:spPr>
+            <a:xfrm>
+              <a:off x="1127423" y="3380006"/>
+              <a:ext cx="56936" cy="0"/>
             </a:xfrm>
             <a:custGeom>
               <a:avLst/>
               <a:pathLst>
-                <a:path w="0" h="56936">
+                <a:path w="56936" h="0">
                   <a:moveTo>
-                    <a:pt x="0" y="56936"/>
+                    <a:pt x="0" y="0"/>
                   </a:moveTo>
                   <a:lnTo>
-                    <a:pt x="0" y="0"/>
+                    <a:pt x="56936" y="0"/>
                   </a:lnTo>
                 </a:path>
               </a:pathLst>
@@ -8319,24 +8583,24 @@
         </p:sp>
         <p:sp>
           <p:nvSpPr>
-            <p:cNvPr id="56" name="pl54"/>
+            <p:cNvPr id="62" name="pl60"/>
             <p:cNvSpPr/>
             <p:nvPr/>
           </p:nvSpPr>
           <p:spPr>
             <a:xfrm>
-              <a:off x="3041847" y="4613218"/>
-              <a:ext cx="0" cy="56936"/>
+              <a:off x="1127423" y="1324652"/>
+              <a:ext cx="56936" cy="0"/>
             </a:xfrm>
             <a:custGeom>
               <a:avLst/>
               <a:pathLst>
-                <a:path w="0" h="56936">
+                <a:path w="56936" h="0">
                   <a:moveTo>
-                    <a:pt x="0" y="56936"/>
+                    <a:pt x="0" y="0"/>
                   </a:moveTo>
                   <a:lnTo>
-                    <a:pt x="0" y="0"/>
+                    <a:pt x="56936" y="0"/>
                   </a:lnTo>
                 </a:path>
               </a:pathLst>
@@ -8359,173 +8623,13 @@
         </p:sp>
         <p:sp>
           <p:nvSpPr>
-            <p:cNvPr id="57" name="pl55"/>
+            <p:cNvPr id="63" name="tx61"/>
             <p:cNvSpPr/>
             <p:nvPr/>
           </p:nvSpPr>
           <p:spPr>
             <a:xfrm>
-              <a:off x="4226147" y="4613218"/>
-              <a:ext cx="0" cy="56936"/>
-            </a:xfrm>
-            <a:custGeom>
-              <a:avLst/>
-              <a:pathLst>
-                <a:path w="0" h="56936">
-                  <a:moveTo>
-                    <a:pt x="0" y="56936"/>
-                  </a:moveTo>
-                  <a:lnTo>
-                    <a:pt x="0" y="0"/>
-                  </a:lnTo>
-                </a:path>
-              </a:pathLst>
-            </a:custGeom>
-            <a:ln w="7143" cap="flat">
-              <a:solidFill>
-                <a:srgbClr val="000000">
-                  <a:alpha val="100000"/>
-                </a:srgbClr>
-              </a:solidFill>
-              <a:prstDash val="solid"/>
-              <a:round/>
-            </a:ln>
-          </p:spPr>
-          <p:txBody>
-            <a:bodyPr/>
-            <a:lstStyle/>
-            <a:p/>
-          </p:txBody>
-        </p:sp>
-        <p:sp>
-          <p:nvSpPr>
-            <p:cNvPr id="58" name="pl56"/>
-            <p:cNvSpPr/>
-            <p:nvPr/>
-          </p:nvSpPr>
-          <p:spPr>
-            <a:xfrm>
-              <a:off x="5410448" y="4613218"/>
-              <a:ext cx="0" cy="56936"/>
-            </a:xfrm>
-            <a:custGeom>
-              <a:avLst/>
-              <a:pathLst>
-                <a:path w="0" h="56936">
-                  <a:moveTo>
-                    <a:pt x="0" y="56936"/>
-                  </a:moveTo>
-                  <a:lnTo>
-                    <a:pt x="0" y="0"/>
-                  </a:lnTo>
-                </a:path>
-              </a:pathLst>
-            </a:custGeom>
-            <a:ln w="7143" cap="flat">
-              <a:solidFill>
-                <a:srgbClr val="000000">
-                  <a:alpha val="100000"/>
-                </a:srgbClr>
-              </a:solidFill>
-              <a:prstDash val="solid"/>
-              <a:round/>
-            </a:ln>
-          </p:spPr>
-          <p:txBody>
-            <a:bodyPr/>
-            <a:lstStyle/>
-            <a:p/>
-          </p:txBody>
-        </p:sp>
-        <p:sp>
-          <p:nvSpPr>
-            <p:cNvPr id="59" name="pl57"/>
-            <p:cNvSpPr/>
-            <p:nvPr/>
-          </p:nvSpPr>
-          <p:spPr>
-            <a:xfrm>
-              <a:off x="6594748" y="4613218"/>
-              <a:ext cx="0" cy="56936"/>
-            </a:xfrm>
-            <a:custGeom>
-              <a:avLst/>
-              <a:pathLst>
-                <a:path w="0" h="56936">
-                  <a:moveTo>
-                    <a:pt x="0" y="56936"/>
-                  </a:moveTo>
-                  <a:lnTo>
-                    <a:pt x="0" y="0"/>
-                  </a:lnTo>
-                </a:path>
-              </a:pathLst>
-            </a:custGeom>
-            <a:ln w="7143" cap="flat">
-              <a:solidFill>
-                <a:srgbClr val="000000">
-                  <a:alpha val="100000"/>
-                </a:srgbClr>
-              </a:solidFill>
-              <a:prstDash val="solid"/>
-              <a:round/>
-            </a:ln>
-          </p:spPr>
-          <p:txBody>
-            <a:bodyPr/>
-            <a:lstStyle/>
-            <a:p/>
-          </p:txBody>
-        </p:sp>
-        <p:sp>
-          <p:nvSpPr>
-            <p:cNvPr id="60" name="pl58"/>
-            <p:cNvSpPr/>
-            <p:nvPr/>
-          </p:nvSpPr>
-          <p:spPr>
-            <a:xfrm>
-              <a:off x="7779049" y="4613218"/>
-              <a:ext cx="0" cy="56936"/>
-            </a:xfrm>
-            <a:custGeom>
-              <a:avLst/>
-              <a:pathLst>
-                <a:path w="0" h="56936">
-                  <a:moveTo>
-                    <a:pt x="0" y="56936"/>
-                  </a:moveTo>
-                  <a:lnTo>
-                    <a:pt x="0" y="0"/>
-                  </a:lnTo>
-                </a:path>
-              </a:pathLst>
-            </a:custGeom>
-            <a:ln w="7143" cap="flat">
-              <a:solidFill>
-                <a:srgbClr val="000000">
-                  <a:alpha val="100000"/>
-                </a:srgbClr>
-              </a:solidFill>
-              <a:prstDash val="solid"/>
-              <a:round/>
-            </a:ln>
-          </p:spPr>
-          <p:txBody>
-            <a:bodyPr/>
-            <a:lstStyle/>
-            <a:p/>
-          </p:txBody>
-        </p:sp>
-        <p:sp>
-          <p:nvSpPr>
-            <p:cNvPr id="61" name="tx59"/>
-            <p:cNvSpPr/>
-            <p:nvPr/>
-          </p:nvSpPr>
-          <p:spPr>
-            <a:xfrm>
-              <a:off x="1793978" y="4715480"/>
+              <a:off x="1120791" y="4715480"/>
               <a:ext cx="127136" cy="164194"/>
             </a:xfrm>
             <a:prstGeom prst="rect">
@@ -8565,13 +8669,13 @@
         </p:sp>
         <p:sp>
           <p:nvSpPr>
-            <p:cNvPr id="62" name="tx60"/>
+            <p:cNvPr id="64" name="tx62"/>
             <p:cNvSpPr/>
             <p:nvPr/>
           </p:nvSpPr>
           <p:spPr>
             <a:xfrm>
-              <a:off x="2851142" y="4715480"/>
+              <a:off x="2310603" y="4715480"/>
               <a:ext cx="381409" cy="164194"/>
             </a:xfrm>
             <a:prstGeom prst="rect">
@@ -8611,13 +8715,13 @@
         </p:sp>
         <p:sp>
           <p:nvSpPr>
-            <p:cNvPr id="63" name="tx61"/>
+            <p:cNvPr id="65" name="tx63"/>
             <p:cNvSpPr/>
             <p:nvPr/>
           </p:nvSpPr>
           <p:spPr>
             <a:xfrm>
-              <a:off x="3971875" y="4715480"/>
+              <a:off x="3563983" y="4715480"/>
               <a:ext cx="508545" cy="164194"/>
             </a:xfrm>
             <a:prstGeom prst="rect">
@@ -8657,13 +8761,13 @@
         </p:sp>
         <p:sp>
           <p:nvSpPr>
-            <p:cNvPr id="64" name="tx62"/>
+            <p:cNvPr id="66" name="tx64"/>
             <p:cNvSpPr/>
             <p:nvPr/>
           </p:nvSpPr>
           <p:spPr>
             <a:xfrm>
-              <a:off x="5156175" y="4715480"/>
+              <a:off x="4880931" y="4715480"/>
               <a:ext cx="508545" cy="164194"/>
             </a:xfrm>
             <a:prstGeom prst="rect">
@@ -8703,13 +8807,13 @@
         </p:sp>
         <p:sp>
           <p:nvSpPr>
-            <p:cNvPr id="65" name="tx63"/>
+            <p:cNvPr id="67" name="tx65"/>
             <p:cNvSpPr/>
             <p:nvPr/>
           </p:nvSpPr>
           <p:spPr>
             <a:xfrm>
-              <a:off x="6340476" y="4714922"/>
+              <a:off x="6197879" y="4714922"/>
               <a:ext cx="508545" cy="164752"/>
             </a:xfrm>
             <a:prstGeom prst="rect">
@@ -8749,13 +8853,13 @@
         </p:sp>
         <p:sp>
           <p:nvSpPr>
-            <p:cNvPr id="66" name="tx64"/>
+            <p:cNvPr id="68" name="tx66"/>
             <p:cNvSpPr/>
             <p:nvPr/>
           </p:nvSpPr>
           <p:spPr>
             <a:xfrm>
-              <a:off x="7524776" y="4714922"/>
+              <a:off x="7514828" y="4714922"/>
               <a:ext cx="508545" cy="164752"/>
             </a:xfrm>
             <a:prstGeom prst="rect">
@@ -8795,13 +8899,13 @@
         </p:sp>
         <p:sp>
           <p:nvSpPr>
-            <p:cNvPr id="67" name="tx65"/>
+            <p:cNvPr id="69" name="tx67"/>
             <p:cNvSpPr/>
             <p:nvPr/>
           </p:nvSpPr>
           <p:spPr>
             <a:xfrm>
-              <a:off x="4176630" y="4936053"/>
+              <a:off x="3840037" y="4936053"/>
               <a:ext cx="1372158" cy="215093"/>
             </a:xfrm>
             <a:prstGeom prst="rect">

</xml_diff>